<commit_message>
Rossmann Sales prediction -PPT
Rossmann Sales prediction -PPT
</commit_message>
<xml_diff>
--- a/Rossmman Sales Prediction-Project 6-Nexthike.pptx
+++ b/Rossmman Sales Prediction-Project 6-Nexthike.pptx
@@ -2,7 +2,7 @@
 <file path=ppt/presentation.xml><?xml version="1.0" encoding="utf-8"?>
 <p:presentation xmlns:a="http://schemas.openxmlformats.org/drawingml/2006/main" xmlns:r="http://schemas.openxmlformats.org/officeDocument/2006/relationships" xmlns:p="http://schemas.openxmlformats.org/presentationml/2006/main" saveSubsetFonts="1">
   <p:sldMasterIdLst>
-    <p:sldMasterId id="2147483648" r:id="rId1"/>
+    <p:sldMasterId id="2147483660" r:id="rId1"/>
   </p:sldMasterIdLst>
   <p:sldIdLst>
     <p:sldId id="256" r:id="rId2"/>
@@ -14,6 +14,13 @@
     <p:sldId id="266" r:id="rId8"/>
     <p:sldId id="264" r:id="rId9"/>
     <p:sldId id="265" r:id="rId10"/>
+    <p:sldId id="267" r:id="rId11"/>
+    <p:sldId id="268" r:id="rId12"/>
+    <p:sldId id="269" r:id="rId13"/>
+    <p:sldId id="272" r:id="rId14"/>
+    <p:sldId id="271" r:id="rId15"/>
+    <p:sldId id="270" r:id="rId16"/>
+    <p:sldId id="275" r:id="rId17"/>
   </p:sldIdLst>
   <p:sldSz cx="12192000" cy="6858000"/>
   <p:notesSz cx="6858000" cy="9144000"/>
@@ -21,7 +28,7 @@
     <a:defPPr>
       <a:defRPr lang="en-US"/>
     </a:defPPr>
-    <a:lvl1pPr marL="0" algn="l" defTabSz="914400" rtl="0" eaLnBrk="1" latinLnBrk="0" hangingPunct="1">
+    <a:lvl1pPr marL="0" algn="l" defTabSz="457200" rtl="0" eaLnBrk="1" latinLnBrk="0" hangingPunct="1">
       <a:defRPr sz="1800" kern="1200">
         <a:solidFill>
           <a:schemeClr val="tx1"/>
@@ -31,7 +38,7 @@
         <a:cs typeface="+mn-cs"/>
       </a:defRPr>
     </a:lvl1pPr>
-    <a:lvl2pPr marL="457200" algn="l" defTabSz="914400" rtl="0" eaLnBrk="1" latinLnBrk="0" hangingPunct="1">
+    <a:lvl2pPr marL="457200" algn="l" defTabSz="457200" rtl="0" eaLnBrk="1" latinLnBrk="0" hangingPunct="1">
       <a:defRPr sz="1800" kern="1200">
         <a:solidFill>
           <a:schemeClr val="tx1"/>
@@ -41,7 +48,7 @@
         <a:cs typeface="+mn-cs"/>
       </a:defRPr>
     </a:lvl2pPr>
-    <a:lvl3pPr marL="914400" algn="l" defTabSz="914400" rtl="0" eaLnBrk="1" latinLnBrk="0" hangingPunct="1">
+    <a:lvl3pPr marL="914400" algn="l" defTabSz="457200" rtl="0" eaLnBrk="1" latinLnBrk="0" hangingPunct="1">
       <a:defRPr sz="1800" kern="1200">
         <a:solidFill>
           <a:schemeClr val="tx1"/>
@@ -51,7 +58,7 @@
         <a:cs typeface="+mn-cs"/>
       </a:defRPr>
     </a:lvl3pPr>
-    <a:lvl4pPr marL="1371600" algn="l" defTabSz="914400" rtl="0" eaLnBrk="1" latinLnBrk="0" hangingPunct="1">
+    <a:lvl4pPr marL="1371600" algn="l" defTabSz="457200" rtl="0" eaLnBrk="1" latinLnBrk="0" hangingPunct="1">
       <a:defRPr sz="1800" kern="1200">
         <a:solidFill>
           <a:schemeClr val="tx1"/>
@@ -61,7 +68,7 @@
         <a:cs typeface="+mn-cs"/>
       </a:defRPr>
     </a:lvl4pPr>
-    <a:lvl5pPr marL="1828800" algn="l" defTabSz="914400" rtl="0" eaLnBrk="1" latinLnBrk="0" hangingPunct="1">
+    <a:lvl5pPr marL="1828800" algn="l" defTabSz="457200" rtl="0" eaLnBrk="1" latinLnBrk="0" hangingPunct="1">
       <a:defRPr sz="1800" kern="1200">
         <a:solidFill>
           <a:schemeClr val="tx1"/>
@@ -71,7 +78,7 @@
         <a:cs typeface="+mn-cs"/>
       </a:defRPr>
     </a:lvl5pPr>
-    <a:lvl6pPr marL="2286000" algn="l" defTabSz="914400" rtl="0" eaLnBrk="1" latinLnBrk="0" hangingPunct="1">
+    <a:lvl6pPr marL="2286000" algn="l" defTabSz="457200" rtl="0" eaLnBrk="1" latinLnBrk="0" hangingPunct="1">
       <a:defRPr sz="1800" kern="1200">
         <a:solidFill>
           <a:schemeClr val="tx1"/>
@@ -81,7 +88,7 @@
         <a:cs typeface="+mn-cs"/>
       </a:defRPr>
     </a:lvl6pPr>
-    <a:lvl7pPr marL="2743200" algn="l" defTabSz="914400" rtl="0" eaLnBrk="1" latinLnBrk="0" hangingPunct="1">
+    <a:lvl7pPr marL="2743200" algn="l" defTabSz="457200" rtl="0" eaLnBrk="1" latinLnBrk="0" hangingPunct="1">
       <a:defRPr sz="1800" kern="1200">
         <a:solidFill>
           <a:schemeClr val="tx1"/>
@@ -91,7 +98,7 @@
         <a:cs typeface="+mn-cs"/>
       </a:defRPr>
     </a:lvl7pPr>
-    <a:lvl8pPr marL="3200400" algn="l" defTabSz="914400" rtl="0" eaLnBrk="1" latinLnBrk="0" hangingPunct="1">
+    <a:lvl8pPr marL="3200400" algn="l" defTabSz="457200" rtl="0" eaLnBrk="1" latinLnBrk="0" hangingPunct="1">
       <a:defRPr sz="1800" kern="1200">
         <a:solidFill>
           <a:schemeClr val="tx1"/>
@@ -101,7 +108,7 @@
         <a:cs typeface="+mn-cs"/>
       </a:defRPr>
     </a:lvl8pPr>
-    <a:lvl9pPr marL="3657600" algn="l" defTabSz="914400" rtl="0" eaLnBrk="1" latinLnBrk="0" hangingPunct="1">
+    <a:lvl9pPr marL="3657600" algn="l" defTabSz="457200" rtl="0" eaLnBrk="1" latinLnBrk="0" hangingPunct="1">
       <a:defRPr sz="1800" kern="1200">
         <a:solidFill>
           <a:schemeClr val="tx1"/>
@@ -150,13 +157,7 @@
       </p:grpSpPr>
       <p:sp>
         <p:nvSpPr>
-          <p:cNvPr id="2" name="Title 1">
-            <a:extLst>
-              <a:ext uri="{FF2B5EF4-FFF2-40B4-BE49-F238E27FC236}">
-                <a16:creationId xmlns:a16="http://schemas.microsoft.com/office/drawing/2014/main" id="{491FBD3D-0CC5-2463-D9A5-4732C7E89D36}"/>
-              </a:ext>
-            </a:extLst>
-          </p:cNvPr>
+          <p:cNvPr id="2" name="Title 1"/>
           <p:cNvSpPr>
             <a:spLocks noGrp="1"/>
           </p:cNvSpPr>
@@ -182,19 +183,13 @@
               <a:rPr lang="en-US"/>
               <a:t>Click to edit Master title style</a:t>
             </a:r>
-            <a:endParaRPr lang="en-IN"/>
-          </a:p>
-        </p:txBody>
-      </p:sp>
-      <p:sp>
-        <p:nvSpPr>
-          <p:cNvPr id="3" name="Subtitle 2">
-            <a:extLst>
-              <a:ext uri="{FF2B5EF4-FFF2-40B4-BE49-F238E27FC236}">
-                <a16:creationId xmlns:a16="http://schemas.microsoft.com/office/drawing/2014/main" id="{997087BA-7ED6-BB13-2288-2DCA18642F03}"/>
-              </a:ext>
-            </a:extLst>
-          </p:cNvPr>
+            <a:endParaRPr lang="en-US" dirty="0"/>
+          </a:p>
+        </p:txBody>
+      </p:sp>
+      <p:sp>
+        <p:nvSpPr>
+          <p:cNvPr id="3" name="Subtitle 2"/>
           <p:cNvSpPr>
             <a:spLocks noGrp="1"/>
           </p:cNvSpPr>
@@ -253,19 +248,13 @@
               <a:rPr lang="en-US"/>
               <a:t>Click to edit Master subtitle style</a:t>
             </a:r>
-            <a:endParaRPr lang="en-IN"/>
-          </a:p>
-        </p:txBody>
-      </p:sp>
-      <p:sp>
-        <p:nvSpPr>
-          <p:cNvPr id="4" name="Date Placeholder 3">
-            <a:extLst>
-              <a:ext uri="{FF2B5EF4-FFF2-40B4-BE49-F238E27FC236}">
-                <a16:creationId xmlns:a16="http://schemas.microsoft.com/office/drawing/2014/main" id="{835793E5-1A89-A3D6-8D50-6D9EC3B01D4A}"/>
-              </a:ext>
-            </a:extLst>
-          </p:cNvPr>
+            <a:endParaRPr lang="en-US" dirty="0"/>
+          </a:p>
+        </p:txBody>
+      </p:sp>
+      <p:sp>
+        <p:nvSpPr>
+          <p:cNvPr id="4" name="Date Placeholder 3"/>
           <p:cNvSpPr>
             <a:spLocks noGrp="1"/>
           </p:cNvSpPr>
@@ -280,7 +269,7 @@
           <a:p>
             <a:fld id="{8818E934-49E4-4A07-BEBD-4A62FF5122D9}" type="datetimeFigureOut">
               <a:rPr lang="en-IN" smtClean="0"/>
-              <a:t>01-04-2024</a:t>
+              <a:t>11-04-2024</a:t>
             </a:fld>
             <a:endParaRPr lang="en-IN"/>
           </a:p>
@@ -288,13 +277,7 @@
       </p:sp>
       <p:sp>
         <p:nvSpPr>
-          <p:cNvPr id="5" name="Footer Placeholder 4">
-            <a:extLst>
-              <a:ext uri="{FF2B5EF4-FFF2-40B4-BE49-F238E27FC236}">
-                <a16:creationId xmlns:a16="http://schemas.microsoft.com/office/drawing/2014/main" id="{C315E167-5844-56BD-74E0-DC62622BBAF3}"/>
-              </a:ext>
-            </a:extLst>
-          </p:cNvPr>
+          <p:cNvPr id="5" name="Footer Placeholder 4"/>
           <p:cNvSpPr>
             <a:spLocks noGrp="1"/>
           </p:cNvSpPr>
@@ -313,13 +296,7 @@
       </p:sp>
       <p:sp>
         <p:nvSpPr>
-          <p:cNvPr id="6" name="Slide Number Placeholder 5">
-            <a:extLst>
-              <a:ext uri="{FF2B5EF4-FFF2-40B4-BE49-F238E27FC236}">
-                <a16:creationId xmlns:a16="http://schemas.microsoft.com/office/drawing/2014/main" id="{F24AAFD4-1287-F2C3-3850-7384036F3374}"/>
-              </a:ext>
-            </a:extLst>
-          </p:cNvPr>
+          <p:cNvPr id="6" name="Slide Number Placeholder 5"/>
           <p:cNvSpPr>
             <a:spLocks noGrp="1"/>
           </p:cNvSpPr>
@@ -343,7 +320,7 @@
     </p:spTree>
     <p:extLst>
       <p:ext uri="{BB962C8B-B14F-4D97-AF65-F5344CB8AC3E}">
-        <p14:creationId xmlns:p14="http://schemas.microsoft.com/office/powerpoint/2010/main" val="429260763"/>
+        <p14:creationId xmlns:p14="http://schemas.microsoft.com/office/powerpoint/2010/main" val="832006253"/>
       </p:ext>
     </p:extLst>
   </p:cSld>
@@ -372,13 +349,7 @@
       </p:grpSpPr>
       <p:sp>
         <p:nvSpPr>
-          <p:cNvPr id="2" name="Title 1">
-            <a:extLst>
-              <a:ext uri="{FF2B5EF4-FFF2-40B4-BE49-F238E27FC236}">
-                <a16:creationId xmlns:a16="http://schemas.microsoft.com/office/drawing/2014/main" id="{89AA85EC-2EBE-AE6C-CE2F-9C8BFE6CFBEF}"/>
-              </a:ext>
-            </a:extLst>
-          </p:cNvPr>
+          <p:cNvPr id="2" name="Title 1"/>
           <p:cNvSpPr>
             <a:spLocks noGrp="1"/>
           </p:cNvSpPr>
@@ -395,19 +366,13 @@
               <a:rPr lang="en-US"/>
               <a:t>Click to edit Master title style</a:t>
             </a:r>
-            <a:endParaRPr lang="en-IN"/>
-          </a:p>
-        </p:txBody>
-      </p:sp>
-      <p:sp>
-        <p:nvSpPr>
-          <p:cNvPr id="3" name="Vertical Text Placeholder 2">
-            <a:extLst>
-              <a:ext uri="{FF2B5EF4-FFF2-40B4-BE49-F238E27FC236}">
-                <a16:creationId xmlns:a16="http://schemas.microsoft.com/office/drawing/2014/main" id="{7AFEB192-33CC-E192-2435-84FE39C9E659}"/>
-              </a:ext>
-            </a:extLst>
-          </p:cNvPr>
+            <a:endParaRPr lang="en-US" dirty="0"/>
+          </a:p>
+        </p:txBody>
+      </p:sp>
+      <p:sp>
+        <p:nvSpPr>
+          <p:cNvPr id="3" name="Vertical Text Placeholder 2"/>
           <p:cNvSpPr>
             <a:spLocks noGrp="1"/>
           </p:cNvSpPr>
@@ -453,19 +418,13 @@
               <a:rPr lang="en-US"/>
               <a:t>Fifth level</a:t>
             </a:r>
-            <a:endParaRPr lang="en-IN"/>
-          </a:p>
-        </p:txBody>
-      </p:sp>
-      <p:sp>
-        <p:nvSpPr>
-          <p:cNvPr id="4" name="Date Placeholder 3">
-            <a:extLst>
-              <a:ext uri="{FF2B5EF4-FFF2-40B4-BE49-F238E27FC236}">
-                <a16:creationId xmlns:a16="http://schemas.microsoft.com/office/drawing/2014/main" id="{700A2F38-1F01-B421-7FEB-2C2BD93A6440}"/>
-              </a:ext>
-            </a:extLst>
-          </p:cNvPr>
+            <a:endParaRPr lang="en-US" dirty="0"/>
+          </a:p>
+        </p:txBody>
+      </p:sp>
+      <p:sp>
+        <p:nvSpPr>
+          <p:cNvPr id="4" name="Date Placeholder 3"/>
           <p:cNvSpPr>
             <a:spLocks noGrp="1"/>
           </p:cNvSpPr>
@@ -480,7 +439,7 @@
           <a:p>
             <a:fld id="{8818E934-49E4-4A07-BEBD-4A62FF5122D9}" type="datetimeFigureOut">
               <a:rPr lang="en-IN" smtClean="0"/>
-              <a:t>01-04-2024</a:t>
+              <a:t>11-04-2024</a:t>
             </a:fld>
             <a:endParaRPr lang="en-IN"/>
           </a:p>
@@ -488,13 +447,7 @@
       </p:sp>
       <p:sp>
         <p:nvSpPr>
-          <p:cNvPr id="5" name="Footer Placeholder 4">
-            <a:extLst>
-              <a:ext uri="{FF2B5EF4-FFF2-40B4-BE49-F238E27FC236}">
-                <a16:creationId xmlns:a16="http://schemas.microsoft.com/office/drawing/2014/main" id="{8EEB33C8-71DA-F78B-BB79-B7FAF9C5ABB5}"/>
-              </a:ext>
-            </a:extLst>
-          </p:cNvPr>
+          <p:cNvPr id="5" name="Footer Placeholder 4"/>
           <p:cNvSpPr>
             <a:spLocks noGrp="1"/>
           </p:cNvSpPr>
@@ -513,13 +466,7 @@
       </p:sp>
       <p:sp>
         <p:nvSpPr>
-          <p:cNvPr id="6" name="Slide Number Placeholder 5">
-            <a:extLst>
-              <a:ext uri="{FF2B5EF4-FFF2-40B4-BE49-F238E27FC236}">
-                <a16:creationId xmlns:a16="http://schemas.microsoft.com/office/drawing/2014/main" id="{06544EE0-8C73-064E-1C1E-EBFD0CFF6E42}"/>
-              </a:ext>
-            </a:extLst>
-          </p:cNvPr>
+          <p:cNvPr id="6" name="Slide Number Placeholder 5"/>
           <p:cNvSpPr>
             <a:spLocks noGrp="1"/>
           </p:cNvSpPr>
@@ -543,7 +490,7 @@
     </p:spTree>
     <p:extLst>
       <p:ext uri="{BB962C8B-B14F-4D97-AF65-F5344CB8AC3E}">
-        <p14:creationId xmlns:p14="http://schemas.microsoft.com/office/powerpoint/2010/main" val="3219387248"/>
+        <p14:creationId xmlns:p14="http://schemas.microsoft.com/office/powerpoint/2010/main" val="2681962698"/>
       </p:ext>
     </p:extLst>
   </p:cSld>
@@ -572,13 +519,7 @@
       </p:grpSpPr>
       <p:sp>
         <p:nvSpPr>
-          <p:cNvPr id="2" name="Vertical Title 1">
-            <a:extLst>
-              <a:ext uri="{FF2B5EF4-FFF2-40B4-BE49-F238E27FC236}">
-                <a16:creationId xmlns:a16="http://schemas.microsoft.com/office/drawing/2014/main" id="{508BCC5E-4C79-32B3-EDC2-FD416D481443}"/>
-              </a:ext>
-            </a:extLst>
-          </p:cNvPr>
+          <p:cNvPr id="2" name="Vertical Title 1"/>
           <p:cNvSpPr>
             <a:spLocks noGrp="1"/>
           </p:cNvSpPr>
@@ -600,19 +541,13 @@
               <a:rPr lang="en-US"/>
               <a:t>Click to edit Master title style</a:t>
             </a:r>
-            <a:endParaRPr lang="en-IN"/>
-          </a:p>
-        </p:txBody>
-      </p:sp>
-      <p:sp>
-        <p:nvSpPr>
-          <p:cNvPr id="3" name="Vertical Text Placeholder 2">
-            <a:extLst>
-              <a:ext uri="{FF2B5EF4-FFF2-40B4-BE49-F238E27FC236}">
-                <a16:creationId xmlns:a16="http://schemas.microsoft.com/office/drawing/2014/main" id="{6C3A006A-7D2C-18B7-A572-304D2180466E}"/>
-              </a:ext>
-            </a:extLst>
-          </p:cNvPr>
+            <a:endParaRPr lang="en-US" dirty="0"/>
+          </a:p>
+        </p:txBody>
+      </p:sp>
+      <p:sp>
+        <p:nvSpPr>
+          <p:cNvPr id="3" name="Vertical Text Placeholder 2"/>
           <p:cNvSpPr>
             <a:spLocks noGrp="1"/>
           </p:cNvSpPr>
@@ -663,19 +598,13 @@
               <a:rPr lang="en-US"/>
               <a:t>Fifth level</a:t>
             </a:r>
-            <a:endParaRPr lang="en-IN"/>
-          </a:p>
-        </p:txBody>
-      </p:sp>
-      <p:sp>
-        <p:nvSpPr>
-          <p:cNvPr id="4" name="Date Placeholder 3">
-            <a:extLst>
-              <a:ext uri="{FF2B5EF4-FFF2-40B4-BE49-F238E27FC236}">
-                <a16:creationId xmlns:a16="http://schemas.microsoft.com/office/drawing/2014/main" id="{EBA63C68-7C77-5604-CCF2-9B7B3CA248E4}"/>
-              </a:ext>
-            </a:extLst>
-          </p:cNvPr>
+            <a:endParaRPr lang="en-US" dirty="0"/>
+          </a:p>
+        </p:txBody>
+      </p:sp>
+      <p:sp>
+        <p:nvSpPr>
+          <p:cNvPr id="4" name="Date Placeholder 3"/>
           <p:cNvSpPr>
             <a:spLocks noGrp="1"/>
           </p:cNvSpPr>
@@ -690,7 +619,7 @@
           <a:p>
             <a:fld id="{8818E934-49E4-4A07-BEBD-4A62FF5122D9}" type="datetimeFigureOut">
               <a:rPr lang="en-IN" smtClean="0"/>
-              <a:t>01-04-2024</a:t>
+              <a:t>11-04-2024</a:t>
             </a:fld>
             <a:endParaRPr lang="en-IN"/>
           </a:p>
@@ -698,13 +627,7 @@
       </p:sp>
       <p:sp>
         <p:nvSpPr>
-          <p:cNvPr id="5" name="Footer Placeholder 4">
-            <a:extLst>
-              <a:ext uri="{FF2B5EF4-FFF2-40B4-BE49-F238E27FC236}">
-                <a16:creationId xmlns:a16="http://schemas.microsoft.com/office/drawing/2014/main" id="{3B2413F4-192D-AF23-5C45-968D972D038F}"/>
-              </a:ext>
-            </a:extLst>
-          </p:cNvPr>
+          <p:cNvPr id="5" name="Footer Placeholder 4"/>
           <p:cNvSpPr>
             <a:spLocks noGrp="1"/>
           </p:cNvSpPr>
@@ -723,13 +646,7 @@
       </p:sp>
       <p:sp>
         <p:nvSpPr>
-          <p:cNvPr id="6" name="Slide Number Placeholder 5">
-            <a:extLst>
-              <a:ext uri="{FF2B5EF4-FFF2-40B4-BE49-F238E27FC236}">
-                <a16:creationId xmlns:a16="http://schemas.microsoft.com/office/drawing/2014/main" id="{2CE05C4E-2343-4E13-A9C1-33EE83789DCA}"/>
-              </a:ext>
-            </a:extLst>
-          </p:cNvPr>
+          <p:cNvPr id="6" name="Slide Number Placeholder 5"/>
           <p:cNvSpPr>
             <a:spLocks noGrp="1"/>
           </p:cNvSpPr>
@@ -753,7 +670,7 @@
     </p:spTree>
     <p:extLst>
       <p:ext uri="{BB962C8B-B14F-4D97-AF65-F5344CB8AC3E}">
-        <p14:creationId xmlns:p14="http://schemas.microsoft.com/office/powerpoint/2010/main" val="4289944497"/>
+        <p14:creationId xmlns:p14="http://schemas.microsoft.com/office/powerpoint/2010/main" val="3682065777"/>
       </p:ext>
     </p:extLst>
   </p:cSld>
@@ -782,13 +699,7 @@
       </p:grpSpPr>
       <p:sp>
         <p:nvSpPr>
-          <p:cNvPr id="2" name="Title 1">
-            <a:extLst>
-              <a:ext uri="{FF2B5EF4-FFF2-40B4-BE49-F238E27FC236}">
-                <a16:creationId xmlns:a16="http://schemas.microsoft.com/office/drawing/2014/main" id="{306AF520-3516-BCE5-DB5F-160393EDE2EA}"/>
-              </a:ext>
-            </a:extLst>
-          </p:cNvPr>
+          <p:cNvPr id="2" name="Title 1"/>
           <p:cNvSpPr>
             <a:spLocks noGrp="1"/>
           </p:cNvSpPr>
@@ -805,19 +716,13 @@
               <a:rPr lang="en-US"/>
               <a:t>Click to edit Master title style</a:t>
             </a:r>
-            <a:endParaRPr lang="en-IN"/>
-          </a:p>
-        </p:txBody>
-      </p:sp>
-      <p:sp>
-        <p:nvSpPr>
-          <p:cNvPr id="3" name="Content Placeholder 2">
-            <a:extLst>
-              <a:ext uri="{FF2B5EF4-FFF2-40B4-BE49-F238E27FC236}">
-                <a16:creationId xmlns:a16="http://schemas.microsoft.com/office/drawing/2014/main" id="{62B135EB-C0BD-965E-AA4E-51833D3738EC}"/>
-              </a:ext>
-            </a:extLst>
-          </p:cNvPr>
+            <a:endParaRPr lang="en-US" dirty="0"/>
+          </a:p>
+        </p:txBody>
+      </p:sp>
+      <p:sp>
+        <p:nvSpPr>
+          <p:cNvPr id="3" name="Content Placeholder 2"/>
           <p:cNvSpPr>
             <a:spLocks noGrp="1"/>
           </p:cNvSpPr>
@@ -863,19 +768,13 @@
               <a:rPr lang="en-US"/>
               <a:t>Fifth level</a:t>
             </a:r>
-            <a:endParaRPr lang="en-IN"/>
-          </a:p>
-        </p:txBody>
-      </p:sp>
-      <p:sp>
-        <p:nvSpPr>
-          <p:cNvPr id="4" name="Date Placeholder 3">
-            <a:extLst>
-              <a:ext uri="{FF2B5EF4-FFF2-40B4-BE49-F238E27FC236}">
-                <a16:creationId xmlns:a16="http://schemas.microsoft.com/office/drawing/2014/main" id="{A33C1134-47E9-6CA0-28B8-1D44902D76C6}"/>
-              </a:ext>
-            </a:extLst>
-          </p:cNvPr>
+            <a:endParaRPr lang="en-US" dirty="0"/>
+          </a:p>
+        </p:txBody>
+      </p:sp>
+      <p:sp>
+        <p:nvSpPr>
+          <p:cNvPr id="4" name="Date Placeholder 3"/>
           <p:cNvSpPr>
             <a:spLocks noGrp="1"/>
           </p:cNvSpPr>
@@ -890,7 +789,7 @@
           <a:p>
             <a:fld id="{8818E934-49E4-4A07-BEBD-4A62FF5122D9}" type="datetimeFigureOut">
               <a:rPr lang="en-IN" smtClean="0"/>
-              <a:t>01-04-2024</a:t>
+              <a:t>11-04-2024</a:t>
             </a:fld>
             <a:endParaRPr lang="en-IN"/>
           </a:p>
@@ -898,13 +797,7 @@
       </p:sp>
       <p:sp>
         <p:nvSpPr>
-          <p:cNvPr id="5" name="Footer Placeholder 4">
-            <a:extLst>
-              <a:ext uri="{FF2B5EF4-FFF2-40B4-BE49-F238E27FC236}">
-                <a16:creationId xmlns:a16="http://schemas.microsoft.com/office/drawing/2014/main" id="{5314C6D5-EFE4-61A0-9869-33934356D809}"/>
-              </a:ext>
-            </a:extLst>
-          </p:cNvPr>
+          <p:cNvPr id="5" name="Footer Placeholder 4"/>
           <p:cNvSpPr>
             <a:spLocks noGrp="1"/>
           </p:cNvSpPr>
@@ -923,13 +816,7 @@
       </p:sp>
       <p:sp>
         <p:nvSpPr>
-          <p:cNvPr id="6" name="Slide Number Placeholder 5">
-            <a:extLst>
-              <a:ext uri="{FF2B5EF4-FFF2-40B4-BE49-F238E27FC236}">
-                <a16:creationId xmlns:a16="http://schemas.microsoft.com/office/drawing/2014/main" id="{23BFA88D-AAD7-7696-DE70-DEA80814AB72}"/>
-              </a:ext>
-            </a:extLst>
-          </p:cNvPr>
+          <p:cNvPr id="6" name="Slide Number Placeholder 5"/>
           <p:cNvSpPr>
             <a:spLocks noGrp="1"/>
           </p:cNvSpPr>
@@ -953,7 +840,7 @@
     </p:spTree>
     <p:extLst>
       <p:ext uri="{BB962C8B-B14F-4D97-AF65-F5344CB8AC3E}">
-        <p14:creationId xmlns:p14="http://schemas.microsoft.com/office/powerpoint/2010/main" val="1763142205"/>
+        <p14:creationId xmlns:p14="http://schemas.microsoft.com/office/powerpoint/2010/main" val="258062568"/>
       </p:ext>
     </p:extLst>
   </p:cSld>
@@ -982,13 +869,7 @@
       </p:grpSpPr>
       <p:sp>
         <p:nvSpPr>
-          <p:cNvPr id="2" name="Title 1">
-            <a:extLst>
-              <a:ext uri="{FF2B5EF4-FFF2-40B4-BE49-F238E27FC236}">
-                <a16:creationId xmlns:a16="http://schemas.microsoft.com/office/drawing/2014/main" id="{6FF34DC5-1354-D775-9B73-16AB7B5702A2}"/>
-              </a:ext>
-            </a:extLst>
-          </p:cNvPr>
+          <p:cNvPr id="2" name="Title 1"/>
           <p:cNvSpPr>
             <a:spLocks noGrp="1"/>
           </p:cNvSpPr>
@@ -1014,19 +895,13 @@
               <a:rPr lang="en-US"/>
               <a:t>Click to edit Master title style</a:t>
             </a:r>
-            <a:endParaRPr lang="en-IN"/>
-          </a:p>
-        </p:txBody>
-      </p:sp>
-      <p:sp>
-        <p:nvSpPr>
-          <p:cNvPr id="3" name="Text Placeholder 2">
-            <a:extLst>
-              <a:ext uri="{FF2B5EF4-FFF2-40B4-BE49-F238E27FC236}">
-                <a16:creationId xmlns:a16="http://schemas.microsoft.com/office/drawing/2014/main" id="{31C67771-004B-5AAB-5AA2-6074B325B5A2}"/>
-              </a:ext>
-            </a:extLst>
-          </p:cNvPr>
+            <a:endParaRPr lang="en-US" dirty="0"/>
+          </a:p>
+        </p:txBody>
+      </p:sp>
+      <p:sp>
+        <p:nvSpPr>
+          <p:cNvPr id="3" name="Text Placeholder 2"/>
           <p:cNvSpPr>
             <a:spLocks noGrp="1"/>
           </p:cNvSpPr>
@@ -1145,13 +1020,7 @@
       </p:sp>
       <p:sp>
         <p:nvSpPr>
-          <p:cNvPr id="4" name="Date Placeholder 3">
-            <a:extLst>
-              <a:ext uri="{FF2B5EF4-FFF2-40B4-BE49-F238E27FC236}">
-                <a16:creationId xmlns:a16="http://schemas.microsoft.com/office/drawing/2014/main" id="{DD614CF6-CFB0-B2B0-1627-A9D3D96DAFE8}"/>
-              </a:ext>
-            </a:extLst>
-          </p:cNvPr>
+          <p:cNvPr id="4" name="Date Placeholder 3"/>
           <p:cNvSpPr>
             <a:spLocks noGrp="1"/>
           </p:cNvSpPr>
@@ -1166,7 +1035,7 @@
           <a:p>
             <a:fld id="{8818E934-49E4-4A07-BEBD-4A62FF5122D9}" type="datetimeFigureOut">
               <a:rPr lang="en-IN" smtClean="0"/>
-              <a:t>01-04-2024</a:t>
+              <a:t>11-04-2024</a:t>
             </a:fld>
             <a:endParaRPr lang="en-IN"/>
           </a:p>
@@ -1174,13 +1043,7 @@
       </p:sp>
       <p:sp>
         <p:nvSpPr>
-          <p:cNvPr id="5" name="Footer Placeholder 4">
-            <a:extLst>
-              <a:ext uri="{FF2B5EF4-FFF2-40B4-BE49-F238E27FC236}">
-                <a16:creationId xmlns:a16="http://schemas.microsoft.com/office/drawing/2014/main" id="{DF2AB024-375A-D228-0373-F4A50716B835}"/>
-              </a:ext>
-            </a:extLst>
-          </p:cNvPr>
+          <p:cNvPr id="5" name="Footer Placeholder 4"/>
           <p:cNvSpPr>
             <a:spLocks noGrp="1"/>
           </p:cNvSpPr>
@@ -1199,13 +1062,7 @@
       </p:sp>
       <p:sp>
         <p:nvSpPr>
-          <p:cNvPr id="6" name="Slide Number Placeholder 5">
-            <a:extLst>
-              <a:ext uri="{FF2B5EF4-FFF2-40B4-BE49-F238E27FC236}">
-                <a16:creationId xmlns:a16="http://schemas.microsoft.com/office/drawing/2014/main" id="{81CD2DE2-6CEB-DBCA-D6C8-54C590F64968}"/>
-              </a:ext>
-            </a:extLst>
-          </p:cNvPr>
+          <p:cNvPr id="6" name="Slide Number Placeholder 5"/>
           <p:cNvSpPr>
             <a:spLocks noGrp="1"/>
           </p:cNvSpPr>
@@ -1229,7 +1086,7 @@
     </p:spTree>
     <p:extLst>
       <p:ext uri="{BB962C8B-B14F-4D97-AF65-F5344CB8AC3E}">
-        <p14:creationId xmlns:p14="http://schemas.microsoft.com/office/powerpoint/2010/main" val="81322419"/>
+        <p14:creationId xmlns:p14="http://schemas.microsoft.com/office/powerpoint/2010/main" val="1649709670"/>
       </p:ext>
     </p:extLst>
   </p:cSld>
@@ -1258,13 +1115,7 @@
       </p:grpSpPr>
       <p:sp>
         <p:nvSpPr>
-          <p:cNvPr id="2" name="Title 1">
-            <a:extLst>
-              <a:ext uri="{FF2B5EF4-FFF2-40B4-BE49-F238E27FC236}">
-                <a16:creationId xmlns:a16="http://schemas.microsoft.com/office/drawing/2014/main" id="{CD6E69D1-BE2B-D199-4E4E-F16EE83383D8}"/>
-              </a:ext>
-            </a:extLst>
-          </p:cNvPr>
+          <p:cNvPr id="2" name="Title 1"/>
           <p:cNvSpPr>
             <a:spLocks noGrp="1"/>
           </p:cNvSpPr>
@@ -1281,19 +1132,13 @@
               <a:rPr lang="en-US"/>
               <a:t>Click to edit Master title style</a:t>
             </a:r>
-            <a:endParaRPr lang="en-IN"/>
-          </a:p>
-        </p:txBody>
-      </p:sp>
-      <p:sp>
-        <p:nvSpPr>
-          <p:cNvPr id="3" name="Content Placeholder 2">
-            <a:extLst>
-              <a:ext uri="{FF2B5EF4-FFF2-40B4-BE49-F238E27FC236}">
-                <a16:creationId xmlns:a16="http://schemas.microsoft.com/office/drawing/2014/main" id="{755DE9F8-3D63-1A56-6FA7-ECA0AFAD8C29}"/>
-              </a:ext>
-            </a:extLst>
-          </p:cNvPr>
+            <a:endParaRPr lang="en-US" dirty="0"/>
+          </a:p>
+        </p:txBody>
+      </p:sp>
+      <p:sp>
+        <p:nvSpPr>
+          <p:cNvPr id="3" name="Content Placeholder 2"/>
           <p:cNvSpPr>
             <a:spLocks noGrp="1"/>
           </p:cNvSpPr>
@@ -1344,19 +1189,13 @@
               <a:rPr lang="en-US"/>
               <a:t>Fifth level</a:t>
             </a:r>
-            <a:endParaRPr lang="en-IN"/>
-          </a:p>
-        </p:txBody>
-      </p:sp>
-      <p:sp>
-        <p:nvSpPr>
-          <p:cNvPr id="4" name="Content Placeholder 3">
-            <a:extLst>
-              <a:ext uri="{FF2B5EF4-FFF2-40B4-BE49-F238E27FC236}">
-                <a16:creationId xmlns:a16="http://schemas.microsoft.com/office/drawing/2014/main" id="{54C85FFC-BF67-7A67-A90E-A39DDD7AD964}"/>
-              </a:ext>
-            </a:extLst>
-          </p:cNvPr>
+            <a:endParaRPr lang="en-US" dirty="0"/>
+          </a:p>
+        </p:txBody>
+      </p:sp>
+      <p:sp>
+        <p:nvSpPr>
+          <p:cNvPr id="4" name="Content Placeholder 3"/>
           <p:cNvSpPr>
             <a:spLocks noGrp="1"/>
           </p:cNvSpPr>
@@ -1407,19 +1246,13 @@
               <a:rPr lang="en-US"/>
               <a:t>Fifth level</a:t>
             </a:r>
-            <a:endParaRPr lang="en-IN"/>
-          </a:p>
-        </p:txBody>
-      </p:sp>
-      <p:sp>
-        <p:nvSpPr>
-          <p:cNvPr id="5" name="Date Placeholder 4">
-            <a:extLst>
-              <a:ext uri="{FF2B5EF4-FFF2-40B4-BE49-F238E27FC236}">
-                <a16:creationId xmlns:a16="http://schemas.microsoft.com/office/drawing/2014/main" id="{7C23E984-B559-B89E-DB1C-FDD66BCF0FA3}"/>
-              </a:ext>
-            </a:extLst>
-          </p:cNvPr>
+            <a:endParaRPr lang="en-US" dirty="0"/>
+          </a:p>
+        </p:txBody>
+      </p:sp>
+      <p:sp>
+        <p:nvSpPr>
+          <p:cNvPr id="5" name="Date Placeholder 4"/>
           <p:cNvSpPr>
             <a:spLocks noGrp="1"/>
           </p:cNvSpPr>
@@ -1434,7 +1267,7 @@
           <a:p>
             <a:fld id="{8818E934-49E4-4A07-BEBD-4A62FF5122D9}" type="datetimeFigureOut">
               <a:rPr lang="en-IN" smtClean="0"/>
-              <a:t>01-04-2024</a:t>
+              <a:t>11-04-2024</a:t>
             </a:fld>
             <a:endParaRPr lang="en-IN"/>
           </a:p>
@@ -1442,13 +1275,7 @@
       </p:sp>
       <p:sp>
         <p:nvSpPr>
-          <p:cNvPr id="6" name="Footer Placeholder 5">
-            <a:extLst>
-              <a:ext uri="{FF2B5EF4-FFF2-40B4-BE49-F238E27FC236}">
-                <a16:creationId xmlns:a16="http://schemas.microsoft.com/office/drawing/2014/main" id="{35AE7BF8-1D0A-0F63-FD8D-2F2FCA470E7B}"/>
-              </a:ext>
-            </a:extLst>
-          </p:cNvPr>
+          <p:cNvPr id="6" name="Footer Placeholder 5"/>
           <p:cNvSpPr>
             <a:spLocks noGrp="1"/>
           </p:cNvSpPr>
@@ -1467,13 +1294,7 @@
       </p:sp>
       <p:sp>
         <p:nvSpPr>
-          <p:cNvPr id="7" name="Slide Number Placeholder 6">
-            <a:extLst>
-              <a:ext uri="{FF2B5EF4-FFF2-40B4-BE49-F238E27FC236}">
-                <a16:creationId xmlns:a16="http://schemas.microsoft.com/office/drawing/2014/main" id="{8F0B47B0-FCBD-DF2A-ACB1-8CDB54FB7EA3}"/>
-              </a:ext>
-            </a:extLst>
-          </p:cNvPr>
+          <p:cNvPr id="7" name="Slide Number Placeholder 6"/>
           <p:cNvSpPr>
             <a:spLocks noGrp="1"/>
           </p:cNvSpPr>
@@ -1497,7 +1318,7 @@
     </p:spTree>
     <p:extLst>
       <p:ext uri="{BB962C8B-B14F-4D97-AF65-F5344CB8AC3E}">
-        <p14:creationId xmlns:p14="http://schemas.microsoft.com/office/powerpoint/2010/main" val="2508568558"/>
+        <p14:creationId xmlns:p14="http://schemas.microsoft.com/office/powerpoint/2010/main" val="1144829402"/>
       </p:ext>
     </p:extLst>
   </p:cSld>
@@ -1526,13 +1347,7 @@
       </p:grpSpPr>
       <p:sp>
         <p:nvSpPr>
-          <p:cNvPr id="2" name="Title 1">
-            <a:extLst>
-              <a:ext uri="{FF2B5EF4-FFF2-40B4-BE49-F238E27FC236}">
-                <a16:creationId xmlns:a16="http://schemas.microsoft.com/office/drawing/2014/main" id="{EFB8BEB5-8F99-5729-D710-32EB8C5ABD80}"/>
-              </a:ext>
-            </a:extLst>
-          </p:cNvPr>
+          <p:cNvPr id="2" name="Title 1"/>
           <p:cNvSpPr>
             <a:spLocks noGrp="1"/>
           </p:cNvSpPr>
@@ -1554,19 +1369,13 @@
               <a:rPr lang="en-US"/>
               <a:t>Click to edit Master title style</a:t>
             </a:r>
-            <a:endParaRPr lang="en-IN"/>
-          </a:p>
-        </p:txBody>
-      </p:sp>
-      <p:sp>
-        <p:nvSpPr>
-          <p:cNvPr id="3" name="Text Placeholder 2">
-            <a:extLst>
-              <a:ext uri="{FF2B5EF4-FFF2-40B4-BE49-F238E27FC236}">
-                <a16:creationId xmlns:a16="http://schemas.microsoft.com/office/drawing/2014/main" id="{91C2D72D-6233-D851-F836-CED26BCBF95B}"/>
-              </a:ext>
-            </a:extLst>
-          </p:cNvPr>
+            <a:endParaRPr lang="en-US" dirty="0"/>
+          </a:p>
+        </p:txBody>
+      </p:sp>
+      <p:sp>
+        <p:nvSpPr>
+          <p:cNvPr id="3" name="Text Placeholder 2"/>
           <p:cNvSpPr>
             <a:spLocks noGrp="1"/>
           </p:cNvSpPr>
@@ -1631,13 +1440,7 @@
       </p:sp>
       <p:sp>
         <p:nvSpPr>
-          <p:cNvPr id="4" name="Content Placeholder 3">
-            <a:extLst>
-              <a:ext uri="{FF2B5EF4-FFF2-40B4-BE49-F238E27FC236}">
-                <a16:creationId xmlns:a16="http://schemas.microsoft.com/office/drawing/2014/main" id="{4B60632C-74EC-DC05-7B70-DC75177A7F01}"/>
-              </a:ext>
-            </a:extLst>
-          </p:cNvPr>
+          <p:cNvPr id="4" name="Content Placeholder 3"/>
           <p:cNvSpPr>
             <a:spLocks noGrp="1"/>
           </p:cNvSpPr>
@@ -1688,19 +1491,13 @@
               <a:rPr lang="en-US"/>
               <a:t>Fifth level</a:t>
             </a:r>
-            <a:endParaRPr lang="en-IN"/>
-          </a:p>
-        </p:txBody>
-      </p:sp>
-      <p:sp>
-        <p:nvSpPr>
-          <p:cNvPr id="5" name="Text Placeholder 4">
-            <a:extLst>
-              <a:ext uri="{FF2B5EF4-FFF2-40B4-BE49-F238E27FC236}">
-                <a16:creationId xmlns:a16="http://schemas.microsoft.com/office/drawing/2014/main" id="{670F3DDD-473E-31AF-FF8C-BDF2563D91DF}"/>
-              </a:ext>
-            </a:extLst>
-          </p:cNvPr>
+            <a:endParaRPr lang="en-US" dirty="0"/>
+          </a:p>
+        </p:txBody>
+      </p:sp>
+      <p:sp>
+        <p:nvSpPr>
+          <p:cNvPr id="5" name="Text Placeholder 4"/>
           <p:cNvSpPr>
             <a:spLocks noGrp="1"/>
           </p:cNvSpPr>
@@ -1765,13 +1562,7 @@
       </p:sp>
       <p:sp>
         <p:nvSpPr>
-          <p:cNvPr id="6" name="Content Placeholder 5">
-            <a:extLst>
-              <a:ext uri="{FF2B5EF4-FFF2-40B4-BE49-F238E27FC236}">
-                <a16:creationId xmlns:a16="http://schemas.microsoft.com/office/drawing/2014/main" id="{AA9D0EB9-2624-BC7A-474A-D69790983F84}"/>
-              </a:ext>
-            </a:extLst>
-          </p:cNvPr>
+          <p:cNvPr id="6" name="Content Placeholder 5"/>
           <p:cNvSpPr>
             <a:spLocks noGrp="1"/>
           </p:cNvSpPr>
@@ -1822,19 +1613,13 @@
               <a:rPr lang="en-US"/>
               <a:t>Fifth level</a:t>
             </a:r>
-            <a:endParaRPr lang="en-IN"/>
-          </a:p>
-        </p:txBody>
-      </p:sp>
-      <p:sp>
-        <p:nvSpPr>
-          <p:cNvPr id="7" name="Date Placeholder 6">
-            <a:extLst>
-              <a:ext uri="{FF2B5EF4-FFF2-40B4-BE49-F238E27FC236}">
-                <a16:creationId xmlns:a16="http://schemas.microsoft.com/office/drawing/2014/main" id="{2E8B9117-74FA-28B8-9262-D05ABD7FD94A}"/>
-              </a:ext>
-            </a:extLst>
-          </p:cNvPr>
+            <a:endParaRPr lang="en-US" dirty="0"/>
+          </a:p>
+        </p:txBody>
+      </p:sp>
+      <p:sp>
+        <p:nvSpPr>
+          <p:cNvPr id="7" name="Date Placeholder 6"/>
           <p:cNvSpPr>
             <a:spLocks noGrp="1"/>
           </p:cNvSpPr>
@@ -1849,7 +1634,7 @@
           <a:p>
             <a:fld id="{8818E934-49E4-4A07-BEBD-4A62FF5122D9}" type="datetimeFigureOut">
               <a:rPr lang="en-IN" smtClean="0"/>
-              <a:t>01-04-2024</a:t>
+              <a:t>11-04-2024</a:t>
             </a:fld>
             <a:endParaRPr lang="en-IN"/>
           </a:p>
@@ -1857,13 +1642,7 @@
       </p:sp>
       <p:sp>
         <p:nvSpPr>
-          <p:cNvPr id="8" name="Footer Placeholder 7">
-            <a:extLst>
-              <a:ext uri="{FF2B5EF4-FFF2-40B4-BE49-F238E27FC236}">
-                <a16:creationId xmlns:a16="http://schemas.microsoft.com/office/drawing/2014/main" id="{7C823164-99D3-ACC3-746A-8978670EC7A4}"/>
-              </a:ext>
-            </a:extLst>
-          </p:cNvPr>
+          <p:cNvPr id="8" name="Footer Placeholder 7"/>
           <p:cNvSpPr>
             <a:spLocks noGrp="1"/>
           </p:cNvSpPr>
@@ -1882,13 +1661,7 @@
       </p:sp>
       <p:sp>
         <p:nvSpPr>
-          <p:cNvPr id="9" name="Slide Number Placeholder 8">
-            <a:extLst>
-              <a:ext uri="{FF2B5EF4-FFF2-40B4-BE49-F238E27FC236}">
-                <a16:creationId xmlns:a16="http://schemas.microsoft.com/office/drawing/2014/main" id="{BCBCAC57-E900-320B-8E43-619762EAEF0B}"/>
-              </a:ext>
-            </a:extLst>
-          </p:cNvPr>
+          <p:cNvPr id="9" name="Slide Number Placeholder 8"/>
           <p:cNvSpPr>
             <a:spLocks noGrp="1"/>
           </p:cNvSpPr>
@@ -1912,7 +1685,7 @@
     </p:spTree>
     <p:extLst>
       <p:ext uri="{BB962C8B-B14F-4D97-AF65-F5344CB8AC3E}">
-        <p14:creationId xmlns:p14="http://schemas.microsoft.com/office/powerpoint/2010/main" val="2716532025"/>
+        <p14:creationId xmlns:p14="http://schemas.microsoft.com/office/powerpoint/2010/main" val="3767466510"/>
       </p:ext>
     </p:extLst>
   </p:cSld>
@@ -1941,13 +1714,7 @@
       </p:grpSpPr>
       <p:sp>
         <p:nvSpPr>
-          <p:cNvPr id="2" name="Title 1">
-            <a:extLst>
-              <a:ext uri="{FF2B5EF4-FFF2-40B4-BE49-F238E27FC236}">
-                <a16:creationId xmlns:a16="http://schemas.microsoft.com/office/drawing/2014/main" id="{23EB135B-F57F-2AE4-294E-105CD044B10F}"/>
-              </a:ext>
-            </a:extLst>
-          </p:cNvPr>
+          <p:cNvPr id="2" name="Title 1"/>
           <p:cNvSpPr>
             <a:spLocks noGrp="1"/>
           </p:cNvSpPr>
@@ -1964,19 +1731,13 @@
               <a:rPr lang="en-US"/>
               <a:t>Click to edit Master title style</a:t>
             </a:r>
-            <a:endParaRPr lang="en-IN"/>
-          </a:p>
-        </p:txBody>
-      </p:sp>
-      <p:sp>
-        <p:nvSpPr>
-          <p:cNvPr id="3" name="Date Placeholder 2">
-            <a:extLst>
-              <a:ext uri="{FF2B5EF4-FFF2-40B4-BE49-F238E27FC236}">
-                <a16:creationId xmlns:a16="http://schemas.microsoft.com/office/drawing/2014/main" id="{A9AE536B-B089-A82E-7F57-801D5824A4EE}"/>
-              </a:ext>
-            </a:extLst>
-          </p:cNvPr>
+            <a:endParaRPr lang="en-US" dirty="0"/>
+          </a:p>
+        </p:txBody>
+      </p:sp>
+      <p:sp>
+        <p:nvSpPr>
+          <p:cNvPr id="3" name="Date Placeholder 2"/>
           <p:cNvSpPr>
             <a:spLocks noGrp="1"/>
           </p:cNvSpPr>
@@ -1991,7 +1752,7 @@
           <a:p>
             <a:fld id="{8818E934-49E4-4A07-BEBD-4A62FF5122D9}" type="datetimeFigureOut">
               <a:rPr lang="en-IN" smtClean="0"/>
-              <a:t>01-04-2024</a:t>
+              <a:t>11-04-2024</a:t>
             </a:fld>
             <a:endParaRPr lang="en-IN"/>
           </a:p>
@@ -1999,13 +1760,7 @@
       </p:sp>
       <p:sp>
         <p:nvSpPr>
-          <p:cNvPr id="4" name="Footer Placeholder 3">
-            <a:extLst>
-              <a:ext uri="{FF2B5EF4-FFF2-40B4-BE49-F238E27FC236}">
-                <a16:creationId xmlns:a16="http://schemas.microsoft.com/office/drawing/2014/main" id="{DDE8BBCA-7A03-AEF2-8B2D-FAD1A256FB0A}"/>
-              </a:ext>
-            </a:extLst>
-          </p:cNvPr>
+          <p:cNvPr id="4" name="Footer Placeholder 3"/>
           <p:cNvSpPr>
             <a:spLocks noGrp="1"/>
           </p:cNvSpPr>
@@ -2024,13 +1779,7 @@
       </p:sp>
       <p:sp>
         <p:nvSpPr>
-          <p:cNvPr id="5" name="Slide Number Placeholder 4">
-            <a:extLst>
-              <a:ext uri="{FF2B5EF4-FFF2-40B4-BE49-F238E27FC236}">
-                <a16:creationId xmlns:a16="http://schemas.microsoft.com/office/drawing/2014/main" id="{10D983D9-BD1F-7D89-D6A3-9B978C1D37E7}"/>
-              </a:ext>
-            </a:extLst>
-          </p:cNvPr>
+          <p:cNvPr id="5" name="Slide Number Placeholder 4"/>
           <p:cNvSpPr>
             <a:spLocks noGrp="1"/>
           </p:cNvSpPr>
@@ -2054,7 +1803,7 @@
     </p:spTree>
     <p:extLst>
       <p:ext uri="{BB962C8B-B14F-4D97-AF65-F5344CB8AC3E}">
-        <p14:creationId xmlns:p14="http://schemas.microsoft.com/office/powerpoint/2010/main" val="559252000"/>
+        <p14:creationId xmlns:p14="http://schemas.microsoft.com/office/powerpoint/2010/main" val="3905435297"/>
       </p:ext>
     </p:extLst>
   </p:cSld>
@@ -2083,13 +1832,7 @@
       </p:grpSpPr>
       <p:sp>
         <p:nvSpPr>
-          <p:cNvPr id="2" name="Date Placeholder 1">
-            <a:extLst>
-              <a:ext uri="{FF2B5EF4-FFF2-40B4-BE49-F238E27FC236}">
-                <a16:creationId xmlns:a16="http://schemas.microsoft.com/office/drawing/2014/main" id="{397138D4-7E6A-5A1E-0B21-E573EA838220}"/>
-              </a:ext>
-            </a:extLst>
-          </p:cNvPr>
+          <p:cNvPr id="2" name="Date Placeholder 1"/>
           <p:cNvSpPr>
             <a:spLocks noGrp="1"/>
           </p:cNvSpPr>
@@ -2104,7 +1847,7 @@
           <a:p>
             <a:fld id="{8818E934-49E4-4A07-BEBD-4A62FF5122D9}" type="datetimeFigureOut">
               <a:rPr lang="en-IN" smtClean="0"/>
-              <a:t>01-04-2024</a:t>
+              <a:t>11-04-2024</a:t>
             </a:fld>
             <a:endParaRPr lang="en-IN"/>
           </a:p>
@@ -2112,13 +1855,7 @@
       </p:sp>
       <p:sp>
         <p:nvSpPr>
-          <p:cNvPr id="3" name="Footer Placeholder 2">
-            <a:extLst>
-              <a:ext uri="{FF2B5EF4-FFF2-40B4-BE49-F238E27FC236}">
-                <a16:creationId xmlns:a16="http://schemas.microsoft.com/office/drawing/2014/main" id="{E2CDE797-8E76-69AD-84AC-9C0151999801}"/>
-              </a:ext>
-            </a:extLst>
-          </p:cNvPr>
+          <p:cNvPr id="3" name="Footer Placeholder 2"/>
           <p:cNvSpPr>
             <a:spLocks noGrp="1"/>
           </p:cNvSpPr>
@@ -2137,13 +1874,7 @@
       </p:sp>
       <p:sp>
         <p:nvSpPr>
-          <p:cNvPr id="4" name="Slide Number Placeholder 3">
-            <a:extLst>
-              <a:ext uri="{FF2B5EF4-FFF2-40B4-BE49-F238E27FC236}">
-                <a16:creationId xmlns:a16="http://schemas.microsoft.com/office/drawing/2014/main" id="{3CA7F7AD-3203-23BA-2B7C-FB51C904FC82}"/>
-              </a:ext>
-            </a:extLst>
-          </p:cNvPr>
+          <p:cNvPr id="4" name="Slide Number Placeholder 3"/>
           <p:cNvSpPr>
             <a:spLocks noGrp="1"/>
           </p:cNvSpPr>
@@ -2167,7 +1898,7 @@
     </p:spTree>
     <p:extLst>
       <p:ext uri="{BB962C8B-B14F-4D97-AF65-F5344CB8AC3E}">
-        <p14:creationId xmlns:p14="http://schemas.microsoft.com/office/powerpoint/2010/main" val="403539404"/>
+        <p14:creationId xmlns:p14="http://schemas.microsoft.com/office/powerpoint/2010/main" val="2488950317"/>
       </p:ext>
     </p:extLst>
   </p:cSld>
@@ -2196,13 +1927,7 @@
       </p:grpSpPr>
       <p:sp>
         <p:nvSpPr>
-          <p:cNvPr id="2" name="Title 1">
-            <a:extLst>
-              <a:ext uri="{FF2B5EF4-FFF2-40B4-BE49-F238E27FC236}">
-                <a16:creationId xmlns:a16="http://schemas.microsoft.com/office/drawing/2014/main" id="{35B3984A-D825-652A-3E29-0C9AC3FA47E3}"/>
-              </a:ext>
-            </a:extLst>
-          </p:cNvPr>
+          <p:cNvPr id="2" name="Title 1"/>
           <p:cNvSpPr>
             <a:spLocks noGrp="1"/>
           </p:cNvSpPr>
@@ -2228,19 +1953,13 @@
               <a:rPr lang="en-US"/>
               <a:t>Click to edit Master title style</a:t>
             </a:r>
-            <a:endParaRPr lang="en-IN"/>
-          </a:p>
-        </p:txBody>
-      </p:sp>
-      <p:sp>
-        <p:nvSpPr>
-          <p:cNvPr id="3" name="Content Placeholder 2">
-            <a:extLst>
-              <a:ext uri="{FF2B5EF4-FFF2-40B4-BE49-F238E27FC236}">
-                <a16:creationId xmlns:a16="http://schemas.microsoft.com/office/drawing/2014/main" id="{4FDE630E-05CE-80B6-0206-AB23A610C0F3}"/>
-              </a:ext>
-            </a:extLst>
-          </p:cNvPr>
+            <a:endParaRPr lang="en-US" dirty="0"/>
+          </a:p>
+        </p:txBody>
+      </p:sp>
+      <p:sp>
+        <p:nvSpPr>
+          <p:cNvPr id="3" name="Content Placeholder 2"/>
           <p:cNvSpPr>
             <a:spLocks noGrp="1"/>
           </p:cNvSpPr>
@@ -2319,19 +2038,13 @@
               <a:rPr lang="en-US"/>
               <a:t>Fifth level</a:t>
             </a:r>
-            <a:endParaRPr lang="en-IN"/>
-          </a:p>
-        </p:txBody>
-      </p:sp>
-      <p:sp>
-        <p:nvSpPr>
-          <p:cNvPr id="4" name="Text Placeholder 3">
-            <a:extLst>
-              <a:ext uri="{FF2B5EF4-FFF2-40B4-BE49-F238E27FC236}">
-                <a16:creationId xmlns:a16="http://schemas.microsoft.com/office/drawing/2014/main" id="{3C6061EC-8808-8F78-277A-8C320410EF78}"/>
-              </a:ext>
-            </a:extLst>
-          </p:cNvPr>
+            <a:endParaRPr lang="en-US" dirty="0"/>
+          </a:p>
+        </p:txBody>
+      </p:sp>
+      <p:sp>
+        <p:nvSpPr>
+          <p:cNvPr id="4" name="Text Placeholder 3"/>
           <p:cNvSpPr>
             <a:spLocks noGrp="1"/>
           </p:cNvSpPr>
@@ -2396,13 +2109,7 @@
       </p:sp>
       <p:sp>
         <p:nvSpPr>
-          <p:cNvPr id="5" name="Date Placeholder 4">
-            <a:extLst>
-              <a:ext uri="{FF2B5EF4-FFF2-40B4-BE49-F238E27FC236}">
-                <a16:creationId xmlns:a16="http://schemas.microsoft.com/office/drawing/2014/main" id="{DF73626E-FC85-F738-DCA7-1952C1FC13FD}"/>
-              </a:ext>
-            </a:extLst>
-          </p:cNvPr>
+          <p:cNvPr id="5" name="Date Placeholder 4"/>
           <p:cNvSpPr>
             <a:spLocks noGrp="1"/>
           </p:cNvSpPr>
@@ -2417,7 +2124,7 @@
           <a:p>
             <a:fld id="{8818E934-49E4-4A07-BEBD-4A62FF5122D9}" type="datetimeFigureOut">
               <a:rPr lang="en-IN" smtClean="0"/>
-              <a:t>01-04-2024</a:t>
+              <a:t>11-04-2024</a:t>
             </a:fld>
             <a:endParaRPr lang="en-IN"/>
           </a:p>
@@ -2425,13 +2132,7 @@
       </p:sp>
       <p:sp>
         <p:nvSpPr>
-          <p:cNvPr id="6" name="Footer Placeholder 5">
-            <a:extLst>
-              <a:ext uri="{FF2B5EF4-FFF2-40B4-BE49-F238E27FC236}">
-                <a16:creationId xmlns:a16="http://schemas.microsoft.com/office/drawing/2014/main" id="{88914DB1-FAEE-F7FB-610D-2476B237115E}"/>
-              </a:ext>
-            </a:extLst>
-          </p:cNvPr>
+          <p:cNvPr id="6" name="Footer Placeholder 5"/>
           <p:cNvSpPr>
             <a:spLocks noGrp="1"/>
           </p:cNvSpPr>
@@ -2450,13 +2151,7 @@
       </p:sp>
       <p:sp>
         <p:nvSpPr>
-          <p:cNvPr id="7" name="Slide Number Placeholder 6">
-            <a:extLst>
-              <a:ext uri="{FF2B5EF4-FFF2-40B4-BE49-F238E27FC236}">
-                <a16:creationId xmlns:a16="http://schemas.microsoft.com/office/drawing/2014/main" id="{8C741EED-A6C8-B24A-E822-33D2A28FFF3C}"/>
-              </a:ext>
-            </a:extLst>
-          </p:cNvPr>
+          <p:cNvPr id="7" name="Slide Number Placeholder 6"/>
           <p:cNvSpPr>
             <a:spLocks noGrp="1"/>
           </p:cNvSpPr>
@@ -2480,7 +2175,7 @@
     </p:spTree>
     <p:extLst>
       <p:ext uri="{BB962C8B-B14F-4D97-AF65-F5344CB8AC3E}">
-        <p14:creationId xmlns:p14="http://schemas.microsoft.com/office/powerpoint/2010/main" val="35105628"/>
+        <p14:creationId xmlns:p14="http://schemas.microsoft.com/office/powerpoint/2010/main" val="719487196"/>
       </p:ext>
     </p:extLst>
   </p:cSld>
@@ -2509,13 +2204,7 @@
       </p:grpSpPr>
       <p:sp>
         <p:nvSpPr>
-          <p:cNvPr id="2" name="Title 1">
-            <a:extLst>
-              <a:ext uri="{FF2B5EF4-FFF2-40B4-BE49-F238E27FC236}">
-                <a16:creationId xmlns:a16="http://schemas.microsoft.com/office/drawing/2014/main" id="{62384A70-1053-D50E-8BC2-1A1B375C7CAD}"/>
-              </a:ext>
-            </a:extLst>
-          </p:cNvPr>
+          <p:cNvPr id="2" name="Title 1"/>
           <p:cNvSpPr>
             <a:spLocks noGrp="1"/>
           </p:cNvSpPr>
@@ -2541,21 +2230,15 @@
               <a:rPr lang="en-US"/>
               <a:t>Click to edit Master title style</a:t>
             </a:r>
-            <a:endParaRPr lang="en-IN"/>
-          </a:p>
-        </p:txBody>
-      </p:sp>
-      <p:sp>
-        <p:nvSpPr>
-          <p:cNvPr id="3" name="Picture Placeholder 2">
-            <a:extLst>
-              <a:ext uri="{FF2B5EF4-FFF2-40B4-BE49-F238E27FC236}">
-                <a16:creationId xmlns:a16="http://schemas.microsoft.com/office/drawing/2014/main" id="{0767D3AF-A056-AF39-D0BA-404E041923E2}"/>
-              </a:ext>
-            </a:extLst>
-          </p:cNvPr>
+            <a:endParaRPr lang="en-US" dirty="0"/>
+          </a:p>
+        </p:txBody>
+      </p:sp>
+      <p:sp>
+        <p:nvSpPr>
+          <p:cNvPr id="3" name="Picture Placeholder 2"/>
           <p:cNvSpPr>
-            <a:spLocks noGrp="1"/>
+            <a:spLocks noGrp="1" noChangeAspect="1"/>
           </p:cNvSpPr>
           <p:nvPr>
             <p:ph type="pic" idx="1"/>
@@ -2568,7 +2251,7 @@
           </a:xfrm>
         </p:spPr>
         <p:txBody>
-          <a:bodyPr/>
+          <a:bodyPr anchor="t"/>
           <a:lstStyle>
             <a:lvl1pPr marL="0" indent="0">
               <a:buNone/>
@@ -2608,19 +2291,17 @@
             </a:lvl9pPr>
           </a:lstStyle>
           <a:p>
-            <a:endParaRPr lang="en-IN"/>
-          </a:p>
-        </p:txBody>
-      </p:sp>
-      <p:sp>
-        <p:nvSpPr>
-          <p:cNvPr id="4" name="Text Placeholder 3">
-            <a:extLst>
-              <a:ext uri="{FF2B5EF4-FFF2-40B4-BE49-F238E27FC236}">
-                <a16:creationId xmlns:a16="http://schemas.microsoft.com/office/drawing/2014/main" id="{113A982A-F020-D842-2424-9F21C5E5D3B7}"/>
-              </a:ext>
-            </a:extLst>
-          </p:cNvPr>
+            <a:r>
+              <a:rPr lang="en-US"/>
+              <a:t>Click icon to add picture</a:t>
+            </a:r>
+            <a:endParaRPr lang="en-US" dirty="0"/>
+          </a:p>
+        </p:txBody>
+      </p:sp>
+      <p:sp>
+        <p:nvSpPr>
+          <p:cNvPr id="4" name="Text Placeholder 3"/>
           <p:cNvSpPr>
             <a:spLocks noGrp="1"/>
           </p:cNvSpPr>
@@ -2685,13 +2366,7 @@
       </p:sp>
       <p:sp>
         <p:nvSpPr>
-          <p:cNvPr id="5" name="Date Placeholder 4">
-            <a:extLst>
-              <a:ext uri="{FF2B5EF4-FFF2-40B4-BE49-F238E27FC236}">
-                <a16:creationId xmlns:a16="http://schemas.microsoft.com/office/drawing/2014/main" id="{F98EBC60-6212-23BF-732D-3F5E7159FC42}"/>
-              </a:ext>
-            </a:extLst>
-          </p:cNvPr>
+          <p:cNvPr id="5" name="Date Placeholder 4"/>
           <p:cNvSpPr>
             <a:spLocks noGrp="1"/>
           </p:cNvSpPr>
@@ -2706,7 +2381,7 @@
           <a:p>
             <a:fld id="{8818E934-49E4-4A07-BEBD-4A62FF5122D9}" type="datetimeFigureOut">
               <a:rPr lang="en-IN" smtClean="0"/>
-              <a:t>01-04-2024</a:t>
+              <a:t>11-04-2024</a:t>
             </a:fld>
             <a:endParaRPr lang="en-IN"/>
           </a:p>
@@ -2714,13 +2389,7 @@
       </p:sp>
       <p:sp>
         <p:nvSpPr>
-          <p:cNvPr id="6" name="Footer Placeholder 5">
-            <a:extLst>
-              <a:ext uri="{FF2B5EF4-FFF2-40B4-BE49-F238E27FC236}">
-                <a16:creationId xmlns:a16="http://schemas.microsoft.com/office/drawing/2014/main" id="{6DA98022-8569-7001-5D9B-8BB8A83888E8}"/>
-              </a:ext>
-            </a:extLst>
-          </p:cNvPr>
+          <p:cNvPr id="6" name="Footer Placeholder 5"/>
           <p:cNvSpPr>
             <a:spLocks noGrp="1"/>
           </p:cNvSpPr>
@@ -2739,13 +2408,7 @@
       </p:sp>
       <p:sp>
         <p:nvSpPr>
-          <p:cNvPr id="7" name="Slide Number Placeholder 6">
-            <a:extLst>
-              <a:ext uri="{FF2B5EF4-FFF2-40B4-BE49-F238E27FC236}">
-                <a16:creationId xmlns:a16="http://schemas.microsoft.com/office/drawing/2014/main" id="{4AAEC175-1636-7B31-7DBA-E07E131D4665}"/>
-              </a:ext>
-            </a:extLst>
-          </p:cNvPr>
+          <p:cNvPr id="7" name="Slide Number Placeholder 6"/>
           <p:cNvSpPr>
             <a:spLocks noGrp="1"/>
           </p:cNvSpPr>
@@ -2769,7 +2432,7 @@
     </p:spTree>
     <p:extLst>
       <p:ext uri="{BB962C8B-B14F-4D97-AF65-F5344CB8AC3E}">
-        <p14:creationId xmlns:p14="http://schemas.microsoft.com/office/powerpoint/2010/main" val="3494595598"/>
+        <p14:creationId xmlns:p14="http://schemas.microsoft.com/office/powerpoint/2010/main" val="1457337077"/>
       </p:ext>
     </p:extLst>
   </p:cSld>
@@ -2803,13 +2466,7 @@
       </p:grpSpPr>
       <p:sp>
         <p:nvSpPr>
-          <p:cNvPr id="2" name="Title Placeholder 1">
-            <a:extLst>
-              <a:ext uri="{FF2B5EF4-FFF2-40B4-BE49-F238E27FC236}">
-                <a16:creationId xmlns:a16="http://schemas.microsoft.com/office/drawing/2014/main" id="{059D94DF-76C2-70AF-B74A-251610905B13}"/>
-              </a:ext>
-            </a:extLst>
-          </p:cNvPr>
+          <p:cNvPr id="2" name="Title Placeholder 1"/>
           <p:cNvSpPr>
             <a:spLocks noGrp="1"/>
           </p:cNvSpPr>
@@ -2836,19 +2493,13 @@
               <a:rPr lang="en-US"/>
               <a:t>Click to edit Master title style</a:t>
             </a:r>
-            <a:endParaRPr lang="en-IN"/>
-          </a:p>
-        </p:txBody>
-      </p:sp>
-      <p:sp>
-        <p:nvSpPr>
-          <p:cNvPr id="3" name="Text Placeholder 2">
-            <a:extLst>
-              <a:ext uri="{FF2B5EF4-FFF2-40B4-BE49-F238E27FC236}">
-                <a16:creationId xmlns:a16="http://schemas.microsoft.com/office/drawing/2014/main" id="{2F934200-1C98-41AD-BA60-9DEA2E51BAB5}"/>
-              </a:ext>
-            </a:extLst>
-          </p:cNvPr>
+            <a:endParaRPr lang="en-US" dirty="0"/>
+          </a:p>
+        </p:txBody>
+      </p:sp>
+      <p:sp>
+        <p:nvSpPr>
+          <p:cNvPr id="3" name="Text Placeholder 2"/>
           <p:cNvSpPr>
             <a:spLocks noGrp="1"/>
           </p:cNvSpPr>
@@ -2904,19 +2555,13 @@
               <a:rPr lang="en-US"/>
               <a:t>Fifth level</a:t>
             </a:r>
-            <a:endParaRPr lang="en-IN"/>
-          </a:p>
-        </p:txBody>
-      </p:sp>
-      <p:sp>
-        <p:nvSpPr>
-          <p:cNvPr id="4" name="Date Placeholder 3">
-            <a:extLst>
-              <a:ext uri="{FF2B5EF4-FFF2-40B4-BE49-F238E27FC236}">
-                <a16:creationId xmlns:a16="http://schemas.microsoft.com/office/drawing/2014/main" id="{30E16A25-A035-D1C6-2E6F-7C2E12075A60}"/>
-              </a:ext>
-            </a:extLst>
-          </p:cNvPr>
+            <a:endParaRPr lang="en-US" dirty="0"/>
+          </a:p>
+        </p:txBody>
+      </p:sp>
+      <p:sp>
+        <p:nvSpPr>
+          <p:cNvPr id="4" name="Date Placeholder 3"/>
           <p:cNvSpPr>
             <a:spLocks noGrp="1"/>
           </p:cNvSpPr>
@@ -2949,7 +2594,7 @@
           <a:p>
             <a:fld id="{8818E934-49E4-4A07-BEBD-4A62FF5122D9}" type="datetimeFigureOut">
               <a:rPr lang="en-IN" smtClean="0"/>
-              <a:t>01-04-2024</a:t>
+              <a:t>11-04-2024</a:t>
             </a:fld>
             <a:endParaRPr lang="en-IN"/>
           </a:p>
@@ -2957,13 +2602,7 @@
       </p:sp>
       <p:sp>
         <p:nvSpPr>
-          <p:cNvPr id="5" name="Footer Placeholder 4">
-            <a:extLst>
-              <a:ext uri="{FF2B5EF4-FFF2-40B4-BE49-F238E27FC236}">
-                <a16:creationId xmlns:a16="http://schemas.microsoft.com/office/drawing/2014/main" id="{95E34128-79DE-B447-3786-870271269D52}"/>
-              </a:ext>
-            </a:extLst>
-          </p:cNvPr>
+          <p:cNvPr id="5" name="Footer Placeholder 4"/>
           <p:cNvSpPr>
             <a:spLocks noGrp="1"/>
           </p:cNvSpPr>
@@ -3000,13 +2639,7 @@
       </p:sp>
       <p:sp>
         <p:nvSpPr>
-          <p:cNvPr id="6" name="Slide Number Placeholder 5">
-            <a:extLst>
-              <a:ext uri="{FF2B5EF4-FFF2-40B4-BE49-F238E27FC236}">
-                <a16:creationId xmlns:a16="http://schemas.microsoft.com/office/drawing/2014/main" id="{D366D716-FEE1-3336-A2BE-59FBC2DE616E}"/>
-              </a:ext>
-            </a:extLst>
-          </p:cNvPr>
+          <p:cNvPr id="6" name="Slide Number Placeholder 5"/>
           <p:cNvSpPr>
             <a:spLocks noGrp="1"/>
           </p:cNvSpPr>
@@ -3048,23 +2681,23 @@
     </p:spTree>
     <p:extLst>
       <p:ext uri="{BB962C8B-B14F-4D97-AF65-F5344CB8AC3E}">
-        <p14:creationId xmlns:p14="http://schemas.microsoft.com/office/powerpoint/2010/main" val="3364823995"/>
+        <p14:creationId xmlns:p14="http://schemas.microsoft.com/office/powerpoint/2010/main" val="698699185"/>
       </p:ext>
     </p:extLst>
   </p:cSld>
   <p:clrMap bg1="lt1" tx1="dk1" bg2="lt2" tx2="dk2" accent1="accent1" accent2="accent2" accent3="accent3" accent4="accent4" accent5="accent5" accent6="accent6" hlink="hlink" folHlink="folHlink"/>
   <p:sldLayoutIdLst>
-    <p:sldLayoutId id="2147483649" r:id="rId1"/>
-    <p:sldLayoutId id="2147483650" r:id="rId2"/>
-    <p:sldLayoutId id="2147483651" r:id="rId3"/>
-    <p:sldLayoutId id="2147483652" r:id="rId4"/>
-    <p:sldLayoutId id="2147483653" r:id="rId5"/>
-    <p:sldLayoutId id="2147483654" r:id="rId6"/>
-    <p:sldLayoutId id="2147483655" r:id="rId7"/>
-    <p:sldLayoutId id="2147483656" r:id="rId8"/>
-    <p:sldLayoutId id="2147483657" r:id="rId9"/>
-    <p:sldLayoutId id="2147483658" r:id="rId10"/>
-    <p:sldLayoutId id="2147483659" r:id="rId11"/>
+    <p:sldLayoutId id="2147483661" r:id="rId1"/>
+    <p:sldLayoutId id="2147483662" r:id="rId2"/>
+    <p:sldLayoutId id="2147483663" r:id="rId3"/>
+    <p:sldLayoutId id="2147483664" r:id="rId4"/>
+    <p:sldLayoutId id="2147483665" r:id="rId5"/>
+    <p:sldLayoutId id="2147483666" r:id="rId6"/>
+    <p:sldLayoutId id="2147483667" r:id="rId7"/>
+    <p:sldLayoutId id="2147483668" r:id="rId8"/>
+    <p:sldLayoutId id="2147483669" r:id="rId9"/>
+    <p:sldLayoutId id="2147483670" r:id="rId10"/>
+    <p:sldLayoutId id="2147483671" r:id="rId11"/>
   </p:sldLayoutIdLst>
   <p:txStyles>
     <p:titleStyle>
@@ -3537,6 +3170,2073 @@
 </p:sld>
 </file>
 
+<file path=ppt/slides/slide10.xml><?xml version="1.0" encoding="utf-8"?>
+<p:sld xmlns:a="http://schemas.openxmlformats.org/drawingml/2006/main" xmlns:r="http://schemas.openxmlformats.org/officeDocument/2006/relationships" xmlns:p="http://schemas.openxmlformats.org/presentationml/2006/main">
+  <p:cSld>
+    <p:bg>
+      <p:bgPr>
+        <a:gradFill>
+          <a:gsLst>
+            <a:gs pos="0">
+              <a:schemeClr val="accent6">
+                <a:lumMod val="40000"/>
+                <a:lumOff val="60000"/>
+              </a:schemeClr>
+            </a:gs>
+            <a:gs pos="74000">
+              <a:schemeClr val="accent1">
+                <a:lumMod val="45000"/>
+                <a:lumOff val="55000"/>
+              </a:schemeClr>
+            </a:gs>
+            <a:gs pos="83000">
+              <a:schemeClr val="accent1">
+                <a:lumMod val="45000"/>
+                <a:lumOff val="55000"/>
+              </a:schemeClr>
+            </a:gs>
+            <a:gs pos="100000">
+              <a:schemeClr val="accent1">
+                <a:lumMod val="30000"/>
+                <a:lumOff val="70000"/>
+              </a:schemeClr>
+            </a:gs>
+          </a:gsLst>
+          <a:lin ang="5400000" scaled="1"/>
+        </a:gradFill>
+        <a:effectLst/>
+      </p:bgPr>
+    </p:bg>
+    <p:spTree>
+      <p:nvGrpSpPr>
+        <p:cNvPr id="1" name=""/>
+        <p:cNvGrpSpPr/>
+        <p:nvPr/>
+      </p:nvGrpSpPr>
+      <p:grpSpPr>
+        <a:xfrm>
+          <a:off x="0" y="0"/>
+          <a:ext cx="0" cy="0"/>
+          <a:chOff x="0" y="0"/>
+          <a:chExt cx="0" cy="0"/>
+        </a:xfrm>
+      </p:grpSpPr>
+      <p:sp>
+        <p:nvSpPr>
+          <p:cNvPr id="9" name="Title 1">
+            <a:extLst>
+              <a:ext uri="{FF2B5EF4-FFF2-40B4-BE49-F238E27FC236}">
+                <a16:creationId xmlns:a16="http://schemas.microsoft.com/office/drawing/2014/main" id="{D0A493D1-4F00-2F01-6BC8-29BE6F001709}"/>
+              </a:ext>
+            </a:extLst>
+          </p:cNvPr>
+          <p:cNvSpPr txBox="1">
+            <a:spLocks/>
+          </p:cNvSpPr>
+          <p:nvPr/>
+        </p:nvSpPr>
+        <p:spPr>
+          <a:xfrm>
+            <a:off x="274320" y="709077"/>
+            <a:ext cx="11643360" cy="614997"/>
+          </a:xfrm>
+          <a:prstGeom prst="rect">
+            <a:avLst/>
+          </a:prstGeom>
+        </p:spPr>
+        <p:txBody>
+          <a:bodyPr vert="horz" lIns="91440" tIns="45720" rIns="91440" bIns="45720" rtlCol="0" anchor="b">
+            <a:noAutofit/>
+          </a:bodyPr>
+          <a:lstStyle>
+            <a:lvl1pPr algn="ctr" defTabSz="914400" rtl="0" eaLnBrk="1" latinLnBrk="0" hangingPunct="1">
+              <a:lnSpc>
+                <a:spcPct val="90000"/>
+              </a:lnSpc>
+              <a:spcBef>
+                <a:spcPct val="0"/>
+              </a:spcBef>
+              <a:buNone/>
+              <a:defRPr sz="6000" kern="1200">
+                <a:solidFill>
+                  <a:schemeClr val="tx1"/>
+                </a:solidFill>
+                <a:latin typeface="+mj-lt"/>
+                <a:ea typeface="+mj-ea"/>
+                <a:cs typeface="+mj-cs"/>
+              </a:defRPr>
+            </a:lvl1pPr>
+          </a:lstStyle>
+          <a:p>
+            <a:pPr algn="l"/>
+            <a:endParaRPr lang="en-IN" sz="2400" b="1" dirty="0">
+              <a:latin typeface="Algerian" panose="04020705040A02060702" pitchFamily="82" charset="0"/>
+            </a:endParaRPr>
+          </a:p>
+        </p:txBody>
+      </p:sp>
+      <p:pic>
+        <p:nvPicPr>
+          <p:cNvPr id="3" name="Picture 2">
+            <a:extLst>
+              <a:ext uri="{FF2B5EF4-FFF2-40B4-BE49-F238E27FC236}">
+                <a16:creationId xmlns:a16="http://schemas.microsoft.com/office/drawing/2014/main" id="{7082CB98-4BDF-F1B4-14C5-B07EBC1F466B}"/>
+              </a:ext>
+            </a:extLst>
+          </p:cNvPr>
+          <p:cNvPicPr>
+            <a:picLocks noChangeAspect="1"/>
+          </p:cNvPicPr>
+          <p:nvPr/>
+        </p:nvPicPr>
+        <p:blipFill>
+          <a:blip r:embed="rId2">
+            <a:extLst>
+              <a:ext uri="{28A0092B-C50C-407E-A947-70E740481C1C}">
+                <a14:useLocalDpi xmlns:a14="http://schemas.microsoft.com/office/drawing/2010/main" val="0"/>
+              </a:ext>
+            </a:extLst>
+          </a:blip>
+          <a:stretch>
+            <a:fillRect/>
+          </a:stretch>
+        </p:blipFill>
+        <p:spPr>
+          <a:xfrm>
+            <a:off x="274320" y="587123"/>
+            <a:ext cx="11643360" cy="3440701"/>
+          </a:xfrm>
+          <a:prstGeom prst="roundRect">
+            <a:avLst>
+              <a:gd name="adj" fmla="val 8594"/>
+            </a:avLst>
+          </a:prstGeom>
+          <a:solidFill>
+            <a:srgbClr val="FFFFFF">
+              <a:shade val="85000"/>
+            </a:srgbClr>
+          </a:solidFill>
+          <a:ln>
+            <a:noFill/>
+          </a:ln>
+          <a:effectLst>
+            <a:reflection blurRad="12700" stA="38000" endPos="28000" dist="5000" dir="5400000" sy="-100000" algn="bl" rotWithShape="0"/>
+          </a:effectLst>
+        </p:spPr>
+      </p:pic>
+      <p:sp>
+        <p:nvSpPr>
+          <p:cNvPr id="7" name="TextBox 6">
+            <a:extLst>
+              <a:ext uri="{FF2B5EF4-FFF2-40B4-BE49-F238E27FC236}">
+                <a16:creationId xmlns:a16="http://schemas.microsoft.com/office/drawing/2014/main" id="{F93F6F8A-EEA3-736F-6D76-F0B9C4E866D0}"/>
+              </a:ext>
+            </a:extLst>
+          </p:cNvPr>
+          <p:cNvSpPr txBox="1"/>
+          <p:nvPr/>
+        </p:nvSpPr>
+        <p:spPr>
+          <a:xfrm>
+            <a:off x="709723" y="0"/>
+            <a:ext cx="6097772" cy="523220"/>
+          </a:xfrm>
+          <a:prstGeom prst="rect">
+            <a:avLst/>
+          </a:prstGeom>
+          <a:noFill/>
+        </p:spPr>
+        <p:txBody>
+          <a:bodyPr wrap="square">
+            <a:spAutoFit/>
+          </a:bodyPr>
+          <a:lstStyle/>
+          <a:p>
+            <a:r>
+              <a:rPr lang="en-IN" sz="2800" b="1" dirty="0">
+                <a:latin typeface="Algerian" panose="04020705040A02060702" pitchFamily="82" charset="0"/>
+              </a:rPr>
+              <a:t>Store performance analysis</a:t>
+            </a:r>
+          </a:p>
+        </p:txBody>
+      </p:sp>
+      <p:sp>
+        <p:nvSpPr>
+          <p:cNvPr id="10" name="TextBox 9">
+            <a:extLst>
+              <a:ext uri="{FF2B5EF4-FFF2-40B4-BE49-F238E27FC236}">
+                <a16:creationId xmlns:a16="http://schemas.microsoft.com/office/drawing/2014/main" id="{53CC91FA-439A-3750-A61A-0C92E1D1D3FA}"/>
+              </a:ext>
+            </a:extLst>
+          </p:cNvPr>
+          <p:cNvSpPr txBox="1"/>
+          <p:nvPr/>
+        </p:nvSpPr>
+        <p:spPr>
+          <a:xfrm>
+            <a:off x="274320" y="4083211"/>
+            <a:ext cx="11304536" cy="2492990"/>
+          </a:xfrm>
+          <a:prstGeom prst="rect">
+            <a:avLst/>
+          </a:prstGeom>
+          <a:noFill/>
+        </p:spPr>
+        <p:txBody>
+          <a:bodyPr wrap="square">
+            <a:spAutoFit/>
+          </a:bodyPr>
+          <a:lstStyle/>
+          <a:p>
+            <a:r>
+              <a:rPr lang="en-IN" sz="1300" b="1" dirty="0">
+                <a:solidFill>
+                  <a:schemeClr val="accent2">
+                    <a:lumMod val="50000"/>
+                  </a:schemeClr>
+                </a:solidFill>
+                <a:latin typeface="Algerian" panose="04020705040A02060702" pitchFamily="82" charset="0"/>
+              </a:rPr>
+              <a:t>Average Sales per Store: </a:t>
+            </a:r>
+            <a:r>
+              <a:rPr lang="en-IN" sz="1300" dirty="0">
+                <a:latin typeface="Algerian" panose="04020705040A02060702" pitchFamily="82" charset="0"/>
+              </a:rPr>
+              <a:t>The blue line illustrates the average sales per store, revealing variations across different store indices. Stores around index 250-300 exhibit a significant spike in average sales, peaking at approximately 40,000. Other notable spikes occur around indices 550, 810, and 1150, with average sales ranging between 17,500 to 18,000.</a:t>
+            </a:r>
+          </a:p>
+          <a:p>
+            <a:endParaRPr lang="en-IN" sz="1300" dirty="0">
+              <a:latin typeface="Algerian" panose="04020705040A02060702" pitchFamily="82" charset="0"/>
+            </a:endParaRPr>
+          </a:p>
+          <a:p>
+            <a:r>
+              <a:rPr lang="en-IN" sz="1300" b="1" dirty="0">
+                <a:solidFill>
+                  <a:schemeClr val="accent2">
+                    <a:lumMod val="50000"/>
+                  </a:schemeClr>
+                </a:solidFill>
+                <a:latin typeface="Algerian" panose="04020705040A02060702" pitchFamily="82" charset="0"/>
+              </a:rPr>
+              <a:t>Average Customers per Store: </a:t>
+            </a:r>
+            <a:r>
+              <a:rPr lang="en-IN" sz="1300" dirty="0">
+                <a:latin typeface="Algerian" panose="04020705040A02060702" pitchFamily="82" charset="0"/>
+              </a:rPr>
+              <a:t>The orange line showcases the average number of customers per store. Similar to average sales, certain stores demonstrate higher average customer counts. Stores around index 250-300 show a peak in average customer count, reaching up to approximately 4000. Additionally, stores around index 550 and 700-800 also exhibit higher average customer counts.</a:t>
+            </a:r>
+          </a:p>
+          <a:p>
+            <a:endParaRPr lang="en-IN" sz="1300" dirty="0">
+              <a:latin typeface="Algerian" panose="04020705040A02060702" pitchFamily="82" charset="0"/>
+            </a:endParaRPr>
+          </a:p>
+          <a:p>
+            <a:r>
+              <a:rPr lang="en-IN" sz="1300" b="1" dirty="0">
+                <a:solidFill>
+                  <a:schemeClr val="accent2">
+                    <a:lumMod val="50000"/>
+                  </a:schemeClr>
+                </a:solidFill>
+                <a:latin typeface="Algerian" panose="04020705040A02060702" pitchFamily="82" charset="0"/>
+              </a:rPr>
+              <a:t>Comparative Analysis</a:t>
+            </a:r>
+          </a:p>
+          <a:p>
+            <a:r>
+              <a:rPr lang="en-IN" sz="1300" dirty="0">
+                <a:latin typeface="Algerian" panose="04020705040A02060702" pitchFamily="82" charset="0"/>
+              </a:rPr>
+              <a:t>By comparing the trends of average sales and average customers per store, it's evident that a correlation exists between the two metrics. Stores with higher average sales tend to attract more customers on average.</a:t>
+            </a:r>
+          </a:p>
+        </p:txBody>
+      </p:sp>
+    </p:spTree>
+    <p:extLst>
+      <p:ext uri="{BB962C8B-B14F-4D97-AF65-F5344CB8AC3E}">
+        <p14:creationId xmlns:p14="http://schemas.microsoft.com/office/powerpoint/2010/main" val="1251355016"/>
+      </p:ext>
+    </p:extLst>
+  </p:cSld>
+  <p:clrMapOvr>
+    <a:masterClrMapping/>
+  </p:clrMapOvr>
+</p:sld>
+</file>
+
+<file path=ppt/slides/slide11.xml><?xml version="1.0" encoding="utf-8"?>
+<p:sld xmlns:a="http://schemas.openxmlformats.org/drawingml/2006/main" xmlns:r="http://schemas.openxmlformats.org/officeDocument/2006/relationships" xmlns:p="http://schemas.openxmlformats.org/presentationml/2006/main">
+  <p:cSld>
+    <p:bg>
+      <p:bgPr>
+        <a:gradFill>
+          <a:gsLst>
+            <a:gs pos="0">
+              <a:schemeClr val="accent6">
+                <a:lumMod val="40000"/>
+                <a:lumOff val="60000"/>
+              </a:schemeClr>
+            </a:gs>
+            <a:gs pos="74000">
+              <a:schemeClr val="accent1">
+                <a:lumMod val="45000"/>
+                <a:lumOff val="55000"/>
+              </a:schemeClr>
+            </a:gs>
+            <a:gs pos="83000">
+              <a:schemeClr val="accent1">
+                <a:lumMod val="45000"/>
+                <a:lumOff val="55000"/>
+              </a:schemeClr>
+            </a:gs>
+            <a:gs pos="100000">
+              <a:schemeClr val="accent1">
+                <a:lumMod val="30000"/>
+                <a:lumOff val="70000"/>
+              </a:schemeClr>
+            </a:gs>
+          </a:gsLst>
+          <a:lin ang="5400000" scaled="1"/>
+        </a:gradFill>
+        <a:effectLst/>
+      </p:bgPr>
+    </p:bg>
+    <p:spTree>
+      <p:nvGrpSpPr>
+        <p:cNvPr id="1" name=""/>
+        <p:cNvGrpSpPr/>
+        <p:nvPr/>
+      </p:nvGrpSpPr>
+      <p:grpSpPr>
+        <a:xfrm>
+          <a:off x="0" y="0"/>
+          <a:ext cx="0" cy="0"/>
+          <a:chOff x="0" y="0"/>
+          <a:chExt cx="0" cy="0"/>
+        </a:xfrm>
+      </p:grpSpPr>
+      <p:sp>
+        <p:nvSpPr>
+          <p:cNvPr id="9" name="Title 1">
+            <a:extLst>
+              <a:ext uri="{FF2B5EF4-FFF2-40B4-BE49-F238E27FC236}">
+                <a16:creationId xmlns:a16="http://schemas.microsoft.com/office/drawing/2014/main" id="{D0A493D1-4F00-2F01-6BC8-29BE6F001709}"/>
+              </a:ext>
+            </a:extLst>
+          </p:cNvPr>
+          <p:cNvSpPr txBox="1">
+            <a:spLocks/>
+          </p:cNvSpPr>
+          <p:nvPr/>
+        </p:nvSpPr>
+        <p:spPr>
+          <a:xfrm>
+            <a:off x="274320" y="709077"/>
+            <a:ext cx="11643360" cy="614997"/>
+          </a:xfrm>
+          <a:prstGeom prst="rect">
+            <a:avLst/>
+          </a:prstGeom>
+        </p:spPr>
+        <p:txBody>
+          <a:bodyPr vert="horz" lIns="91440" tIns="45720" rIns="91440" bIns="45720" rtlCol="0" anchor="b">
+            <a:noAutofit/>
+          </a:bodyPr>
+          <a:lstStyle>
+            <a:lvl1pPr algn="ctr" defTabSz="914400" rtl="0" eaLnBrk="1" latinLnBrk="0" hangingPunct="1">
+              <a:lnSpc>
+                <a:spcPct val="90000"/>
+              </a:lnSpc>
+              <a:spcBef>
+                <a:spcPct val="0"/>
+              </a:spcBef>
+              <a:buNone/>
+              <a:defRPr sz="6000" kern="1200">
+                <a:solidFill>
+                  <a:schemeClr val="tx1"/>
+                </a:solidFill>
+                <a:latin typeface="+mj-lt"/>
+                <a:ea typeface="+mj-ea"/>
+                <a:cs typeface="+mj-cs"/>
+              </a:defRPr>
+            </a:lvl1pPr>
+          </a:lstStyle>
+          <a:p>
+            <a:pPr algn="l"/>
+            <a:endParaRPr lang="en-IN" sz="2400" b="1" dirty="0">
+              <a:latin typeface="Algerian" panose="04020705040A02060702" pitchFamily="82" charset="0"/>
+            </a:endParaRPr>
+          </a:p>
+        </p:txBody>
+      </p:sp>
+      <p:sp>
+        <p:nvSpPr>
+          <p:cNvPr id="7" name="TextBox 6">
+            <a:extLst>
+              <a:ext uri="{FF2B5EF4-FFF2-40B4-BE49-F238E27FC236}">
+                <a16:creationId xmlns:a16="http://schemas.microsoft.com/office/drawing/2014/main" id="{F93F6F8A-EEA3-736F-6D76-F0B9C4E866D0}"/>
+              </a:ext>
+            </a:extLst>
+          </p:cNvPr>
+          <p:cNvSpPr txBox="1"/>
+          <p:nvPr/>
+        </p:nvSpPr>
+        <p:spPr>
+          <a:xfrm>
+            <a:off x="274320" y="62468"/>
+            <a:ext cx="11643360" cy="954107"/>
+          </a:xfrm>
+          <a:prstGeom prst="rect">
+            <a:avLst/>
+          </a:prstGeom>
+          <a:noFill/>
+        </p:spPr>
+        <p:txBody>
+          <a:bodyPr wrap="square">
+            <a:spAutoFit/>
+          </a:bodyPr>
+          <a:lstStyle/>
+          <a:p>
+            <a:r>
+              <a:rPr lang="en-US" sz="2800" b="1" dirty="0">
+                <a:latin typeface="Algerian" panose="04020705040A02060702" pitchFamily="82" charset="0"/>
+              </a:rPr>
+              <a:t>Analyzing Store Performance Relative to Competitors: Insights and Implications</a:t>
+            </a:r>
+            <a:endParaRPr lang="en-IN" sz="2800" b="1" dirty="0">
+              <a:latin typeface="Algerian" panose="04020705040A02060702" pitchFamily="82" charset="0"/>
+            </a:endParaRPr>
+          </a:p>
+        </p:txBody>
+      </p:sp>
+      <p:pic>
+        <p:nvPicPr>
+          <p:cNvPr id="4" name="Picture 3">
+            <a:extLst>
+              <a:ext uri="{FF2B5EF4-FFF2-40B4-BE49-F238E27FC236}">
+                <a16:creationId xmlns:a16="http://schemas.microsoft.com/office/drawing/2014/main" id="{778B3D03-AAC4-27F1-B39C-DF54A8F19237}"/>
+              </a:ext>
+            </a:extLst>
+          </p:cNvPr>
+          <p:cNvPicPr>
+            <a:picLocks noChangeAspect="1"/>
+          </p:cNvPicPr>
+          <p:nvPr/>
+        </p:nvPicPr>
+        <p:blipFill>
+          <a:blip r:embed="rId2">
+            <a:extLst>
+              <a:ext uri="{28A0092B-C50C-407E-A947-70E740481C1C}">
+                <a14:useLocalDpi xmlns:a14="http://schemas.microsoft.com/office/drawing/2010/main" val="0"/>
+              </a:ext>
+            </a:extLst>
+          </a:blip>
+          <a:stretch>
+            <a:fillRect/>
+          </a:stretch>
+        </p:blipFill>
+        <p:spPr>
+          <a:xfrm>
+            <a:off x="93568" y="1324074"/>
+            <a:ext cx="5790553" cy="3726391"/>
+          </a:xfrm>
+          <a:prstGeom prst="roundRect">
+            <a:avLst>
+              <a:gd name="adj" fmla="val 8594"/>
+            </a:avLst>
+          </a:prstGeom>
+          <a:solidFill>
+            <a:srgbClr val="FFFFFF">
+              <a:shade val="85000"/>
+            </a:srgbClr>
+          </a:solidFill>
+          <a:ln>
+            <a:noFill/>
+          </a:ln>
+          <a:effectLst>
+            <a:reflection blurRad="12700" stA="38000" endPos="28000" dist="5000" dir="5400000" sy="-100000" algn="bl" rotWithShape="0"/>
+          </a:effectLst>
+        </p:spPr>
+      </p:pic>
+      <p:sp>
+        <p:nvSpPr>
+          <p:cNvPr id="6" name="TextBox 5">
+            <a:extLst>
+              <a:ext uri="{FF2B5EF4-FFF2-40B4-BE49-F238E27FC236}">
+                <a16:creationId xmlns:a16="http://schemas.microsoft.com/office/drawing/2014/main" id="{803656BF-AC3D-1634-2B1A-FA3B2ED01184}"/>
+              </a:ext>
+            </a:extLst>
+          </p:cNvPr>
+          <p:cNvSpPr txBox="1"/>
+          <p:nvPr/>
+        </p:nvSpPr>
+        <p:spPr>
+          <a:xfrm>
+            <a:off x="6000953" y="363915"/>
+            <a:ext cx="6191047" cy="6494085"/>
+          </a:xfrm>
+          <a:prstGeom prst="rect">
+            <a:avLst/>
+          </a:prstGeom>
+          <a:noFill/>
+        </p:spPr>
+        <p:txBody>
+          <a:bodyPr wrap="square">
+            <a:spAutoFit/>
+          </a:bodyPr>
+          <a:lstStyle/>
+          <a:p>
+            <a:endParaRPr lang="en-IN" sz="1600" b="1" dirty="0">
+              <a:solidFill>
+                <a:schemeClr val="accent2">
+                  <a:lumMod val="50000"/>
+                </a:schemeClr>
+              </a:solidFill>
+              <a:latin typeface="Algerian" panose="04020705040A02060702" pitchFamily="82" charset="0"/>
+            </a:endParaRPr>
+          </a:p>
+          <a:p>
+            <a:r>
+              <a:rPr lang="en-IN" sz="1600" b="1" dirty="0">
+                <a:solidFill>
+                  <a:schemeClr val="accent2">
+                    <a:lumMod val="50000"/>
+                  </a:schemeClr>
+                </a:solidFill>
+                <a:latin typeface="Algerian" panose="04020705040A02060702" pitchFamily="82" charset="0"/>
+              </a:rPr>
+              <a:t>Analysis</a:t>
+            </a:r>
+            <a:r>
+              <a:rPr lang="en-IN" sz="1600" dirty="0">
+                <a:latin typeface="Algerian" panose="04020705040A02060702" pitchFamily="82" charset="0"/>
+              </a:rPr>
+              <a:t>:</a:t>
+            </a:r>
+          </a:p>
+          <a:p>
+            <a:r>
+              <a:rPr lang="en-IN" sz="1600" dirty="0">
+                <a:latin typeface="Algerian" panose="04020705040A02060702" pitchFamily="82" charset="0"/>
+              </a:rPr>
+              <a:t>Store Performance: The histogram displays performance disparities between stores and their competitors.</a:t>
+            </a:r>
+          </a:p>
+          <a:p>
+            <a:endParaRPr lang="en-IN" sz="1600" dirty="0">
+              <a:latin typeface="Algerian" panose="04020705040A02060702" pitchFamily="82" charset="0"/>
+            </a:endParaRPr>
+          </a:p>
+          <a:p>
+            <a:r>
+              <a:rPr lang="en-IN" sz="1600" b="1" dirty="0">
+                <a:solidFill>
+                  <a:schemeClr val="accent2">
+                    <a:lumMod val="50000"/>
+                  </a:schemeClr>
+                </a:solidFill>
+                <a:latin typeface="Algerian" panose="04020705040A02060702" pitchFamily="82" charset="0"/>
+              </a:rPr>
+              <a:t>Frequency Distribution: </a:t>
+            </a:r>
+            <a:r>
+              <a:rPr lang="en-IN" sz="1600" dirty="0">
+                <a:latin typeface="Algerian" panose="04020705040A02060702" pitchFamily="82" charset="0"/>
+              </a:rPr>
+              <a:t>Peak frequency occurs around a performance difference of 0, indicating similar performance to competitors.</a:t>
+            </a:r>
+          </a:p>
+          <a:p>
+            <a:endParaRPr lang="en-IN" sz="1600" dirty="0">
+              <a:latin typeface="Algerian" panose="04020705040A02060702" pitchFamily="82" charset="0"/>
+            </a:endParaRPr>
+          </a:p>
+          <a:p>
+            <a:r>
+              <a:rPr lang="en-IN" sz="1600" b="1" dirty="0">
+                <a:solidFill>
+                  <a:schemeClr val="accent2">
+                    <a:lumMod val="50000"/>
+                  </a:schemeClr>
+                </a:solidFill>
+                <a:latin typeface="Algerian" panose="04020705040A02060702" pitchFamily="82" charset="0"/>
+              </a:rPr>
+              <a:t>Implications for Strategy</a:t>
+            </a:r>
+            <a:r>
+              <a:rPr lang="en-IN" sz="1600" dirty="0">
+                <a:latin typeface="Algerian" panose="04020705040A02060702" pitchFamily="82" charset="0"/>
+              </a:rPr>
+              <a:t>: Positive differences suggest competitive advantages, while negative differences indicate areas for improvement.</a:t>
+            </a:r>
+          </a:p>
+          <a:p>
+            <a:endParaRPr lang="en-IN" sz="1600" dirty="0">
+              <a:latin typeface="Algerian" panose="04020705040A02060702" pitchFamily="82" charset="0"/>
+            </a:endParaRPr>
+          </a:p>
+          <a:p>
+            <a:r>
+              <a:rPr lang="en-IN" sz="1600" b="1" dirty="0">
+                <a:solidFill>
+                  <a:schemeClr val="accent2">
+                    <a:lumMod val="50000"/>
+                  </a:schemeClr>
+                </a:solidFill>
+                <a:latin typeface="Algerian" panose="04020705040A02060702" pitchFamily="82" charset="0"/>
+              </a:rPr>
+              <a:t>Benchmarking and Analysis: </a:t>
+            </a:r>
+            <a:r>
+              <a:rPr lang="en-IN" sz="1600" dirty="0">
+                <a:latin typeface="Algerian" panose="04020705040A02060702" pitchFamily="82" charset="0"/>
+              </a:rPr>
+              <a:t>Comparative analysis aids in benchmarking and identifying improvement opportunities.</a:t>
+            </a:r>
+          </a:p>
+          <a:p>
+            <a:endParaRPr lang="en-IN" sz="1600" dirty="0">
+              <a:latin typeface="Algerian" panose="04020705040A02060702" pitchFamily="82" charset="0"/>
+            </a:endParaRPr>
+          </a:p>
+          <a:p>
+            <a:r>
+              <a:rPr lang="en-IN" sz="1600" b="1" dirty="0">
+                <a:solidFill>
+                  <a:schemeClr val="accent2">
+                    <a:lumMod val="50000"/>
+                  </a:schemeClr>
+                </a:solidFill>
+                <a:latin typeface="Algerian" panose="04020705040A02060702" pitchFamily="82" charset="0"/>
+              </a:rPr>
+              <a:t>Conclusion:</a:t>
+            </a:r>
+            <a:endParaRPr lang="en-IN" sz="1600" dirty="0">
+              <a:latin typeface="Algerian" panose="04020705040A02060702" pitchFamily="82" charset="0"/>
+            </a:endParaRPr>
+          </a:p>
+          <a:p>
+            <a:r>
+              <a:rPr lang="en-IN" sz="1600" dirty="0">
+                <a:latin typeface="Algerian" panose="04020705040A02060702" pitchFamily="82" charset="0"/>
+              </a:rPr>
+              <a:t>The histogram effectively illustrates store performance, guiding strategic decisions.</a:t>
+            </a:r>
+          </a:p>
+          <a:p>
+            <a:r>
+              <a:rPr lang="en-IN" sz="1600" dirty="0">
+                <a:latin typeface="Algerian" panose="04020705040A02060702" pitchFamily="82" charset="0"/>
+              </a:rPr>
+              <a:t>Analysis facilitates leveraging strengths and addressing weaknesses.</a:t>
+            </a:r>
+          </a:p>
+          <a:p>
+            <a:r>
+              <a:rPr lang="en-IN" sz="1600" dirty="0">
+                <a:latin typeface="Algerian" panose="04020705040A02060702" pitchFamily="82" charset="0"/>
+              </a:rPr>
+              <a:t>Continuous monitoring fosters sustained competitive advantage.</a:t>
+            </a:r>
+          </a:p>
+        </p:txBody>
+      </p:sp>
+    </p:spTree>
+    <p:extLst>
+      <p:ext uri="{BB962C8B-B14F-4D97-AF65-F5344CB8AC3E}">
+        <p14:creationId xmlns:p14="http://schemas.microsoft.com/office/powerpoint/2010/main" val="480084356"/>
+      </p:ext>
+    </p:extLst>
+  </p:cSld>
+  <p:clrMapOvr>
+    <a:masterClrMapping/>
+  </p:clrMapOvr>
+</p:sld>
+</file>
+
+<file path=ppt/slides/slide12.xml><?xml version="1.0" encoding="utf-8"?>
+<p:sld xmlns:a="http://schemas.openxmlformats.org/drawingml/2006/main" xmlns:r="http://schemas.openxmlformats.org/officeDocument/2006/relationships" xmlns:p="http://schemas.openxmlformats.org/presentationml/2006/main">
+  <p:cSld>
+    <p:bg>
+      <p:bgPr>
+        <a:gradFill>
+          <a:gsLst>
+            <a:gs pos="0">
+              <a:schemeClr val="accent6">
+                <a:lumMod val="40000"/>
+                <a:lumOff val="60000"/>
+              </a:schemeClr>
+            </a:gs>
+            <a:gs pos="74000">
+              <a:schemeClr val="accent1">
+                <a:lumMod val="45000"/>
+                <a:lumOff val="55000"/>
+              </a:schemeClr>
+            </a:gs>
+            <a:gs pos="83000">
+              <a:schemeClr val="accent1">
+                <a:lumMod val="45000"/>
+                <a:lumOff val="55000"/>
+              </a:schemeClr>
+            </a:gs>
+            <a:gs pos="100000">
+              <a:schemeClr val="accent1">
+                <a:lumMod val="30000"/>
+                <a:lumOff val="70000"/>
+              </a:schemeClr>
+            </a:gs>
+          </a:gsLst>
+          <a:lin ang="5400000" scaled="1"/>
+        </a:gradFill>
+        <a:effectLst/>
+      </p:bgPr>
+    </p:bg>
+    <p:spTree>
+      <p:nvGrpSpPr>
+        <p:cNvPr id="1" name=""/>
+        <p:cNvGrpSpPr/>
+        <p:nvPr/>
+      </p:nvGrpSpPr>
+      <p:grpSpPr>
+        <a:xfrm>
+          <a:off x="0" y="0"/>
+          <a:ext cx="0" cy="0"/>
+          <a:chOff x="0" y="0"/>
+          <a:chExt cx="0" cy="0"/>
+        </a:xfrm>
+      </p:grpSpPr>
+      <p:sp>
+        <p:nvSpPr>
+          <p:cNvPr id="9" name="Title 1">
+            <a:extLst>
+              <a:ext uri="{FF2B5EF4-FFF2-40B4-BE49-F238E27FC236}">
+                <a16:creationId xmlns:a16="http://schemas.microsoft.com/office/drawing/2014/main" id="{D0A493D1-4F00-2F01-6BC8-29BE6F001709}"/>
+              </a:ext>
+            </a:extLst>
+          </p:cNvPr>
+          <p:cNvSpPr txBox="1">
+            <a:spLocks/>
+          </p:cNvSpPr>
+          <p:nvPr/>
+        </p:nvSpPr>
+        <p:spPr>
+          <a:xfrm>
+            <a:off x="274320" y="709077"/>
+            <a:ext cx="11643360" cy="614997"/>
+          </a:xfrm>
+          <a:prstGeom prst="rect">
+            <a:avLst/>
+          </a:prstGeom>
+        </p:spPr>
+        <p:txBody>
+          <a:bodyPr vert="horz" lIns="91440" tIns="45720" rIns="91440" bIns="45720" rtlCol="0" anchor="b">
+            <a:noAutofit/>
+          </a:bodyPr>
+          <a:lstStyle>
+            <a:lvl1pPr algn="ctr" defTabSz="914400" rtl="0" eaLnBrk="1" latinLnBrk="0" hangingPunct="1">
+              <a:lnSpc>
+                <a:spcPct val="90000"/>
+              </a:lnSpc>
+              <a:spcBef>
+                <a:spcPct val="0"/>
+              </a:spcBef>
+              <a:buNone/>
+              <a:defRPr sz="6000" kern="1200">
+                <a:solidFill>
+                  <a:schemeClr val="tx1"/>
+                </a:solidFill>
+                <a:latin typeface="+mj-lt"/>
+                <a:ea typeface="+mj-ea"/>
+                <a:cs typeface="+mj-cs"/>
+              </a:defRPr>
+            </a:lvl1pPr>
+          </a:lstStyle>
+          <a:p>
+            <a:pPr algn="l"/>
+            <a:endParaRPr lang="en-IN" sz="2400" b="1" dirty="0">
+              <a:latin typeface="Algerian" panose="04020705040A02060702" pitchFamily="82" charset="0"/>
+            </a:endParaRPr>
+          </a:p>
+        </p:txBody>
+      </p:sp>
+      <p:sp>
+        <p:nvSpPr>
+          <p:cNvPr id="7" name="TextBox 6">
+            <a:extLst>
+              <a:ext uri="{FF2B5EF4-FFF2-40B4-BE49-F238E27FC236}">
+                <a16:creationId xmlns:a16="http://schemas.microsoft.com/office/drawing/2014/main" id="{F93F6F8A-EEA3-736F-6D76-F0B9C4E866D0}"/>
+              </a:ext>
+            </a:extLst>
+          </p:cNvPr>
+          <p:cNvSpPr txBox="1"/>
+          <p:nvPr/>
+        </p:nvSpPr>
+        <p:spPr>
+          <a:xfrm>
+            <a:off x="274320" y="62468"/>
+            <a:ext cx="11643360" cy="523220"/>
+          </a:xfrm>
+          <a:prstGeom prst="rect">
+            <a:avLst/>
+          </a:prstGeom>
+          <a:noFill/>
+        </p:spPr>
+        <p:txBody>
+          <a:bodyPr wrap="square">
+            <a:spAutoFit/>
+          </a:bodyPr>
+          <a:lstStyle/>
+          <a:p>
+            <a:r>
+              <a:rPr lang="en-US" sz="2800" b="1" dirty="0" err="1">
+                <a:latin typeface="Algerian" panose="04020705040A02060702" pitchFamily="82" charset="0"/>
+              </a:rPr>
+              <a:t>arima</a:t>
+            </a:r>
+            <a:r>
+              <a:rPr lang="en-US" sz="2800" b="1" dirty="0">
+                <a:latin typeface="Algerian" panose="04020705040A02060702" pitchFamily="82" charset="0"/>
+              </a:rPr>
+              <a:t> model forecast analysis</a:t>
+            </a:r>
+            <a:endParaRPr lang="en-IN" sz="2800" b="1" dirty="0">
+              <a:latin typeface="Algerian" panose="04020705040A02060702" pitchFamily="82" charset="0"/>
+            </a:endParaRPr>
+          </a:p>
+        </p:txBody>
+      </p:sp>
+      <p:sp>
+        <p:nvSpPr>
+          <p:cNvPr id="6" name="TextBox 5">
+            <a:extLst>
+              <a:ext uri="{FF2B5EF4-FFF2-40B4-BE49-F238E27FC236}">
+                <a16:creationId xmlns:a16="http://schemas.microsoft.com/office/drawing/2014/main" id="{803656BF-AC3D-1634-2B1A-FA3B2ED01184}"/>
+              </a:ext>
+            </a:extLst>
+          </p:cNvPr>
+          <p:cNvSpPr txBox="1"/>
+          <p:nvPr/>
+        </p:nvSpPr>
+        <p:spPr>
+          <a:xfrm>
+            <a:off x="367887" y="3621016"/>
+            <a:ext cx="12072208" cy="3046988"/>
+          </a:xfrm>
+          <a:prstGeom prst="rect">
+            <a:avLst/>
+          </a:prstGeom>
+          <a:noFill/>
+        </p:spPr>
+        <p:txBody>
+          <a:bodyPr wrap="square">
+            <a:spAutoFit/>
+          </a:bodyPr>
+          <a:lstStyle/>
+          <a:p>
+            <a:r>
+              <a:rPr lang="en-US" sz="1200" b="1" dirty="0">
+                <a:solidFill>
+                  <a:schemeClr val="accent2">
+                    <a:lumMod val="50000"/>
+                  </a:schemeClr>
+                </a:solidFill>
+                <a:latin typeface="Algerian" panose="04020705040A02060702" pitchFamily="82" charset="0"/>
+              </a:rPr>
+              <a:t>Interpretation</a:t>
+            </a:r>
+          </a:p>
+          <a:p>
+            <a:r>
+              <a:rPr lang="en-US" sz="1200" dirty="0">
+                <a:latin typeface="Algerian" panose="04020705040A02060702" pitchFamily="82" charset="0"/>
+              </a:rPr>
+              <a:t>Actual Sales (Teal Line): Represents observed sales data up to the present time, with the latest data point at the end of the time series.</a:t>
+            </a:r>
+          </a:p>
+          <a:p>
+            <a:r>
+              <a:rPr lang="en-US" sz="1200" dirty="0">
+                <a:latin typeface="Algerian" panose="04020705040A02060702" pitchFamily="82" charset="0"/>
+              </a:rPr>
+              <a:t>Forecasted Sales (Red Line): Shows forecasted sales values for the next 42 days, starting August 2015, generated by the ARIMA(7, 0, 0) model based on historical sales data.</a:t>
+            </a:r>
+          </a:p>
+          <a:p>
+            <a:endParaRPr lang="en-US" sz="1200" dirty="0">
+              <a:latin typeface="Algerian" panose="04020705040A02060702" pitchFamily="82" charset="0"/>
+            </a:endParaRPr>
+          </a:p>
+          <a:p>
+            <a:r>
+              <a:rPr lang="en-US" sz="1200" b="1" dirty="0">
+                <a:solidFill>
+                  <a:schemeClr val="accent2">
+                    <a:lumMod val="50000"/>
+                  </a:schemeClr>
+                </a:solidFill>
+                <a:latin typeface="Algerian" panose="04020705040A02060702" pitchFamily="82" charset="0"/>
+              </a:rPr>
+              <a:t>Analysis</a:t>
+            </a:r>
+          </a:p>
+          <a:p>
+            <a:r>
+              <a:rPr lang="en-US" sz="1200" dirty="0">
+                <a:latin typeface="Algerian" panose="04020705040A02060702" pitchFamily="82" charset="0"/>
+              </a:rPr>
+              <a:t>January 2014 Sales: Significantly higher compared to other months and years, potentially due to seasonality, promotions, or external factors.</a:t>
+            </a:r>
+          </a:p>
+          <a:p>
+            <a:r>
+              <a:rPr lang="en-US" sz="1200" dirty="0">
+                <a:latin typeface="Algerian" panose="04020705040A02060702" pitchFamily="82" charset="0"/>
+              </a:rPr>
+              <a:t>Forecasted Sales for August 2015: Depicted by the red line, accuracy relies on the ARIMA model's reliability and continuity of underlying data patterns.</a:t>
+            </a:r>
+          </a:p>
+          <a:p>
+            <a:r>
+              <a:rPr lang="en-US" sz="1200" dirty="0">
+                <a:latin typeface="Algerian" panose="04020705040A02060702" pitchFamily="82" charset="0"/>
+              </a:rPr>
+              <a:t>Comparison of Actuals and Forecast: Allows assessment of the model's predictive performance and identification of areas for improvement or external influences on sales.</a:t>
+            </a:r>
+          </a:p>
+          <a:p>
+            <a:endParaRPr lang="en-US" sz="1200" dirty="0">
+              <a:latin typeface="Algerian" panose="04020705040A02060702" pitchFamily="82" charset="0"/>
+            </a:endParaRPr>
+          </a:p>
+          <a:p>
+            <a:r>
+              <a:rPr lang="en-US" sz="1200" b="1" dirty="0">
+                <a:solidFill>
+                  <a:schemeClr val="accent2">
+                    <a:lumMod val="50000"/>
+                  </a:schemeClr>
+                </a:solidFill>
+                <a:latin typeface="Algerian" panose="04020705040A02060702" pitchFamily="82" charset="0"/>
+              </a:rPr>
+              <a:t>Conclusion</a:t>
+            </a:r>
+          </a:p>
+          <a:p>
+            <a:r>
+              <a:rPr lang="en-US" sz="1200" dirty="0">
+                <a:latin typeface="Algerian" panose="04020705040A02060702" pitchFamily="82" charset="0"/>
+              </a:rPr>
+              <a:t>Visual comparison aids in evaluating model performance.</a:t>
+            </a:r>
+          </a:p>
+          <a:p>
+            <a:r>
+              <a:rPr lang="en-US" sz="1200" dirty="0">
+                <a:latin typeface="Algerian" panose="04020705040A02060702" pitchFamily="82" charset="0"/>
+              </a:rPr>
+              <a:t>January 2014 sales spike suggests unique factors influencing sales.</a:t>
+            </a:r>
+          </a:p>
+          <a:p>
+            <a:r>
+              <a:rPr lang="en-US" sz="1200" dirty="0">
+                <a:latin typeface="Algerian" panose="04020705040A02060702" pitchFamily="82" charset="0"/>
+              </a:rPr>
+              <a:t>Interpret forecasts cautiously, considering potential uncertainties and external influences. Further model refinement may enhance accuracy.</a:t>
+            </a:r>
+            <a:endParaRPr lang="en-IN" sz="1200" dirty="0">
+              <a:latin typeface="Algerian" panose="04020705040A02060702" pitchFamily="82" charset="0"/>
+            </a:endParaRPr>
+          </a:p>
+        </p:txBody>
+      </p:sp>
+      <p:pic>
+        <p:nvPicPr>
+          <p:cNvPr id="3" name="Picture 2">
+            <a:extLst>
+              <a:ext uri="{FF2B5EF4-FFF2-40B4-BE49-F238E27FC236}">
+                <a16:creationId xmlns:a16="http://schemas.microsoft.com/office/drawing/2014/main" id="{5A52D3DD-39C0-36B0-A584-BA95DE28B0AE}"/>
+              </a:ext>
+            </a:extLst>
+          </p:cNvPr>
+          <p:cNvPicPr>
+            <a:picLocks noChangeAspect="1"/>
+          </p:cNvPicPr>
+          <p:nvPr/>
+        </p:nvPicPr>
+        <p:blipFill>
+          <a:blip r:embed="rId2">
+            <a:extLst>
+              <a:ext uri="{28A0092B-C50C-407E-A947-70E740481C1C}">
+                <a14:useLocalDpi xmlns:a14="http://schemas.microsoft.com/office/drawing/2010/main" val="0"/>
+              </a:ext>
+            </a:extLst>
+          </a:blip>
+          <a:stretch>
+            <a:fillRect/>
+          </a:stretch>
+        </p:blipFill>
+        <p:spPr>
+          <a:xfrm>
+            <a:off x="367887" y="585688"/>
+            <a:ext cx="11437089" cy="2604440"/>
+          </a:xfrm>
+          <a:prstGeom prst="roundRect">
+            <a:avLst>
+              <a:gd name="adj" fmla="val 8594"/>
+            </a:avLst>
+          </a:prstGeom>
+          <a:solidFill>
+            <a:srgbClr val="FFFFFF">
+              <a:shade val="85000"/>
+            </a:srgbClr>
+          </a:solidFill>
+          <a:ln>
+            <a:noFill/>
+          </a:ln>
+          <a:effectLst>
+            <a:reflection blurRad="12700" stA="38000" endPos="28000" dist="5000" dir="5400000" sy="-100000" algn="bl" rotWithShape="0"/>
+          </a:effectLst>
+        </p:spPr>
+      </p:pic>
+    </p:spTree>
+    <p:extLst>
+      <p:ext uri="{BB962C8B-B14F-4D97-AF65-F5344CB8AC3E}">
+        <p14:creationId xmlns:p14="http://schemas.microsoft.com/office/powerpoint/2010/main" val="472223763"/>
+      </p:ext>
+    </p:extLst>
+  </p:cSld>
+  <p:clrMapOvr>
+    <a:masterClrMapping/>
+  </p:clrMapOvr>
+</p:sld>
+</file>
+
+<file path=ppt/slides/slide13.xml><?xml version="1.0" encoding="utf-8"?>
+<p:sld xmlns:a="http://schemas.openxmlformats.org/drawingml/2006/main" xmlns:r="http://schemas.openxmlformats.org/officeDocument/2006/relationships" xmlns:p="http://schemas.openxmlformats.org/presentationml/2006/main">
+  <p:cSld>
+    <p:bg>
+      <p:bgPr>
+        <a:gradFill>
+          <a:gsLst>
+            <a:gs pos="0">
+              <a:schemeClr val="accent6">
+                <a:lumMod val="40000"/>
+                <a:lumOff val="60000"/>
+              </a:schemeClr>
+            </a:gs>
+            <a:gs pos="74000">
+              <a:schemeClr val="accent1">
+                <a:lumMod val="45000"/>
+                <a:lumOff val="55000"/>
+              </a:schemeClr>
+            </a:gs>
+            <a:gs pos="83000">
+              <a:schemeClr val="accent1">
+                <a:lumMod val="45000"/>
+                <a:lumOff val="55000"/>
+              </a:schemeClr>
+            </a:gs>
+            <a:gs pos="100000">
+              <a:schemeClr val="accent1">
+                <a:lumMod val="30000"/>
+                <a:lumOff val="70000"/>
+              </a:schemeClr>
+            </a:gs>
+          </a:gsLst>
+          <a:lin ang="5400000" scaled="1"/>
+        </a:gradFill>
+        <a:effectLst/>
+      </p:bgPr>
+    </p:bg>
+    <p:spTree>
+      <p:nvGrpSpPr>
+        <p:cNvPr id="1" name=""/>
+        <p:cNvGrpSpPr/>
+        <p:nvPr/>
+      </p:nvGrpSpPr>
+      <p:grpSpPr>
+        <a:xfrm>
+          <a:off x="0" y="0"/>
+          <a:ext cx="0" cy="0"/>
+          <a:chOff x="0" y="0"/>
+          <a:chExt cx="0" cy="0"/>
+        </a:xfrm>
+      </p:grpSpPr>
+      <p:sp>
+        <p:nvSpPr>
+          <p:cNvPr id="9" name="Title 1">
+            <a:extLst>
+              <a:ext uri="{FF2B5EF4-FFF2-40B4-BE49-F238E27FC236}">
+                <a16:creationId xmlns:a16="http://schemas.microsoft.com/office/drawing/2014/main" id="{D0A493D1-4F00-2F01-6BC8-29BE6F001709}"/>
+              </a:ext>
+            </a:extLst>
+          </p:cNvPr>
+          <p:cNvSpPr txBox="1">
+            <a:spLocks/>
+          </p:cNvSpPr>
+          <p:nvPr/>
+        </p:nvSpPr>
+        <p:spPr>
+          <a:xfrm>
+            <a:off x="274320" y="709077"/>
+            <a:ext cx="11643360" cy="614997"/>
+          </a:xfrm>
+          <a:prstGeom prst="rect">
+            <a:avLst/>
+          </a:prstGeom>
+        </p:spPr>
+        <p:txBody>
+          <a:bodyPr vert="horz" lIns="91440" tIns="45720" rIns="91440" bIns="45720" rtlCol="0" anchor="b">
+            <a:noAutofit/>
+          </a:bodyPr>
+          <a:lstStyle>
+            <a:lvl1pPr algn="ctr" defTabSz="914400" rtl="0" eaLnBrk="1" latinLnBrk="0" hangingPunct="1">
+              <a:lnSpc>
+                <a:spcPct val="90000"/>
+              </a:lnSpc>
+              <a:spcBef>
+                <a:spcPct val="0"/>
+              </a:spcBef>
+              <a:buNone/>
+              <a:defRPr sz="6000" kern="1200">
+                <a:solidFill>
+                  <a:schemeClr val="tx1"/>
+                </a:solidFill>
+                <a:latin typeface="+mj-lt"/>
+                <a:ea typeface="+mj-ea"/>
+                <a:cs typeface="+mj-cs"/>
+              </a:defRPr>
+            </a:lvl1pPr>
+          </a:lstStyle>
+          <a:p>
+            <a:pPr algn="l"/>
+            <a:endParaRPr lang="en-IN" sz="4000" b="1" dirty="0">
+              <a:latin typeface="Algerian" panose="04020705040A02060702" pitchFamily="82" charset="0"/>
+            </a:endParaRPr>
+          </a:p>
+        </p:txBody>
+      </p:sp>
+      <p:pic>
+        <p:nvPicPr>
+          <p:cNvPr id="3" name="Picture 2">
+            <a:extLst>
+              <a:ext uri="{FF2B5EF4-FFF2-40B4-BE49-F238E27FC236}">
+                <a16:creationId xmlns:a16="http://schemas.microsoft.com/office/drawing/2014/main" id="{2D1E793E-0002-73BC-EFFD-24EDD23C3F3F}"/>
+              </a:ext>
+            </a:extLst>
+          </p:cNvPr>
+          <p:cNvPicPr>
+            <a:picLocks noChangeAspect="1"/>
+          </p:cNvPicPr>
+          <p:nvPr/>
+        </p:nvPicPr>
+        <p:blipFill>
+          <a:blip r:embed="rId2">
+            <a:extLst>
+              <a:ext uri="{28A0092B-C50C-407E-A947-70E740481C1C}">
+                <a14:useLocalDpi xmlns:a14="http://schemas.microsoft.com/office/drawing/2010/main" val="0"/>
+              </a:ext>
+            </a:extLst>
+          </a:blip>
+          <a:stretch>
+            <a:fillRect/>
+          </a:stretch>
+        </p:blipFill>
+        <p:spPr>
+          <a:xfrm>
+            <a:off x="127000" y="1016575"/>
+            <a:ext cx="11938000" cy="2961223"/>
+          </a:xfrm>
+          <a:prstGeom prst="roundRect">
+            <a:avLst>
+              <a:gd name="adj" fmla="val 8594"/>
+            </a:avLst>
+          </a:prstGeom>
+          <a:solidFill>
+            <a:srgbClr val="FFFFFF">
+              <a:shade val="85000"/>
+            </a:srgbClr>
+          </a:solidFill>
+          <a:ln>
+            <a:noFill/>
+          </a:ln>
+          <a:effectLst>
+            <a:reflection blurRad="12700" stA="38000" endPos="28000" dist="5000" dir="5400000" sy="-100000" algn="bl" rotWithShape="0"/>
+          </a:effectLst>
+        </p:spPr>
+      </p:pic>
+      <p:sp>
+        <p:nvSpPr>
+          <p:cNvPr id="5" name="TextBox 4">
+            <a:extLst>
+              <a:ext uri="{FF2B5EF4-FFF2-40B4-BE49-F238E27FC236}">
+                <a16:creationId xmlns:a16="http://schemas.microsoft.com/office/drawing/2014/main" id="{39E9C231-CE15-7FC7-71F0-F12DA90E65B0}"/>
+              </a:ext>
+            </a:extLst>
+          </p:cNvPr>
+          <p:cNvSpPr txBox="1"/>
+          <p:nvPr/>
+        </p:nvSpPr>
+        <p:spPr>
+          <a:xfrm>
+            <a:off x="0" y="93245"/>
+            <a:ext cx="12192000" cy="523220"/>
+          </a:xfrm>
+          <a:prstGeom prst="rect">
+            <a:avLst/>
+          </a:prstGeom>
+          <a:noFill/>
+        </p:spPr>
+        <p:txBody>
+          <a:bodyPr wrap="square">
+            <a:spAutoFit/>
+          </a:bodyPr>
+          <a:lstStyle/>
+          <a:p>
+            <a:r>
+              <a:rPr lang="en-US" sz="2800" b="1" dirty="0" err="1">
+                <a:latin typeface="Algerian" panose="04020705040A02060702" pitchFamily="82" charset="0"/>
+              </a:rPr>
+              <a:t>sarima</a:t>
+            </a:r>
+            <a:r>
+              <a:rPr lang="en-US" sz="2800" b="1" dirty="0">
+                <a:latin typeface="Algerian" panose="04020705040A02060702" pitchFamily="82" charset="0"/>
+              </a:rPr>
+              <a:t> model forecast analysis</a:t>
+            </a:r>
+            <a:endParaRPr lang="en-IN" sz="2800" b="1" dirty="0">
+              <a:latin typeface="Algerian" panose="04020705040A02060702" pitchFamily="82" charset="0"/>
+            </a:endParaRPr>
+          </a:p>
+        </p:txBody>
+      </p:sp>
+      <p:sp>
+        <p:nvSpPr>
+          <p:cNvPr id="7" name="TextBox 6">
+            <a:extLst>
+              <a:ext uri="{FF2B5EF4-FFF2-40B4-BE49-F238E27FC236}">
+                <a16:creationId xmlns:a16="http://schemas.microsoft.com/office/drawing/2014/main" id="{EDC581DE-74BA-05E0-1008-A195482E3D0B}"/>
+              </a:ext>
+            </a:extLst>
+          </p:cNvPr>
+          <p:cNvSpPr txBox="1"/>
+          <p:nvPr/>
+        </p:nvSpPr>
+        <p:spPr>
+          <a:xfrm>
+            <a:off x="127000" y="4108417"/>
+            <a:ext cx="12065000" cy="2292935"/>
+          </a:xfrm>
+          <a:prstGeom prst="rect">
+            <a:avLst/>
+          </a:prstGeom>
+          <a:noFill/>
+        </p:spPr>
+        <p:txBody>
+          <a:bodyPr wrap="square">
+            <a:spAutoFit/>
+          </a:bodyPr>
+          <a:lstStyle/>
+          <a:p>
+            <a:r>
+              <a:rPr lang="en-IN" sz="1100" b="1" dirty="0">
+                <a:solidFill>
+                  <a:schemeClr val="accent2">
+                    <a:lumMod val="50000"/>
+                  </a:schemeClr>
+                </a:solidFill>
+                <a:latin typeface="Algerian" panose="04020705040A02060702" pitchFamily="82" charset="0"/>
+              </a:rPr>
+              <a:t>Interpretation</a:t>
+            </a:r>
+          </a:p>
+          <a:p>
+            <a:r>
+              <a:rPr lang="en-IN" sz="1100" dirty="0">
+                <a:latin typeface="Algerian" panose="04020705040A02060702" pitchFamily="82" charset="0"/>
+              </a:rPr>
+              <a:t>The SARIMA model generates a forecast for sales data, projecting trends into the future period from the end of available data. A 42 -step forecast is made in this instance.</a:t>
+            </a:r>
+          </a:p>
+          <a:p>
+            <a:endParaRPr lang="en-IN" sz="1100" dirty="0">
+              <a:latin typeface="Algerian" panose="04020705040A02060702" pitchFamily="82" charset="0"/>
+            </a:endParaRPr>
+          </a:p>
+          <a:p>
+            <a:r>
+              <a:rPr lang="en-IN" sz="1100" b="1" dirty="0">
+                <a:solidFill>
+                  <a:schemeClr val="accent2">
+                    <a:lumMod val="50000"/>
+                  </a:schemeClr>
+                </a:solidFill>
+                <a:latin typeface="Algerian" panose="04020705040A02060702" pitchFamily="82" charset="0"/>
+              </a:rPr>
+              <a:t>Analysis</a:t>
+            </a:r>
+          </a:p>
+          <a:p>
+            <a:r>
+              <a:rPr lang="en-IN" sz="1100" dirty="0">
+                <a:latin typeface="Algerian" panose="04020705040A02060702" pitchFamily="82" charset="0"/>
+              </a:rPr>
+              <a:t>The forecasted values are plotted against actual sales data, visualizing the projected trend.</a:t>
+            </a:r>
+          </a:p>
+          <a:p>
+            <a:r>
+              <a:rPr lang="en-IN" sz="1100" dirty="0">
+                <a:latin typeface="Algerian" panose="04020705040A02060702" pitchFamily="82" charset="0"/>
+              </a:rPr>
+              <a:t>SARIMA model captures historical patterns, reflected in the alignment of forecasted values with actual sales data.</a:t>
+            </a:r>
+          </a:p>
+          <a:p>
+            <a:r>
+              <a:rPr lang="en-IN" sz="1100" dirty="0">
+                <a:latin typeface="Algerian" panose="04020705040A02060702" pitchFamily="82" charset="0"/>
+              </a:rPr>
+              <a:t>Forecasted values exhibit uncertainty, depicted by the provided range for forecasted sales values.</a:t>
+            </a:r>
+          </a:p>
+          <a:p>
+            <a:endParaRPr lang="en-IN" sz="1100" dirty="0">
+              <a:latin typeface="Algerian" panose="04020705040A02060702" pitchFamily="82" charset="0"/>
+            </a:endParaRPr>
+          </a:p>
+          <a:p>
+            <a:r>
+              <a:rPr lang="en-IN" sz="1100" b="1" dirty="0">
+                <a:solidFill>
+                  <a:schemeClr val="accent2">
+                    <a:lumMod val="50000"/>
+                  </a:schemeClr>
+                </a:solidFill>
+                <a:latin typeface="Algerian" panose="04020705040A02060702" pitchFamily="82" charset="0"/>
+              </a:rPr>
+              <a:t>Conclusion</a:t>
+            </a:r>
+          </a:p>
+          <a:p>
+            <a:r>
+              <a:rPr lang="en-IN" sz="1100" dirty="0">
+                <a:latin typeface="Algerian" panose="04020705040A02060702" pitchFamily="82" charset="0"/>
+              </a:rPr>
+              <a:t>SARIMA model aids in forecasting future sales based on historical data patterns.</a:t>
+            </a:r>
+          </a:p>
+          <a:p>
+            <a:r>
+              <a:rPr lang="en-IN" sz="1100" dirty="0">
+                <a:latin typeface="Algerian" panose="04020705040A02060702" pitchFamily="82" charset="0"/>
+              </a:rPr>
+              <a:t>Forecasted values offer insights for planning and decision-making.</a:t>
+            </a:r>
+          </a:p>
+          <a:p>
+            <a:r>
+              <a:rPr lang="en-IN" sz="1100" dirty="0">
+                <a:latin typeface="Algerian" panose="04020705040A02060702" pitchFamily="82" charset="0"/>
+              </a:rPr>
+              <a:t>Consider uncertainty in forecasted values for robust decision-making. Further analysis and validation enhance forecast reliability</a:t>
+            </a:r>
+          </a:p>
+        </p:txBody>
+      </p:sp>
+    </p:spTree>
+    <p:extLst>
+      <p:ext uri="{BB962C8B-B14F-4D97-AF65-F5344CB8AC3E}">
+        <p14:creationId xmlns:p14="http://schemas.microsoft.com/office/powerpoint/2010/main" val="1803748124"/>
+      </p:ext>
+    </p:extLst>
+  </p:cSld>
+  <p:clrMapOvr>
+    <a:masterClrMapping/>
+  </p:clrMapOvr>
+</p:sld>
+</file>
+
+<file path=ppt/slides/slide14.xml><?xml version="1.0" encoding="utf-8"?>
+<p:sld xmlns:a="http://schemas.openxmlformats.org/drawingml/2006/main" xmlns:r="http://schemas.openxmlformats.org/officeDocument/2006/relationships" xmlns:p="http://schemas.openxmlformats.org/presentationml/2006/main">
+  <p:cSld>
+    <p:bg>
+      <p:bgPr>
+        <a:gradFill>
+          <a:gsLst>
+            <a:gs pos="0">
+              <a:schemeClr val="accent6">
+                <a:lumMod val="40000"/>
+                <a:lumOff val="60000"/>
+              </a:schemeClr>
+            </a:gs>
+            <a:gs pos="74000">
+              <a:schemeClr val="accent1">
+                <a:lumMod val="45000"/>
+                <a:lumOff val="55000"/>
+              </a:schemeClr>
+            </a:gs>
+            <a:gs pos="83000">
+              <a:schemeClr val="accent1">
+                <a:lumMod val="45000"/>
+                <a:lumOff val="55000"/>
+              </a:schemeClr>
+            </a:gs>
+            <a:gs pos="100000">
+              <a:schemeClr val="accent1">
+                <a:lumMod val="30000"/>
+                <a:lumOff val="70000"/>
+              </a:schemeClr>
+            </a:gs>
+          </a:gsLst>
+          <a:lin ang="5400000" scaled="1"/>
+        </a:gradFill>
+        <a:effectLst/>
+      </p:bgPr>
+    </p:bg>
+    <p:spTree>
+      <p:nvGrpSpPr>
+        <p:cNvPr id="1" name=""/>
+        <p:cNvGrpSpPr/>
+        <p:nvPr/>
+      </p:nvGrpSpPr>
+      <p:grpSpPr>
+        <a:xfrm>
+          <a:off x="0" y="0"/>
+          <a:ext cx="0" cy="0"/>
+          <a:chOff x="0" y="0"/>
+          <a:chExt cx="0" cy="0"/>
+        </a:xfrm>
+      </p:grpSpPr>
+      <p:sp>
+        <p:nvSpPr>
+          <p:cNvPr id="9" name="Title 1">
+            <a:extLst>
+              <a:ext uri="{FF2B5EF4-FFF2-40B4-BE49-F238E27FC236}">
+                <a16:creationId xmlns:a16="http://schemas.microsoft.com/office/drawing/2014/main" id="{D0A493D1-4F00-2F01-6BC8-29BE6F001709}"/>
+              </a:ext>
+            </a:extLst>
+          </p:cNvPr>
+          <p:cNvSpPr txBox="1">
+            <a:spLocks/>
+          </p:cNvSpPr>
+          <p:nvPr/>
+        </p:nvSpPr>
+        <p:spPr>
+          <a:xfrm>
+            <a:off x="274320" y="709077"/>
+            <a:ext cx="11643360" cy="614997"/>
+          </a:xfrm>
+          <a:prstGeom prst="rect">
+            <a:avLst/>
+          </a:prstGeom>
+        </p:spPr>
+        <p:txBody>
+          <a:bodyPr vert="horz" lIns="91440" tIns="45720" rIns="91440" bIns="45720" rtlCol="0" anchor="b">
+            <a:noAutofit/>
+          </a:bodyPr>
+          <a:lstStyle>
+            <a:lvl1pPr algn="ctr" defTabSz="914400" rtl="0" eaLnBrk="1" latinLnBrk="0" hangingPunct="1">
+              <a:lnSpc>
+                <a:spcPct val="90000"/>
+              </a:lnSpc>
+              <a:spcBef>
+                <a:spcPct val="0"/>
+              </a:spcBef>
+              <a:buNone/>
+              <a:defRPr sz="6000" kern="1200">
+                <a:solidFill>
+                  <a:schemeClr val="tx1"/>
+                </a:solidFill>
+                <a:latin typeface="+mj-lt"/>
+                <a:ea typeface="+mj-ea"/>
+                <a:cs typeface="+mj-cs"/>
+              </a:defRPr>
+            </a:lvl1pPr>
+          </a:lstStyle>
+          <a:p>
+            <a:pPr algn="l"/>
+            <a:endParaRPr lang="en-IN" sz="4000" b="1" dirty="0">
+              <a:latin typeface="Algerian" panose="04020705040A02060702" pitchFamily="82" charset="0"/>
+            </a:endParaRPr>
+          </a:p>
+        </p:txBody>
+      </p:sp>
+      <p:pic>
+        <p:nvPicPr>
+          <p:cNvPr id="3" name="Picture 2">
+            <a:extLst>
+              <a:ext uri="{FF2B5EF4-FFF2-40B4-BE49-F238E27FC236}">
+                <a16:creationId xmlns:a16="http://schemas.microsoft.com/office/drawing/2014/main" id="{EE89CA62-E476-B77F-2459-F476E6854161}"/>
+              </a:ext>
+            </a:extLst>
+          </p:cNvPr>
+          <p:cNvPicPr>
+            <a:picLocks noChangeAspect="1"/>
+          </p:cNvPicPr>
+          <p:nvPr/>
+        </p:nvPicPr>
+        <p:blipFill>
+          <a:blip r:embed="rId2">
+            <a:extLst>
+              <a:ext uri="{28A0092B-C50C-407E-A947-70E740481C1C}">
+                <a14:useLocalDpi xmlns:a14="http://schemas.microsoft.com/office/drawing/2010/main" val="0"/>
+              </a:ext>
+            </a:extLst>
+          </a:blip>
+          <a:stretch>
+            <a:fillRect/>
+          </a:stretch>
+        </p:blipFill>
+        <p:spPr>
+          <a:xfrm>
+            <a:off x="274320" y="523220"/>
+            <a:ext cx="11643360" cy="3235602"/>
+          </a:xfrm>
+          <a:prstGeom prst="roundRect">
+            <a:avLst>
+              <a:gd name="adj" fmla="val 8594"/>
+            </a:avLst>
+          </a:prstGeom>
+          <a:solidFill>
+            <a:srgbClr val="FFFFFF">
+              <a:shade val="85000"/>
+            </a:srgbClr>
+          </a:solidFill>
+          <a:ln>
+            <a:noFill/>
+          </a:ln>
+          <a:effectLst>
+            <a:reflection blurRad="12700" stA="38000" endPos="28000" dist="5000" dir="5400000" sy="-100000" algn="bl" rotWithShape="0"/>
+          </a:effectLst>
+        </p:spPr>
+      </p:pic>
+      <p:sp>
+        <p:nvSpPr>
+          <p:cNvPr id="5" name="TextBox 4">
+            <a:extLst>
+              <a:ext uri="{FF2B5EF4-FFF2-40B4-BE49-F238E27FC236}">
+                <a16:creationId xmlns:a16="http://schemas.microsoft.com/office/drawing/2014/main" id="{F3FE0AFC-1CDF-8E1E-1372-77ACF0F5C32F}"/>
+              </a:ext>
+            </a:extLst>
+          </p:cNvPr>
+          <p:cNvSpPr txBox="1"/>
+          <p:nvPr/>
+        </p:nvSpPr>
+        <p:spPr>
+          <a:xfrm>
+            <a:off x="156830" y="0"/>
+            <a:ext cx="11760850" cy="523220"/>
+          </a:xfrm>
+          <a:prstGeom prst="rect">
+            <a:avLst/>
+          </a:prstGeom>
+          <a:noFill/>
+        </p:spPr>
+        <p:txBody>
+          <a:bodyPr wrap="square">
+            <a:spAutoFit/>
+          </a:bodyPr>
+          <a:lstStyle/>
+          <a:p>
+            <a:r>
+              <a:rPr lang="en-US" sz="2800" b="1" dirty="0">
+                <a:latin typeface="Algerian" panose="04020705040A02060702" pitchFamily="82" charset="0"/>
+              </a:rPr>
+              <a:t>Prophet model forecast analysis</a:t>
+            </a:r>
+            <a:endParaRPr lang="en-IN" sz="2800" b="1" dirty="0">
+              <a:latin typeface="Algerian" panose="04020705040A02060702" pitchFamily="82" charset="0"/>
+            </a:endParaRPr>
+          </a:p>
+        </p:txBody>
+      </p:sp>
+      <p:sp>
+        <p:nvSpPr>
+          <p:cNvPr id="7" name="TextBox 6">
+            <a:extLst>
+              <a:ext uri="{FF2B5EF4-FFF2-40B4-BE49-F238E27FC236}">
+                <a16:creationId xmlns:a16="http://schemas.microsoft.com/office/drawing/2014/main" id="{752E08E0-A2C7-2525-D631-526D458774DB}"/>
+              </a:ext>
+            </a:extLst>
+          </p:cNvPr>
+          <p:cNvSpPr txBox="1"/>
+          <p:nvPr/>
+        </p:nvSpPr>
+        <p:spPr>
+          <a:xfrm>
+            <a:off x="274319" y="3862540"/>
+            <a:ext cx="11643359" cy="2862322"/>
+          </a:xfrm>
+          <a:prstGeom prst="rect">
+            <a:avLst/>
+          </a:prstGeom>
+          <a:noFill/>
+        </p:spPr>
+        <p:txBody>
+          <a:bodyPr wrap="square">
+            <a:spAutoFit/>
+          </a:bodyPr>
+          <a:lstStyle/>
+          <a:p>
+            <a:r>
+              <a:rPr lang="en-IN" sz="1000" b="1" dirty="0">
+                <a:solidFill>
+                  <a:schemeClr val="accent2">
+                    <a:lumMod val="50000"/>
+                  </a:schemeClr>
+                </a:solidFill>
+                <a:latin typeface="Algerian" panose="04020705040A02060702" pitchFamily="82" charset="0"/>
+              </a:rPr>
+              <a:t>Interpretation</a:t>
+            </a:r>
+          </a:p>
+          <a:p>
+            <a:r>
+              <a:rPr lang="en-IN" sz="1000" dirty="0">
+                <a:latin typeface="Algerian" panose="04020705040A02060702" pitchFamily="82" charset="0"/>
+              </a:rPr>
+              <a:t>The Prophet model generates forecasts for future sales data, plotting forecasted values and uncertainty intervals against observed data points. Black dots represent observed data, the blue line depicts forecasted values, and sky-blue bars signify uncertainty intervals.</a:t>
+            </a:r>
+          </a:p>
+          <a:p>
+            <a:endParaRPr lang="en-IN" sz="1000" dirty="0">
+              <a:latin typeface="Algerian" panose="04020705040A02060702" pitchFamily="82" charset="0"/>
+            </a:endParaRPr>
+          </a:p>
+          <a:p>
+            <a:r>
+              <a:rPr lang="en-IN" sz="1000" b="1" dirty="0">
+                <a:solidFill>
+                  <a:schemeClr val="accent2">
+                    <a:lumMod val="50000"/>
+                  </a:schemeClr>
+                </a:solidFill>
+                <a:latin typeface="Algerian" panose="04020705040A02060702" pitchFamily="82" charset="0"/>
+              </a:rPr>
+              <a:t>Analysis</a:t>
+            </a:r>
+          </a:p>
+          <a:p>
+            <a:r>
+              <a:rPr lang="en-IN" sz="1000" dirty="0">
+                <a:latin typeface="Algerian" panose="04020705040A02060702" pitchFamily="82" charset="0"/>
+              </a:rPr>
+              <a:t>Observed Data Points: Black dots represent actual sales data observed over time.</a:t>
+            </a:r>
+          </a:p>
+          <a:p>
+            <a:r>
+              <a:rPr lang="en-IN" sz="1000" dirty="0">
+                <a:latin typeface="Algerian" panose="04020705040A02060702" pitchFamily="82" charset="0"/>
+              </a:rPr>
+              <a:t>Forecasted Values: Blue line displays forecasted sales values generated by the Prophet model for future time periods, indicating expected sales trends.</a:t>
+            </a:r>
+          </a:p>
+          <a:p>
+            <a:r>
+              <a:rPr lang="en-IN" sz="1000" dirty="0">
+                <a:latin typeface="Algerian" panose="04020705040A02060702" pitchFamily="82" charset="0"/>
+              </a:rPr>
+              <a:t>Uncertainty Intervals: Sky-blue bars around forecasted values represent uncertainty intervals, indicating the range within which actual sales values are likely to fall with confidence levels. Wider intervals imply higher uncertainty.</a:t>
+            </a:r>
+          </a:p>
+          <a:p>
+            <a:r>
+              <a:rPr lang="en-IN" sz="1000" dirty="0">
+                <a:latin typeface="Algerian" panose="04020705040A02060702" pitchFamily="82" charset="0"/>
+              </a:rPr>
+              <a:t>Model Performance: Visual inspection assesses how well the Prophet model captures underlying patterns and dynamics in sales data, with good model fit evidenced by close alignment between forecasted values and observed data points, and uncertainty intervals capturing data variability.</a:t>
+            </a:r>
+          </a:p>
+          <a:p>
+            <a:endParaRPr lang="en-IN" sz="1000" dirty="0">
+              <a:latin typeface="Algerian" panose="04020705040A02060702" pitchFamily="82" charset="0"/>
+            </a:endParaRPr>
+          </a:p>
+          <a:p>
+            <a:r>
+              <a:rPr lang="en-IN" sz="1000" b="1" dirty="0">
+                <a:solidFill>
+                  <a:schemeClr val="accent2">
+                    <a:lumMod val="50000"/>
+                  </a:schemeClr>
+                </a:solidFill>
+                <a:latin typeface="Algerian" panose="04020705040A02060702" pitchFamily="82" charset="0"/>
+              </a:rPr>
+              <a:t>Conclusion</a:t>
+            </a:r>
+          </a:p>
+          <a:p>
+            <a:r>
+              <a:rPr lang="en-IN" sz="1000" dirty="0">
+                <a:latin typeface="Algerian" panose="04020705040A02060702" pitchFamily="82" charset="0"/>
+              </a:rPr>
+              <a:t>Prophet model-generated plot offers insights into forecasted sales trends and uncertainty estimates.</a:t>
+            </a:r>
+          </a:p>
+          <a:p>
+            <a:r>
+              <a:rPr lang="en-IN" sz="1000" dirty="0">
+                <a:latin typeface="Algerian" panose="04020705040A02060702" pitchFamily="82" charset="0"/>
+              </a:rPr>
+              <a:t>Observations, forecasts, and uncertainty intervals contribute to comprehensive understanding of future sales </a:t>
+            </a:r>
+            <a:r>
+              <a:rPr lang="en-IN" sz="1000" dirty="0" err="1">
+                <a:latin typeface="Algerian" panose="04020705040A02060702" pitchFamily="82" charset="0"/>
+              </a:rPr>
+              <a:t>behavior</a:t>
+            </a:r>
+            <a:r>
+              <a:rPr lang="en-IN" sz="1000" dirty="0">
+                <a:latin typeface="Algerian" panose="04020705040A02060702" pitchFamily="82" charset="0"/>
+              </a:rPr>
+              <a:t>.</a:t>
+            </a:r>
+          </a:p>
+          <a:p>
+            <a:r>
+              <a:rPr lang="en-IN" sz="1000" dirty="0">
+                <a:latin typeface="Algerian" panose="04020705040A02060702" pitchFamily="82" charset="0"/>
+              </a:rPr>
+              <a:t>Further analysis, including accuracy assessment and investigation of deviations, validates Prophet model performance for reliable decision-making.</a:t>
+            </a:r>
+          </a:p>
+          <a:p>
+            <a:endParaRPr lang="en-IN" sz="1000" dirty="0">
+              <a:latin typeface="Algerian" panose="04020705040A02060702" pitchFamily="82" charset="0"/>
+            </a:endParaRPr>
+          </a:p>
+          <a:p>
+            <a:endParaRPr lang="en-IN" sz="1000" dirty="0">
+              <a:latin typeface="Algerian" panose="04020705040A02060702" pitchFamily="82" charset="0"/>
+            </a:endParaRPr>
+          </a:p>
+        </p:txBody>
+      </p:sp>
+    </p:spTree>
+    <p:extLst>
+      <p:ext uri="{BB962C8B-B14F-4D97-AF65-F5344CB8AC3E}">
+        <p14:creationId xmlns:p14="http://schemas.microsoft.com/office/powerpoint/2010/main" val="3108763765"/>
+      </p:ext>
+    </p:extLst>
+  </p:cSld>
+  <p:clrMapOvr>
+    <a:masterClrMapping/>
+  </p:clrMapOvr>
+</p:sld>
+</file>
+
+<file path=ppt/slides/slide15.xml><?xml version="1.0" encoding="utf-8"?>
+<p:sld xmlns:a="http://schemas.openxmlformats.org/drawingml/2006/main" xmlns:r="http://schemas.openxmlformats.org/officeDocument/2006/relationships" xmlns:p="http://schemas.openxmlformats.org/presentationml/2006/main">
+  <p:cSld>
+    <p:bg>
+      <p:bgPr>
+        <a:gradFill>
+          <a:gsLst>
+            <a:gs pos="0">
+              <a:schemeClr val="accent6">
+                <a:lumMod val="40000"/>
+                <a:lumOff val="60000"/>
+              </a:schemeClr>
+            </a:gs>
+            <a:gs pos="74000">
+              <a:schemeClr val="accent1">
+                <a:lumMod val="45000"/>
+                <a:lumOff val="55000"/>
+              </a:schemeClr>
+            </a:gs>
+            <a:gs pos="83000">
+              <a:schemeClr val="accent1">
+                <a:lumMod val="45000"/>
+                <a:lumOff val="55000"/>
+              </a:schemeClr>
+            </a:gs>
+            <a:gs pos="100000">
+              <a:schemeClr val="accent1">
+                <a:lumMod val="30000"/>
+                <a:lumOff val="70000"/>
+              </a:schemeClr>
+            </a:gs>
+          </a:gsLst>
+          <a:lin ang="5400000" scaled="1"/>
+        </a:gradFill>
+        <a:effectLst/>
+      </p:bgPr>
+    </p:bg>
+    <p:spTree>
+      <p:nvGrpSpPr>
+        <p:cNvPr id="1" name=""/>
+        <p:cNvGrpSpPr/>
+        <p:nvPr/>
+      </p:nvGrpSpPr>
+      <p:grpSpPr>
+        <a:xfrm>
+          <a:off x="0" y="0"/>
+          <a:ext cx="0" cy="0"/>
+          <a:chOff x="0" y="0"/>
+          <a:chExt cx="0" cy="0"/>
+        </a:xfrm>
+      </p:grpSpPr>
+      <p:pic>
+        <p:nvPicPr>
+          <p:cNvPr id="3" name="Picture 2">
+            <a:extLst>
+              <a:ext uri="{FF2B5EF4-FFF2-40B4-BE49-F238E27FC236}">
+                <a16:creationId xmlns:a16="http://schemas.microsoft.com/office/drawing/2014/main" id="{A9EAE35C-0CE2-8A53-A82E-0998CDA151BF}"/>
+              </a:ext>
+            </a:extLst>
+          </p:cNvPr>
+          <p:cNvPicPr>
+            <a:picLocks noChangeAspect="1"/>
+          </p:cNvPicPr>
+          <p:nvPr/>
+        </p:nvPicPr>
+        <p:blipFill>
+          <a:blip r:embed="rId2">
+            <a:extLst>
+              <a:ext uri="{28A0092B-C50C-407E-A947-70E740481C1C}">
+                <a14:useLocalDpi xmlns:a14="http://schemas.microsoft.com/office/drawing/2010/main" val="0"/>
+              </a:ext>
+            </a:extLst>
+          </a:blip>
+          <a:stretch>
+            <a:fillRect/>
+          </a:stretch>
+        </p:blipFill>
+        <p:spPr>
+          <a:xfrm>
+            <a:off x="425302" y="1324714"/>
+            <a:ext cx="10918215" cy="3409246"/>
+          </a:xfrm>
+          <a:prstGeom prst="roundRect">
+            <a:avLst>
+              <a:gd name="adj" fmla="val 8594"/>
+            </a:avLst>
+          </a:prstGeom>
+          <a:solidFill>
+            <a:srgbClr val="FFFFFF">
+              <a:shade val="85000"/>
+            </a:srgbClr>
+          </a:solidFill>
+          <a:ln>
+            <a:noFill/>
+          </a:ln>
+          <a:effectLst>
+            <a:reflection blurRad="12700" stA="38000" endPos="28000" dist="5000" dir="5400000" sy="-100000" algn="bl" rotWithShape="0"/>
+          </a:effectLst>
+        </p:spPr>
+      </p:pic>
+      <p:sp>
+        <p:nvSpPr>
+          <p:cNvPr id="7" name="TextBox 6">
+            <a:extLst>
+              <a:ext uri="{FF2B5EF4-FFF2-40B4-BE49-F238E27FC236}">
+                <a16:creationId xmlns:a16="http://schemas.microsoft.com/office/drawing/2014/main" id="{ACFEBE37-5CB5-5E88-14CF-DA0D1BE888FD}"/>
+              </a:ext>
+            </a:extLst>
+          </p:cNvPr>
+          <p:cNvSpPr txBox="1"/>
+          <p:nvPr/>
+        </p:nvSpPr>
+        <p:spPr>
+          <a:xfrm>
+            <a:off x="274318" y="4800477"/>
+            <a:ext cx="11643359" cy="1477328"/>
+          </a:xfrm>
+          <a:prstGeom prst="rect">
+            <a:avLst/>
+          </a:prstGeom>
+          <a:noFill/>
+        </p:spPr>
+        <p:txBody>
+          <a:bodyPr wrap="square">
+            <a:spAutoFit/>
+          </a:bodyPr>
+          <a:lstStyle/>
+          <a:p>
+            <a:r>
+              <a:rPr lang="en-IN" dirty="0">
+                <a:latin typeface="Algerian" panose="04020705040A02060702" pitchFamily="82" charset="0"/>
+              </a:rPr>
+              <a:t>The plot illustrates the forecasted sales for the next 6 weeks based on historical sales data. The original sales data, represented by the blue line, shows past sales trends, while the forecasted sales, depicted by the orange line, indicate projected sales for the upcoming weeks. The forecast provides valuable insights for business planning and decision-making, allowing stakeholders to anticipate future sales trends and adjust strategies accordingly.</a:t>
+            </a:r>
+          </a:p>
+        </p:txBody>
+      </p:sp>
+      <p:sp>
+        <p:nvSpPr>
+          <p:cNvPr id="10" name="TextBox 9">
+            <a:extLst>
+              <a:ext uri="{FF2B5EF4-FFF2-40B4-BE49-F238E27FC236}">
+                <a16:creationId xmlns:a16="http://schemas.microsoft.com/office/drawing/2014/main" id="{74874B38-F37C-F13D-1CFE-1D92CFCC44EE}"/>
+              </a:ext>
+            </a:extLst>
+          </p:cNvPr>
+          <p:cNvSpPr txBox="1"/>
+          <p:nvPr/>
+        </p:nvSpPr>
+        <p:spPr>
+          <a:xfrm>
+            <a:off x="274317" y="370607"/>
+            <a:ext cx="11643359" cy="954107"/>
+          </a:xfrm>
+          <a:prstGeom prst="rect">
+            <a:avLst/>
+          </a:prstGeom>
+          <a:noFill/>
+        </p:spPr>
+        <p:txBody>
+          <a:bodyPr wrap="square">
+            <a:spAutoFit/>
+          </a:bodyPr>
+          <a:lstStyle/>
+          <a:p>
+            <a:r>
+              <a:rPr lang="en-IN" sz="2800" dirty="0" err="1">
+                <a:latin typeface="Algerian" panose="04020705040A02060702" pitchFamily="82" charset="0"/>
+              </a:rPr>
+              <a:t>Lstm</a:t>
+            </a:r>
+            <a:r>
+              <a:rPr lang="en-IN" sz="2800" dirty="0">
+                <a:latin typeface="Algerian" panose="04020705040A02060702" pitchFamily="82" charset="0"/>
+              </a:rPr>
+              <a:t> model Forecasted Sales Trends: Insights for the Next 6 Weeks</a:t>
+            </a:r>
+          </a:p>
+        </p:txBody>
+      </p:sp>
+    </p:spTree>
+    <p:extLst>
+      <p:ext uri="{BB962C8B-B14F-4D97-AF65-F5344CB8AC3E}">
+        <p14:creationId xmlns:p14="http://schemas.microsoft.com/office/powerpoint/2010/main" val="2006132898"/>
+      </p:ext>
+    </p:extLst>
+  </p:cSld>
+  <p:clrMapOvr>
+    <a:masterClrMapping/>
+  </p:clrMapOvr>
+</p:sld>
+</file>
+
+<file path=ppt/slides/slide16.xml><?xml version="1.0" encoding="utf-8"?>
+<p:sld xmlns:a="http://schemas.openxmlformats.org/drawingml/2006/main" xmlns:r="http://schemas.openxmlformats.org/officeDocument/2006/relationships" xmlns:p="http://schemas.openxmlformats.org/presentationml/2006/main">
+  <p:cSld>
+    <p:bg>
+      <p:bgPr>
+        <a:gradFill>
+          <a:gsLst>
+            <a:gs pos="0">
+              <a:schemeClr val="accent6">
+                <a:lumMod val="40000"/>
+                <a:lumOff val="60000"/>
+              </a:schemeClr>
+            </a:gs>
+            <a:gs pos="74000">
+              <a:schemeClr val="accent1">
+                <a:lumMod val="45000"/>
+                <a:lumOff val="55000"/>
+              </a:schemeClr>
+            </a:gs>
+            <a:gs pos="83000">
+              <a:schemeClr val="accent1">
+                <a:lumMod val="45000"/>
+                <a:lumOff val="55000"/>
+              </a:schemeClr>
+            </a:gs>
+            <a:gs pos="100000">
+              <a:schemeClr val="accent1">
+                <a:lumMod val="30000"/>
+                <a:lumOff val="70000"/>
+              </a:schemeClr>
+            </a:gs>
+          </a:gsLst>
+          <a:lin ang="5400000" scaled="1"/>
+        </a:gradFill>
+        <a:effectLst/>
+      </p:bgPr>
+    </p:bg>
+    <p:spTree>
+      <p:nvGrpSpPr>
+        <p:cNvPr id="1" name=""/>
+        <p:cNvGrpSpPr/>
+        <p:nvPr/>
+      </p:nvGrpSpPr>
+      <p:grpSpPr>
+        <a:xfrm>
+          <a:off x="0" y="0"/>
+          <a:ext cx="0" cy="0"/>
+          <a:chOff x="0" y="0"/>
+          <a:chExt cx="0" cy="0"/>
+        </a:xfrm>
+      </p:grpSpPr>
+      <p:sp>
+        <p:nvSpPr>
+          <p:cNvPr id="2" name="TextBox 1">
+            <a:extLst>
+              <a:ext uri="{FF2B5EF4-FFF2-40B4-BE49-F238E27FC236}">
+                <a16:creationId xmlns:a16="http://schemas.microsoft.com/office/drawing/2014/main" id="{6A380C45-8A12-50FF-605B-BD6AF361E2FF}"/>
+              </a:ext>
+            </a:extLst>
+          </p:cNvPr>
+          <p:cNvSpPr txBox="1"/>
+          <p:nvPr/>
+        </p:nvSpPr>
+        <p:spPr>
+          <a:xfrm>
+            <a:off x="701750" y="1350334"/>
+            <a:ext cx="10487246" cy="3170099"/>
+          </a:xfrm>
+          <a:prstGeom prst="rect">
+            <a:avLst/>
+          </a:prstGeom>
+          <a:noFill/>
+        </p:spPr>
+        <p:txBody>
+          <a:bodyPr wrap="square" rtlCol="0">
+            <a:spAutoFit/>
+          </a:bodyPr>
+          <a:lstStyle/>
+          <a:p>
+            <a:r>
+              <a:rPr lang="en-IN" sz="20000" b="1" dirty="0">
+                <a:solidFill>
+                  <a:schemeClr val="accent2">
+                    <a:lumMod val="50000"/>
+                  </a:schemeClr>
+                </a:solidFill>
+                <a:latin typeface="Edwardian Script ITC" panose="030303020407070D0804" pitchFamily="66" charset="0"/>
+              </a:rPr>
+              <a:t>Thank You!</a:t>
+            </a:r>
+          </a:p>
+        </p:txBody>
+      </p:sp>
+    </p:spTree>
+    <p:extLst>
+      <p:ext uri="{BB962C8B-B14F-4D97-AF65-F5344CB8AC3E}">
+        <p14:creationId xmlns:p14="http://schemas.microsoft.com/office/powerpoint/2010/main" val="773924918"/>
+      </p:ext>
+    </p:extLst>
+  </p:cSld>
+  <p:clrMapOvr>
+    <a:masterClrMapping/>
+  </p:clrMapOvr>
+</p:sld>
+</file>
+
 <file path=ppt/slides/slide2.xml><?xml version="1.0" encoding="utf-8"?>
 <p:sld xmlns:a="http://schemas.openxmlformats.org/drawingml/2006/main" xmlns:r="http://schemas.openxmlformats.org/officeDocument/2006/relationships" xmlns:p="http://schemas.openxmlformats.org/presentationml/2006/main">
   <p:cSld>
@@ -4261,9 +5961,22 @@
             <a:off x="430368" y="1664165"/>
             <a:ext cx="4613964" cy="4665231"/>
           </a:xfrm>
-          <a:prstGeom prst="rect">
-            <a:avLst/>
+          <a:prstGeom prst="roundRect">
+            <a:avLst>
+              <a:gd name="adj" fmla="val 8594"/>
+            </a:avLst>
           </a:prstGeom>
+          <a:solidFill>
+            <a:srgbClr val="FFFFFF">
+              <a:shade val="85000"/>
+            </a:srgbClr>
+          </a:solidFill>
+          <a:ln>
+            <a:noFill/>
+          </a:ln>
+          <a:effectLst>
+            <a:reflection blurRad="12700" stA="38000" endPos="28000" dist="5000" dir="5400000" sy="-100000" algn="bl" rotWithShape="0"/>
+          </a:effectLst>
         </p:spPr>
       </p:pic>
       <p:sp>
@@ -4708,18 +6421,30 @@
               </a:ext>
             </a:extLst>
           </a:blip>
-          <a:stretch>
-            <a:fillRect/>
-          </a:stretch>
+          <a:srcRect t="5906" b="5906"/>
+          <a:stretch/>
         </p:blipFill>
         <p:spPr>
           <a:xfrm>
             <a:off x="358134" y="1324074"/>
             <a:ext cx="6006242" cy="4824849"/>
           </a:xfrm>
-          <a:prstGeom prst="rect">
-            <a:avLst/>
+          <a:prstGeom prst="roundRect">
+            <a:avLst>
+              <a:gd name="adj" fmla="val 8594"/>
+            </a:avLst>
           </a:prstGeom>
+          <a:solidFill>
+            <a:srgbClr val="FFFFFF">
+              <a:shade val="85000"/>
+            </a:srgbClr>
+          </a:solidFill>
+          <a:ln>
+            <a:noFill/>
+          </a:ln>
+          <a:effectLst>
+            <a:reflection blurRad="12700" stA="38000" endPos="28000" dist="5000" dir="5400000" sy="-100000" algn="bl" rotWithShape="0"/>
+          </a:effectLst>
         </p:spPr>
       </p:pic>
       <p:sp>
@@ -4783,6 +6508,311 @@
             <a:endParaRPr lang="en-IN" sz="4000" b="1" dirty="0">
               <a:latin typeface="Algerian" panose="04020705040A02060702" pitchFamily="82" charset="0"/>
             </a:endParaRPr>
+          </a:p>
+        </p:txBody>
+      </p:sp>
+      <p:sp>
+        <p:nvSpPr>
+          <p:cNvPr id="2" name="TextBox 1">
+            <a:extLst>
+              <a:ext uri="{FF2B5EF4-FFF2-40B4-BE49-F238E27FC236}">
+                <a16:creationId xmlns:a16="http://schemas.microsoft.com/office/drawing/2014/main" id="{385CDD0B-CA95-E4B0-9397-E88E8C35BD98}"/>
+              </a:ext>
+            </a:extLst>
+          </p:cNvPr>
+          <p:cNvSpPr txBox="1"/>
+          <p:nvPr/>
+        </p:nvSpPr>
+        <p:spPr>
+          <a:xfrm>
+            <a:off x="6488436" y="889735"/>
+            <a:ext cx="5345430" cy="5447645"/>
+          </a:xfrm>
+          <a:prstGeom prst="rect">
+            <a:avLst/>
+          </a:prstGeom>
+          <a:noFill/>
+        </p:spPr>
+        <p:txBody>
+          <a:bodyPr wrap="square">
+            <a:spAutoFit/>
+          </a:bodyPr>
+          <a:lstStyle/>
+          <a:p>
+            <a:r>
+              <a:rPr lang="en-US" sz="1200" b="1" i="0" dirty="0">
+                <a:solidFill>
+                  <a:schemeClr val="accent2">
+                    <a:lumMod val="50000"/>
+                  </a:schemeClr>
+                </a:solidFill>
+                <a:effectLst/>
+                <a:latin typeface="Algerian" panose="04020705040A02060702" pitchFamily="82" charset="0"/>
+              </a:rPr>
+              <a:t>Interpretation:</a:t>
+            </a:r>
+          </a:p>
+          <a:p>
+            <a:endParaRPr lang="en-US" sz="1200" b="0" i="0" dirty="0">
+              <a:solidFill>
+                <a:srgbClr val="0D0D0D"/>
+              </a:solidFill>
+              <a:effectLst/>
+              <a:latin typeface="Algerian" panose="04020705040A02060702" pitchFamily="82" charset="0"/>
+            </a:endParaRPr>
+          </a:p>
+          <a:p>
+            <a:r>
+              <a:rPr lang="en-US" sz="1200" b="0" i="0" dirty="0">
+                <a:solidFill>
+                  <a:srgbClr val="0D0D0D"/>
+                </a:solidFill>
+                <a:effectLst/>
+                <a:latin typeface="Algerian" panose="04020705040A02060702" pitchFamily="82" charset="0"/>
+              </a:rPr>
+              <a:t>Heatmap displays correlation coefficients between selected numerical variables.</a:t>
+            </a:r>
+          </a:p>
+          <a:p>
+            <a:pPr marL="171450" indent="-171450">
+              <a:buFont typeface="Arial" panose="020B0604020202020204" pitchFamily="34" charset="0"/>
+              <a:buChar char="•"/>
+            </a:pPr>
+            <a:r>
+              <a:rPr lang="en-US" sz="1200" b="0" i="0" dirty="0">
+                <a:solidFill>
+                  <a:srgbClr val="0D0D0D"/>
+                </a:solidFill>
+                <a:effectLst/>
+                <a:latin typeface="Algerian" panose="04020705040A02060702" pitchFamily="82" charset="0"/>
+              </a:rPr>
+              <a:t>Correlation ranges from -1 to 1:</a:t>
+            </a:r>
+          </a:p>
+          <a:p>
+            <a:r>
+              <a:rPr lang="en-US" sz="1200" b="0" i="0" dirty="0">
+                <a:solidFill>
+                  <a:srgbClr val="0D0D0D"/>
+                </a:solidFill>
+                <a:effectLst/>
+                <a:latin typeface="Algerian" panose="04020705040A02060702" pitchFamily="82" charset="0"/>
+              </a:rPr>
+              <a:t>          1: Perfect positive correlation</a:t>
+            </a:r>
+          </a:p>
+          <a:p>
+            <a:r>
+              <a:rPr lang="en-US" sz="1200" b="0" i="0" dirty="0">
+                <a:solidFill>
+                  <a:srgbClr val="0D0D0D"/>
+                </a:solidFill>
+                <a:effectLst/>
+                <a:latin typeface="Algerian" panose="04020705040A02060702" pitchFamily="82" charset="0"/>
+              </a:rPr>
+              <a:t>         -1: Perfect negative correlation</a:t>
+            </a:r>
+          </a:p>
+          <a:p>
+            <a:r>
+              <a:rPr lang="en-US" sz="1200" b="0" i="0" dirty="0">
+                <a:solidFill>
+                  <a:srgbClr val="0D0D0D"/>
+                </a:solidFill>
+                <a:effectLst/>
+                <a:latin typeface="Algerian" panose="04020705040A02060702" pitchFamily="82" charset="0"/>
+              </a:rPr>
+              <a:t>          0: No correlation</a:t>
+            </a:r>
+          </a:p>
+          <a:p>
+            <a:pPr marL="171450" indent="-171450">
+              <a:buFont typeface="Arial" panose="020B0604020202020204" pitchFamily="34" charset="0"/>
+              <a:buChar char="•"/>
+            </a:pPr>
+            <a:r>
+              <a:rPr lang="en-US" sz="1200" b="0" i="0" dirty="0">
+                <a:solidFill>
+                  <a:srgbClr val="0D0D0D"/>
+                </a:solidFill>
+                <a:effectLst/>
+                <a:latin typeface="Algerian" panose="04020705040A02060702" pitchFamily="82" charset="0"/>
+              </a:rPr>
+              <a:t>Positive correlation: Both variables tend to increase.</a:t>
+            </a:r>
+          </a:p>
+          <a:p>
+            <a:pPr marL="171450" indent="-171450">
+              <a:buFont typeface="Arial" panose="020B0604020202020204" pitchFamily="34" charset="0"/>
+              <a:buChar char="•"/>
+            </a:pPr>
+            <a:r>
+              <a:rPr lang="en-US" sz="1200" b="0" i="0" dirty="0">
+                <a:solidFill>
+                  <a:srgbClr val="0D0D0D"/>
+                </a:solidFill>
+                <a:effectLst/>
+                <a:latin typeface="Algerian" panose="04020705040A02060702" pitchFamily="82" charset="0"/>
+              </a:rPr>
+              <a:t>Negative correlation: One variable increases while the other decreases.</a:t>
+            </a:r>
+          </a:p>
+          <a:p>
+            <a:pPr marL="171450" indent="-171450">
+              <a:buFont typeface="Arial" panose="020B0604020202020204" pitchFamily="34" charset="0"/>
+              <a:buChar char="•"/>
+            </a:pPr>
+            <a:r>
+              <a:rPr lang="en-US" sz="1200" b="0" i="0" dirty="0">
+                <a:solidFill>
+                  <a:srgbClr val="0D0D0D"/>
+                </a:solidFill>
+                <a:effectLst/>
+                <a:latin typeface="Algerian" panose="04020705040A02060702" pitchFamily="82" charset="0"/>
+              </a:rPr>
+              <a:t>Annotations show correlation strength.</a:t>
+            </a:r>
+          </a:p>
+          <a:p>
+            <a:endParaRPr lang="en-US" sz="1200" dirty="0">
+              <a:solidFill>
+                <a:srgbClr val="0D0D0D"/>
+              </a:solidFill>
+              <a:latin typeface="Algerian" panose="04020705040A02060702" pitchFamily="82" charset="0"/>
+            </a:endParaRPr>
+          </a:p>
+          <a:p>
+            <a:r>
+              <a:rPr lang="en-US" sz="1200" b="1" i="0" dirty="0">
+                <a:solidFill>
+                  <a:schemeClr val="accent2">
+                    <a:lumMod val="50000"/>
+                  </a:schemeClr>
+                </a:solidFill>
+                <a:effectLst/>
+                <a:latin typeface="Algerian" panose="04020705040A02060702" pitchFamily="82" charset="0"/>
+              </a:rPr>
+              <a:t>Analysis:</a:t>
+            </a:r>
+          </a:p>
+          <a:p>
+            <a:endParaRPr lang="en-US" sz="1200" b="0" i="0" dirty="0">
+              <a:solidFill>
+                <a:srgbClr val="0D0D0D"/>
+              </a:solidFill>
+              <a:effectLst/>
+              <a:latin typeface="Algerian" panose="04020705040A02060702" pitchFamily="82" charset="0"/>
+            </a:endParaRPr>
+          </a:p>
+          <a:p>
+            <a:r>
+              <a:rPr lang="en-US" sz="1200" b="1" i="0" dirty="0">
+                <a:solidFill>
+                  <a:schemeClr val="accent2">
+                    <a:lumMod val="50000"/>
+                  </a:schemeClr>
+                </a:solidFill>
+                <a:effectLst/>
+                <a:latin typeface="Algerian" panose="04020705040A02060702" pitchFamily="82" charset="0"/>
+              </a:rPr>
+              <a:t>Competition Open Since Month &amp; Competition Open Since Year: </a:t>
+            </a:r>
+            <a:r>
+              <a:rPr lang="en-US" sz="1200" b="0" i="0" dirty="0">
+                <a:solidFill>
+                  <a:srgbClr val="0D0D0D"/>
+                </a:solidFill>
+                <a:effectLst/>
+                <a:latin typeface="Algerian" panose="04020705040A02060702" pitchFamily="82" charset="0"/>
+              </a:rPr>
+              <a:t>Strong positive correlation (0.79), indicating stores tend to open in specific months and years together.</a:t>
+            </a:r>
+          </a:p>
+          <a:p>
+            <a:endParaRPr lang="en-US" sz="1200" b="1" i="0" dirty="0">
+              <a:solidFill>
+                <a:schemeClr val="accent2">
+                  <a:lumMod val="50000"/>
+                </a:schemeClr>
+              </a:solidFill>
+              <a:effectLst/>
+              <a:latin typeface="Algerian" panose="04020705040A02060702" pitchFamily="82" charset="0"/>
+            </a:endParaRPr>
+          </a:p>
+          <a:p>
+            <a:r>
+              <a:rPr lang="en-US" sz="1200" b="1" i="0" dirty="0">
+                <a:solidFill>
+                  <a:schemeClr val="accent2">
+                    <a:lumMod val="50000"/>
+                  </a:schemeClr>
+                </a:solidFill>
+                <a:effectLst/>
+                <a:latin typeface="Algerian" panose="04020705040A02060702" pitchFamily="82" charset="0"/>
+              </a:rPr>
+              <a:t>Promo2, Promo2SinceWeek, &amp; Promo2SinceYear:</a:t>
+            </a:r>
+          </a:p>
+          <a:p>
+            <a:pPr marL="171450" indent="-171450">
+              <a:buFont typeface="Arial" panose="020B0604020202020204" pitchFamily="34" charset="0"/>
+              <a:buChar char="•"/>
+            </a:pPr>
+            <a:endParaRPr lang="en-US" sz="1200" b="0" i="0" dirty="0">
+              <a:solidFill>
+                <a:srgbClr val="0D0D0D"/>
+              </a:solidFill>
+              <a:effectLst/>
+              <a:latin typeface="Algerian" panose="04020705040A02060702" pitchFamily="82" charset="0"/>
+            </a:endParaRPr>
+          </a:p>
+          <a:p>
+            <a:pPr marL="171450" indent="-171450">
+              <a:buFont typeface="Arial" panose="020B0604020202020204" pitchFamily="34" charset="0"/>
+              <a:buChar char="•"/>
+            </a:pPr>
+            <a:r>
+              <a:rPr lang="en-US" sz="1200" b="0" i="0" dirty="0">
+                <a:solidFill>
+                  <a:srgbClr val="0D0D0D"/>
+                </a:solidFill>
+                <a:effectLst/>
+                <a:latin typeface="Algerian" panose="04020705040A02060702" pitchFamily="82" charset="0"/>
+              </a:rPr>
+              <a:t>Strong positive correlation between Promo2 &amp; Promo2SinceWeek (0.76), suggesting promotions tend to start around specific weeks.</a:t>
+            </a:r>
+          </a:p>
+          <a:p>
+            <a:pPr marL="171450" indent="-171450">
+              <a:buFont typeface="Arial" panose="020B0604020202020204" pitchFamily="34" charset="0"/>
+              <a:buChar char="•"/>
+            </a:pPr>
+            <a:r>
+              <a:rPr lang="en-US" sz="1200" b="0" i="0" dirty="0">
+                <a:solidFill>
+                  <a:srgbClr val="0D0D0D"/>
+                </a:solidFill>
+                <a:effectLst/>
+                <a:latin typeface="Algerian" panose="04020705040A02060702" pitchFamily="82" charset="0"/>
+              </a:rPr>
+              <a:t>Perfect positive correlation between Promo2SinceWeek &amp; Promo2SinceYear (1.00), as they both represent Promo2 presence.</a:t>
+            </a:r>
+          </a:p>
+          <a:p>
+            <a:pPr marL="171450" indent="-171450">
+              <a:buFont typeface="Arial" panose="020B0604020202020204" pitchFamily="34" charset="0"/>
+              <a:buChar char="•"/>
+            </a:pPr>
+            <a:r>
+              <a:rPr lang="en-US" sz="1200" b="0" i="0" dirty="0">
+                <a:solidFill>
+                  <a:srgbClr val="0D0D0D"/>
+                </a:solidFill>
+                <a:effectLst/>
+                <a:latin typeface="Algerian" panose="04020705040A02060702" pitchFamily="82" charset="0"/>
+              </a:rPr>
+              <a:t>Promo2SinceWeek also correlates strongly with Promo2SinceYear (0.76), reinforcing the relationship.</a:t>
+            </a:r>
           </a:p>
         </p:txBody>
       </p:sp>
@@ -4932,14 +6962,226 @@
         </p:blipFill>
         <p:spPr>
           <a:xfrm>
-            <a:off x="274320" y="932684"/>
+            <a:off x="274320" y="1324074"/>
             <a:ext cx="6073913" cy="3925065"/>
+          </a:xfrm>
+          <a:prstGeom prst="roundRect">
+            <a:avLst>
+              <a:gd name="adj" fmla="val 8594"/>
+            </a:avLst>
+          </a:prstGeom>
+          <a:solidFill>
+            <a:srgbClr val="FFFFFF">
+              <a:shade val="85000"/>
+            </a:srgbClr>
+          </a:solidFill>
+          <a:ln>
+            <a:noFill/>
+          </a:ln>
+          <a:effectLst>
+            <a:reflection blurRad="12700" stA="38000" endPos="28000" dist="5000" dir="5400000" sy="-100000" algn="bl" rotWithShape="0"/>
+          </a:effectLst>
+        </p:spPr>
+      </p:pic>
+      <p:sp>
+        <p:nvSpPr>
+          <p:cNvPr id="3" name="TextBox 2">
+            <a:extLst>
+              <a:ext uri="{FF2B5EF4-FFF2-40B4-BE49-F238E27FC236}">
+                <a16:creationId xmlns:a16="http://schemas.microsoft.com/office/drawing/2014/main" id="{F27B8E5D-1F4E-CF69-1B18-C4289297BB3C}"/>
+              </a:ext>
+            </a:extLst>
+          </p:cNvPr>
+          <p:cNvSpPr txBox="1"/>
+          <p:nvPr/>
+        </p:nvSpPr>
+        <p:spPr>
+          <a:xfrm>
+            <a:off x="6395782" y="864980"/>
+            <a:ext cx="5796218" cy="5693866"/>
           </a:xfrm>
           <a:prstGeom prst="rect">
             <a:avLst/>
           </a:prstGeom>
+          <a:noFill/>
         </p:spPr>
-      </p:pic>
+        <p:txBody>
+          <a:bodyPr wrap="square">
+            <a:spAutoFit/>
+          </a:bodyPr>
+          <a:lstStyle/>
+          <a:p>
+            <a:r>
+              <a:rPr lang="en-IN" sz="1300" b="1" dirty="0">
+                <a:solidFill>
+                  <a:schemeClr val="accent2">
+                    <a:lumMod val="50000"/>
+                  </a:schemeClr>
+                </a:solidFill>
+                <a:latin typeface="Algerian" panose="04020705040A02060702" pitchFamily="82" charset="0"/>
+              </a:rPr>
+              <a:t>Analysis</a:t>
+            </a:r>
+          </a:p>
+          <a:p>
+            <a:r>
+              <a:rPr lang="en-IN" sz="1300" dirty="0">
+                <a:latin typeface="Algerian" panose="04020705040A02060702" pitchFamily="82" charset="0"/>
+              </a:rPr>
+              <a:t>Comparison of Competition Distances Across Store Types and Assortments:</a:t>
+            </a:r>
+          </a:p>
+          <a:p>
+            <a:endParaRPr lang="en-IN" sz="1300" dirty="0">
+              <a:latin typeface="Algerian" panose="04020705040A02060702" pitchFamily="82" charset="0"/>
+            </a:endParaRPr>
+          </a:p>
+          <a:p>
+            <a:r>
+              <a:rPr lang="en-IN" sz="1300" dirty="0">
+                <a:latin typeface="Algerian" panose="04020705040A02060702" pitchFamily="82" charset="0"/>
+              </a:rPr>
+              <a:t>Bar plot enables comparison of average competition distances across different store types, considering assortment types.</a:t>
+            </a:r>
+          </a:p>
+          <a:p>
+            <a:endParaRPr lang="en-IN" sz="1300" dirty="0">
+              <a:latin typeface="Algerian" panose="04020705040A02060702" pitchFamily="82" charset="0"/>
+            </a:endParaRPr>
+          </a:p>
+          <a:p>
+            <a:r>
+              <a:rPr lang="en-IN" sz="1300" dirty="0">
+                <a:latin typeface="Algerian" panose="04020705040A02060702" pitchFamily="82" charset="0"/>
+              </a:rPr>
+              <a:t>Variation in bar heights within each store type reflects differences in average competition distances based on assortment offered.</a:t>
+            </a:r>
+          </a:p>
+          <a:p>
+            <a:endParaRPr lang="en-IN" sz="1300" dirty="0">
+              <a:latin typeface="Algerian" panose="04020705040A02060702" pitchFamily="82" charset="0"/>
+            </a:endParaRPr>
+          </a:p>
+          <a:p>
+            <a:r>
+              <a:rPr lang="en-IN" sz="1300" b="1" dirty="0">
+                <a:solidFill>
+                  <a:schemeClr val="accent2">
+                    <a:lumMod val="50000"/>
+                  </a:schemeClr>
+                </a:solidFill>
+                <a:latin typeface="Algerian" panose="04020705040A02060702" pitchFamily="82" charset="0"/>
+              </a:rPr>
+              <a:t>Identification of Trends:</a:t>
+            </a:r>
+          </a:p>
+          <a:p>
+            <a:endParaRPr lang="en-IN" sz="1300" dirty="0">
+              <a:latin typeface="Algerian" panose="04020705040A02060702" pitchFamily="82" charset="0"/>
+            </a:endParaRPr>
+          </a:p>
+          <a:p>
+            <a:r>
+              <a:rPr lang="en-IN" sz="1300" dirty="0">
+                <a:latin typeface="Algerian" panose="04020705040A02060702" pitchFamily="82" charset="0"/>
+              </a:rPr>
+              <a:t>Relative heights of bars reveal trends in competition distances across store types and assortments.</a:t>
+            </a:r>
+          </a:p>
+          <a:p>
+            <a:r>
+              <a:rPr lang="en-IN" sz="1300" dirty="0">
+                <a:latin typeface="Algerian" panose="04020705040A02060702" pitchFamily="82" charset="0"/>
+              </a:rPr>
+              <a:t>Verification of Additional Information:</a:t>
+            </a:r>
+          </a:p>
+          <a:p>
+            <a:endParaRPr lang="en-IN" sz="1300" dirty="0">
+              <a:latin typeface="Algerian" panose="04020705040A02060702" pitchFamily="82" charset="0"/>
+            </a:endParaRPr>
+          </a:p>
+          <a:p>
+            <a:r>
+              <a:rPr lang="en-IN" sz="1300" dirty="0">
+                <a:latin typeface="Algerian" panose="04020705040A02060702" pitchFamily="82" charset="0"/>
+              </a:rPr>
+              <a:t>Heights of bars in the plot can cross-validate provided average competition distances for each combination of store type and assortment.</a:t>
+            </a:r>
+          </a:p>
+          <a:p>
+            <a:endParaRPr lang="en-IN" sz="1300" dirty="0">
+              <a:latin typeface="Algerian" panose="04020705040A02060702" pitchFamily="82" charset="0"/>
+            </a:endParaRPr>
+          </a:p>
+          <a:p>
+            <a:r>
+              <a:rPr lang="en-IN" sz="1300" b="1" dirty="0">
+                <a:solidFill>
+                  <a:schemeClr val="accent2">
+                    <a:lumMod val="50000"/>
+                  </a:schemeClr>
+                </a:solidFill>
+                <a:latin typeface="Algerian" panose="04020705040A02060702" pitchFamily="82" charset="0"/>
+              </a:rPr>
+              <a:t>Conclusion</a:t>
+            </a:r>
+          </a:p>
+          <a:p>
+            <a:endParaRPr lang="en-IN" sz="1300" dirty="0">
+              <a:latin typeface="Algerian" panose="04020705040A02060702" pitchFamily="82" charset="0"/>
+            </a:endParaRPr>
+          </a:p>
+          <a:p>
+            <a:r>
+              <a:rPr lang="en-IN" sz="1300" dirty="0">
+                <a:latin typeface="Algerian" panose="04020705040A02060702" pitchFamily="82" charset="0"/>
+              </a:rPr>
+              <a:t>The bar plot provides insights into competition distance variations across store types and assortments in the pharmaceutical retail dataset, aiding strategic decisions in assortment planning, site selection, and competitive positioning.</a:t>
+            </a:r>
+          </a:p>
+        </p:txBody>
+      </p:sp>
+      <p:sp>
+        <p:nvSpPr>
+          <p:cNvPr id="6" name="TextBox 5">
+            <a:extLst>
+              <a:ext uri="{FF2B5EF4-FFF2-40B4-BE49-F238E27FC236}">
+                <a16:creationId xmlns:a16="http://schemas.microsoft.com/office/drawing/2014/main" id="{3EAA9D3E-1DA9-9724-8E75-F5E10CC684DE}"/>
+              </a:ext>
+            </a:extLst>
+          </p:cNvPr>
+          <p:cNvSpPr txBox="1"/>
+          <p:nvPr/>
+        </p:nvSpPr>
+        <p:spPr>
+          <a:xfrm>
+            <a:off x="274320" y="62468"/>
+            <a:ext cx="11095374" cy="954107"/>
+          </a:xfrm>
+          <a:prstGeom prst="rect">
+            <a:avLst/>
+          </a:prstGeom>
+          <a:noFill/>
+        </p:spPr>
+        <p:txBody>
+          <a:bodyPr wrap="square">
+            <a:spAutoFit/>
+          </a:bodyPr>
+          <a:lstStyle/>
+          <a:p>
+            <a:r>
+              <a:rPr lang="en-US" sz="2800" b="1" dirty="0">
+                <a:latin typeface="Algerian" panose="04020705040A02060702" pitchFamily="82" charset="0"/>
+              </a:rPr>
+              <a:t>Analysis of Competition Distances Across Store Types and Assortments</a:t>
+            </a:r>
+            <a:endParaRPr lang="en-IN" sz="2800" b="1" dirty="0">
+              <a:latin typeface="Algerian" panose="04020705040A02060702" pitchFamily="82" charset="0"/>
+            </a:endParaRPr>
+          </a:p>
+        </p:txBody>
+      </p:sp>
     </p:spTree>
     <p:extLst>
       <p:ext uri="{BB962C8B-B14F-4D97-AF65-F5344CB8AC3E}">
@@ -5060,10 +7302,10 @@
       </p:sp>
       <p:pic>
         <p:nvPicPr>
-          <p:cNvPr id="3" name="Picture 2">
+          <p:cNvPr id="4" name="Picture 3">
             <a:extLst>
               <a:ext uri="{FF2B5EF4-FFF2-40B4-BE49-F238E27FC236}">
-                <a16:creationId xmlns:a16="http://schemas.microsoft.com/office/drawing/2014/main" id="{F59B1873-E7C1-FEB3-2ABC-4C9738D6E979}"/>
+                <a16:creationId xmlns:a16="http://schemas.microsoft.com/office/drawing/2014/main" id="{64DEF70A-D44D-11F0-B1D2-612943AC4E09}"/>
               </a:ext>
             </a:extLst>
           </p:cNvPr>
@@ -5086,14 +7328,347 @@
         </p:blipFill>
         <p:spPr>
           <a:xfrm>
-            <a:off x="455295" y="649768"/>
-            <a:ext cx="11281410" cy="2779232"/>
+            <a:off x="400050" y="498470"/>
+            <a:ext cx="11007090" cy="2711652"/>
+          </a:xfrm>
+          <a:prstGeom prst="roundRect">
+            <a:avLst>
+              <a:gd name="adj" fmla="val 8594"/>
+            </a:avLst>
+          </a:prstGeom>
+          <a:solidFill>
+            <a:srgbClr val="FFFFFF">
+              <a:shade val="85000"/>
+            </a:srgbClr>
+          </a:solidFill>
+          <a:ln>
+            <a:noFill/>
+          </a:ln>
+          <a:effectLst>
+            <a:reflection blurRad="12700" stA="38000" endPos="28000" dist="5000" dir="5400000" sy="-100000" algn="bl" rotWithShape="0"/>
+          </a:effectLst>
+        </p:spPr>
+      </p:pic>
+      <p:sp>
+        <p:nvSpPr>
+          <p:cNvPr id="8" name="TextBox 7">
+            <a:extLst>
+              <a:ext uri="{FF2B5EF4-FFF2-40B4-BE49-F238E27FC236}">
+                <a16:creationId xmlns:a16="http://schemas.microsoft.com/office/drawing/2014/main" id="{BA4BF8D4-7FDD-74B4-0DF3-DD75012822E4}"/>
+              </a:ext>
+            </a:extLst>
+          </p:cNvPr>
+          <p:cNvSpPr txBox="1"/>
+          <p:nvPr/>
+        </p:nvSpPr>
+        <p:spPr>
+          <a:xfrm>
+            <a:off x="400050" y="3368695"/>
+            <a:ext cx="6823710" cy="3016210"/>
           </a:xfrm>
           <a:prstGeom prst="rect">
             <a:avLst/>
           </a:prstGeom>
+          <a:noFill/>
         </p:spPr>
-      </p:pic>
+        <p:txBody>
+          <a:bodyPr wrap="square">
+            <a:spAutoFit/>
+          </a:bodyPr>
+          <a:lstStyle/>
+          <a:p>
+            <a:endParaRPr lang="en-IN" sz="1000" dirty="0">
+              <a:latin typeface="Algerian" panose="04020705040A02060702" pitchFamily="82" charset="0"/>
+            </a:endParaRPr>
+          </a:p>
+          <a:p>
+            <a:r>
+              <a:rPr lang="en-US" sz="1000" b="1" dirty="0">
+                <a:solidFill>
+                  <a:schemeClr val="accent2">
+                    <a:lumMod val="50000"/>
+                  </a:schemeClr>
+                </a:solidFill>
+                <a:latin typeface="Algerian" panose="04020705040A02060702" pitchFamily="82" charset="0"/>
+              </a:rPr>
+              <a:t>Distribution of Promo with Day of Week</a:t>
+            </a:r>
+          </a:p>
+          <a:p>
+            <a:r>
+              <a:rPr lang="en-US" sz="1000" dirty="0">
+                <a:latin typeface="Algerian" panose="04020705040A02060702" pitchFamily="82" charset="0"/>
+              </a:rPr>
+              <a:t>Across all days of the week (1 to 7), observations with "Promo" (1) consistently higher.</a:t>
+            </a:r>
+          </a:p>
+          <a:p>
+            <a:r>
+              <a:rPr lang="en-US" sz="1000" dirty="0">
+                <a:latin typeface="Algerian" panose="04020705040A02060702" pitchFamily="82" charset="0"/>
+              </a:rPr>
+              <a:t>Days 6 and 7 (Saturday and Sunday) have a significantly higher number of observations without "Promo" (&gt;140,000).</a:t>
+            </a:r>
+            <a:endParaRPr lang="en-IN" sz="1000" dirty="0">
+              <a:latin typeface="Algerian" panose="04020705040A02060702" pitchFamily="82" charset="0"/>
+            </a:endParaRPr>
+          </a:p>
+          <a:p>
+            <a:endParaRPr lang="en-IN" sz="1000" dirty="0">
+              <a:latin typeface="Algerian" panose="04020705040A02060702" pitchFamily="82" charset="0"/>
+            </a:endParaRPr>
+          </a:p>
+          <a:p>
+            <a:endParaRPr lang="en-IN" sz="1000" dirty="0">
+              <a:latin typeface="Algerian" panose="04020705040A02060702" pitchFamily="82" charset="0"/>
+            </a:endParaRPr>
+          </a:p>
+          <a:p>
+            <a:r>
+              <a:rPr lang="en-IN" sz="1000" b="1" dirty="0">
+                <a:solidFill>
+                  <a:schemeClr val="accent2">
+                    <a:lumMod val="50000"/>
+                  </a:schemeClr>
+                </a:solidFill>
+                <a:latin typeface="Algerian" panose="04020705040A02060702" pitchFamily="82" charset="0"/>
+              </a:rPr>
+              <a:t>Distribution of Promo with Open</a:t>
+            </a:r>
+          </a:p>
+          <a:p>
+            <a:r>
+              <a:rPr lang="en-IN" sz="1000" dirty="0">
+                <a:latin typeface="Algerian" panose="04020705040A02060702" pitchFamily="82" charset="0"/>
+              </a:rPr>
+              <a:t>When the store is closed (Open=0), observations without "Promo" substantially higher.</a:t>
+            </a:r>
+          </a:p>
+          <a:p>
+            <a:r>
+              <a:rPr lang="en-IN" sz="1000" dirty="0">
+                <a:latin typeface="Algerian" panose="04020705040A02060702" pitchFamily="82" charset="0"/>
+              </a:rPr>
+              <a:t>Suggests promotional activities less common when store closed.</a:t>
+            </a:r>
+          </a:p>
+          <a:p>
+            <a:endParaRPr lang="en-IN" sz="1000" dirty="0">
+              <a:latin typeface="Algerian" panose="04020705040A02060702" pitchFamily="82" charset="0"/>
+            </a:endParaRPr>
+          </a:p>
+          <a:p>
+            <a:r>
+              <a:rPr lang="en-IN" sz="1000" b="1" dirty="0">
+                <a:solidFill>
+                  <a:schemeClr val="accent2">
+                    <a:lumMod val="50000"/>
+                  </a:schemeClr>
+                </a:solidFill>
+                <a:latin typeface="Algerian" panose="04020705040A02060702" pitchFamily="82" charset="0"/>
+              </a:rPr>
+              <a:t>Distribution of Promo with State Holiday</a:t>
+            </a:r>
+          </a:p>
+          <a:p>
+            <a:r>
+              <a:rPr lang="en-IN" sz="1000" dirty="0">
+                <a:latin typeface="Algerian" panose="04020705040A02060702" pitchFamily="82" charset="0"/>
+              </a:rPr>
+              <a:t>On regular days (State Holiday=0), observations without "Promo" higher.</a:t>
+            </a:r>
+          </a:p>
+          <a:p>
+            <a:r>
+              <a:rPr lang="en-IN" sz="1000" dirty="0">
+                <a:latin typeface="Algerian" panose="04020705040A02060702" pitchFamily="82" charset="0"/>
+              </a:rPr>
+              <a:t>During public holidays, Easter, and Christmas, fewer observations without "Promo" compared to regular days.</a:t>
+            </a:r>
+          </a:p>
+          <a:p>
+            <a:endParaRPr lang="en-IN" sz="1000" dirty="0">
+              <a:latin typeface="Algerian" panose="04020705040A02060702" pitchFamily="82" charset="0"/>
+            </a:endParaRPr>
+          </a:p>
+          <a:p>
+            <a:r>
+              <a:rPr lang="en-IN" sz="1000" b="1" dirty="0">
+                <a:solidFill>
+                  <a:schemeClr val="accent2">
+                    <a:lumMod val="50000"/>
+                  </a:schemeClr>
+                </a:solidFill>
+                <a:latin typeface="Algerian" panose="04020705040A02060702" pitchFamily="82" charset="0"/>
+              </a:rPr>
+              <a:t>Distribution of Promo with School Holiday</a:t>
+            </a:r>
+          </a:p>
+          <a:p>
+            <a:r>
+              <a:rPr lang="en-IN" sz="1000" dirty="0">
+                <a:latin typeface="Algerian" panose="04020705040A02060702" pitchFamily="82" charset="0"/>
+              </a:rPr>
+              <a:t>During school holidays (School Holiday=1), relatively balanced.</a:t>
+            </a:r>
+          </a:p>
+          <a:p>
+            <a:r>
+              <a:rPr lang="en-IN" sz="1000" dirty="0">
+                <a:latin typeface="Algerian" panose="04020705040A02060702" pitchFamily="82" charset="0"/>
+              </a:rPr>
+              <a:t>On non-school holidays (School Holiday=0), observations without "Promo" substantially higher.</a:t>
+            </a:r>
+          </a:p>
+        </p:txBody>
+      </p:sp>
+      <p:sp>
+        <p:nvSpPr>
+          <p:cNvPr id="11" name="TextBox 10">
+            <a:extLst>
+              <a:ext uri="{FF2B5EF4-FFF2-40B4-BE49-F238E27FC236}">
+                <a16:creationId xmlns:a16="http://schemas.microsoft.com/office/drawing/2014/main" id="{6C4F5BFE-ECDC-D237-460F-DBA7F2246A02}"/>
+              </a:ext>
+            </a:extLst>
+          </p:cNvPr>
+          <p:cNvSpPr txBox="1"/>
+          <p:nvPr/>
+        </p:nvSpPr>
+        <p:spPr>
+          <a:xfrm>
+            <a:off x="7418070" y="3647879"/>
+            <a:ext cx="3989070" cy="2462213"/>
+          </a:xfrm>
+          <a:prstGeom prst="rect">
+            <a:avLst/>
+          </a:prstGeom>
+          <a:noFill/>
+        </p:spPr>
+        <p:txBody>
+          <a:bodyPr wrap="square">
+            <a:spAutoFit/>
+          </a:bodyPr>
+          <a:lstStyle/>
+          <a:p>
+            <a:r>
+              <a:rPr lang="en-IN" sz="1400" b="1" dirty="0">
+                <a:solidFill>
+                  <a:schemeClr val="accent2">
+                    <a:lumMod val="50000"/>
+                  </a:schemeClr>
+                </a:solidFill>
+                <a:latin typeface="Algerian" panose="04020705040A02060702" pitchFamily="82" charset="0"/>
+              </a:rPr>
+              <a:t>Conclusion</a:t>
+            </a:r>
+          </a:p>
+          <a:p>
+            <a:endParaRPr lang="en-IN" sz="1400" dirty="0">
+              <a:latin typeface="Algerian" panose="04020705040A02060702" pitchFamily="82" charset="0"/>
+            </a:endParaRPr>
+          </a:p>
+          <a:p>
+            <a:pPr marL="171450" indent="-171450">
+              <a:buFont typeface="Arial" panose="020B0604020202020204" pitchFamily="34" charset="0"/>
+              <a:buChar char="•"/>
+            </a:pPr>
+            <a:r>
+              <a:rPr lang="en-IN" sz="1400" dirty="0">
+                <a:latin typeface="Algerian" panose="04020705040A02060702" pitchFamily="82" charset="0"/>
+              </a:rPr>
+              <a:t>Distribution of "Promo" varies across categorical features.</a:t>
+            </a:r>
+          </a:p>
+          <a:p>
+            <a:pPr marL="171450" indent="-171450">
+              <a:buFont typeface="Arial" panose="020B0604020202020204" pitchFamily="34" charset="0"/>
+              <a:buChar char="•"/>
+            </a:pPr>
+            <a:r>
+              <a:rPr lang="en-IN" sz="1400" dirty="0">
+                <a:latin typeface="Algerian" panose="04020705040A02060702" pitchFamily="82" charset="0"/>
+              </a:rPr>
+              <a:t>Weekdays see more "Promo" compared to weekends.</a:t>
+            </a:r>
+          </a:p>
+          <a:p>
+            <a:pPr marL="171450" indent="-171450">
+              <a:buFont typeface="Arial" panose="020B0604020202020204" pitchFamily="34" charset="0"/>
+              <a:buChar char="•"/>
+            </a:pPr>
+            <a:r>
+              <a:rPr lang="en-IN" sz="1400" dirty="0">
+                <a:latin typeface="Algerian" panose="04020705040A02060702" pitchFamily="82" charset="0"/>
+              </a:rPr>
+              <a:t>Fewer promotions when store closed.</a:t>
+            </a:r>
+          </a:p>
+          <a:p>
+            <a:pPr marL="171450" indent="-171450">
+              <a:buFont typeface="Arial" panose="020B0604020202020204" pitchFamily="34" charset="0"/>
+              <a:buChar char="•"/>
+            </a:pPr>
+            <a:r>
+              <a:rPr lang="en-IN" sz="1400" dirty="0">
+                <a:latin typeface="Algerian" panose="04020705040A02060702" pitchFamily="82" charset="0"/>
+              </a:rPr>
+              <a:t>Different distributions observed during holidays.</a:t>
+            </a:r>
+          </a:p>
+          <a:p>
+            <a:pPr marL="171450" indent="-171450">
+              <a:buFont typeface="Arial" panose="020B0604020202020204" pitchFamily="34" charset="0"/>
+              <a:buChar char="•"/>
+            </a:pPr>
+            <a:r>
+              <a:rPr lang="en-IN" sz="1400" dirty="0">
+                <a:latin typeface="Algerian" panose="04020705040A02060702" pitchFamily="82" charset="0"/>
+              </a:rPr>
+              <a:t>School holidays don't significantly influence promotional activities.</a:t>
+            </a:r>
+          </a:p>
+        </p:txBody>
+      </p:sp>
+      <p:sp>
+        <p:nvSpPr>
+          <p:cNvPr id="13" name="TextBox 12">
+            <a:extLst>
+              <a:ext uri="{FF2B5EF4-FFF2-40B4-BE49-F238E27FC236}">
+                <a16:creationId xmlns:a16="http://schemas.microsoft.com/office/drawing/2014/main" id="{612177CA-D8CB-94E9-3D73-59C451A86A33}"/>
+              </a:ext>
+            </a:extLst>
+          </p:cNvPr>
+          <p:cNvSpPr txBox="1"/>
+          <p:nvPr/>
+        </p:nvSpPr>
+        <p:spPr>
+          <a:xfrm>
+            <a:off x="274320" y="0"/>
+            <a:ext cx="11643360" cy="461665"/>
+          </a:xfrm>
+          <a:prstGeom prst="rect">
+            <a:avLst/>
+          </a:prstGeom>
+          <a:noFill/>
+        </p:spPr>
+        <p:txBody>
+          <a:bodyPr wrap="square">
+            <a:spAutoFit/>
+          </a:bodyPr>
+          <a:lstStyle/>
+          <a:p>
+            <a:r>
+              <a:rPr lang="en-US" sz="2400" b="1" dirty="0">
+                <a:latin typeface="Algerian" panose="04020705040A02060702" pitchFamily="82" charset="0"/>
+              </a:rPr>
+              <a:t>Analysis of Promo Distribution Across Different Categorical Features</a:t>
+            </a:r>
+            <a:endParaRPr lang="en-IN" sz="2400" b="1" dirty="0">
+              <a:latin typeface="Algerian" panose="04020705040A02060702" pitchFamily="82" charset="0"/>
+            </a:endParaRPr>
+          </a:p>
+        </p:txBody>
+      </p:sp>
     </p:spTree>
     <p:extLst>
       <p:ext uri="{BB962C8B-B14F-4D97-AF65-F5344CB8AC3E}">
@@ -5240,14 +7815,189 @@
         </p:blipFill>
         <p:spPr>
           <a:xfrm>
-            <a:off x="557017" y="713227"/>
+            <a:off x="274320" y="1419086"/>
             <a:ext cx="5746044" cy="3195833"/>
+          </a:xfrm>
+          <a:prstGeom prst="roundRect">
+            <a:avLst>
+              <a:gd name="adj" fmla="val 8594"/>
+            </a:avLst>
+          </a:prstGeom>
+          <a:solidFill>
+            <a:srgbClr val="FFFFFF">
+              <a:shade val="85000"/>
+            </a:srgbClr>
+          </a:solidFill>
+          <a:ln>
+            <a:noFill/>
+          </a:ln>
+          <a:effectLst>
+            <a:reflection blurRad="12700" stA="38000" endPos="28000" dist="5000" dir="5400000" sy="-100000" algn="bl" rotWithShape="0"/>
+          </a:effectLst>
+        </p:spPr>
+      </p:pic>
+      <p:sp>
+        <p:nvSpPr>
+          <p:cNvPr id="4" name="TextBox 3">
+            <a:extLst>
+              <a:ext uri="{FF2B5EF4-FFF2-40B4-BE49-F238E27FC236}">
+                <a16:creationId xmlns:a16="http://schemas.microsoft.com/office/drawing/2014/main" id="{840D1927-F0FC-0E7E-0860-36A57C3BBE67}"/>
+              </a:ext>
+            </a:extLst>
+          </p:cNvPr>
+          <p:cNvSpPr txBox="1"/>
+          <p:nvPr/>
+        </p:nvSpPr>
+        <p:spPr>
+          <a:xfrm>
+            <a:off x="6303060" y="335846"/>
+            <a:ext cx="5746044" cy="6001643"/>
           </a:xfrm>
           <a:prstGeom prst="rect">
             <a:avLst/>
           </a:prstGeom>
+          <a:noFill/>
         </p:spPr>
-      </p:pic>
+        <p:txBody>
+          <a:bodyPr wrap="square">
+            <a:spAutoFit/>
+          </a:bodyPr>
+          <a:lstStyle/>
+          <a:p>
+            <a:endParaRPr lang="en-IN" sz="1600" dirty="0">
+              <a:latin typeface="Algerian" panose="04020705040A02060702" pitchFamily="82" charset="0"/>
+            </a:endParaRPr>
+          </a:p>
+          <a:p>
+            <a:r>
+              <a:rPr lang="en-IN" sz="1600" b="1" dirty="0">
+                <a:solidFill>
+                  <a:schemeClr val="accent2">
+                    <a:lumMod val="50000"/>
+                  </a:schemeClr>
+                </a:solidFill>
+                <a:latin typeface="Algerian" panose="04020705040A02060702" pitchFamily="82" charset="0"/>
+              </a:rPr>
+              <a:t>Before Holiday</a:t>
+            </a:r>
+            <a:r>
+              <a:rPr lang="en-IN" sz="1600" dirty="0">
+                <a:latin typeface="Algerian" panose="04020705040A02060702" pitchFamily="82" charset="0"/>
+              </a:rPr>
+              <a:t>: Average sales range between 6000 and 7000, indicating heightened consumer spending in anticipation of the holiday. Customers tend to stock up on supplies or take advantage of pre-holiday sales.</a:t>
+            </a:r>
+          </a:p>
+          <a:p>
+            <a:endParaRPr lang="en-IN" sz="1600" dirty="0">
+              <a:latin typeface="Algerian" panose="04020705040A02060702" pitchFamily="82" charset="0"/>
+            </a:endParaRPr>
+          </a:p>
+          <a:p>
+            <a:r>
+              <a:rPr lang="en-IN" sz="1600" b="1" dirty="0">
+                <a:solidFill>
+                  <a:schemeClr val="accent2">
+                    <a:lumMod val="50000"/>
+                  </a:schemeClr>
+                </a:solidFill>
+                <a:latin typeface="Algerian" panose="04020705040A02060702" pitchFamily="82" charset="0"/>
+              </a:rPr>
+              <a:t>During Holiday</a:t>
+            </a:r>
+            <a:r>
+              <a:rPr lang="en-IN" sz="1600" dirty="0">
+                <a:latin typeface="Algerian" panose="04020705040A02060702" pitchFamily="82" charset="0"/>
+              </a:rPr>
+              <a:t>: Average sales range from 5000 to 6000, suggesting a slight decrease compared to pre-holiday sales. Altered shopping behaviours during holidays, such as prioritizing family time or holiday activities, may contribute to this dip.</a:t>
+            </a:r>
+          </a:p>
+          <a:p>
+            <a:endParaRPr lang="en-IN" sz="1600" dirty="0">
+              <a:latin typeface="Algerian" panose="04020705040A02060702" pitchFamily="82" charset="0"/>
+            </a:endParaRPr>
+          </a:p>
+          <a:p>
+            <a:r>
+              <a:rPr lang="en-IN" sz="1600" b="1" dirty="0">
+                <a:solidFill>
+                  <a:schemeClr val="accent2">
+                    <a:lumMod val="50000"/>
+                  </a:schemeClr>
+                </a:solidFill>
+                <a:latin typeface="Algerian" panose="04020705040A02060702" pitchFamily="82" charset="0"/>
+              </a:rPr>
+              <a:t>After Holiday</a:t>
+            </a:r>
+            <a:r>
+              <a:rPr lang="en-IN" sz="1600" dirty="0">
+                <a:latin typeface="Algerian" panose="04020705040A02060702" pitchFamily="82" charset="0"/>
+              </a:rPr>
+              <a:t>: Average sales rebound to 7000, indicating a return to normal shopping routines or uptake in post-holiday sales and promotions.</a:t>
+            </a:r>
+          </a:p>
+          <a:p>
+            <a:endParaRPr lang="en-IN" sz="1600" dirty="0">
+              <a:latin typeface="Algerian" panose="04020705040A02060702" pitchFamily="82" charset="0"/>
+            </a:endParaRPr>
+          </a:p>
+          <a:p>
+            <a:r>
+              <a:rPr lang="en-IN" sz="1600" b="1" dirty="0">
+                <a:solidFill>
+                  <a:schemeClr val="accent2">
+                    <a:lumMod val="50000"/>
+                  </a:schemeClr>
+                </a:solidFill>
+                <a:latin typeface="Algerian" panose="04020705040A02060702" pitchFamily="82" charset="0"/>
+              </a:rPr>
+              <a:t>Conclusion: </a:t>
+            </a:r>
+            <a:r>
+              <a:rPr lang="en-IN" sz="1600" dirty="0">
+                <a:latin typeface="Algerian" panose="04020705040A02060702" pitchFamily="82" charset="0"/>
+              </a:rPr>
+              <a:t>The analysis reveals a typical consumer behaviour pattern surrounding holidays: increased pre-holiday spending, a slight dip during the holiday, and a post-holiday sales surge. Retailers can leverage this insight to adjust marketing strategies and inventory management, optimizing sales and meeting customer demand e</a:t>
+            </a:r>
+          </a:p>
+        </p:txBody>
+      </p:sp>
+      <p:sp>
+        <p:nvSpPr>
+          <p:cNvPr id="6" name="TextBox 5">
+            <a:extLst>
+              <a:ext uri="{FF2B5EF4-FFF2-40B4-BE49-F238E27FC236}">
+                <a16:creationId xmlns:a16="http://schemas.microsoft.com/office/drawing/2014/main" id="{75FD726F-38C8-BB3E-614B-DB6588F5F7C4}"/>
+              </a:ext>
+            </a:extLst>
+          </p:cNvPr>
+          <p:cNvSpPr txBox="1"/>
+          <p:nvPr/>
+        </p:nvSpPr>
+        <p:spPr>
+          <a:xfrm>
+            <a:off x="426720" y="152400"/>
+            <a:ext cx="11643360" cy="646331"/>
+          </a:xfrm>
+          <a:prstGeom prst="rect">
+            <a:avLst/>
+          </a:prstGeom>
+          <a:noFill/>
+        </p:spPr>
+        <p:txBody>
+          <a:bodyPr wrap="square">
+            <a:spAutoFit/>
+          </a:bodyPr>
+          <a:lstStyle/>
+          <a:p>
+            <a:r>
+              <a:rPr lang="en-IN" sz="3600" b="1" dirty="0">
+                <a:latin typeface="Algerian" panose="04020705040A02060702" pitchFamily="82" charset="0"/>
+              </a:rPr>
+              <a:t>Holiday sales analysis</a:t>
+            </a:r>
+          </a:p>
+        </p:txBody>
+      </p:sp>
     </p:spTree>
     <p:extLst>
       <p:ext uri="{BB962C8B-B14F-4D97-AF65-F5344CB8AC3E}">
@@ -5262,7 +8012,7 @@
 </file>
 
 <file path=ppt/slides/slide9.xml><?xml version="1.0" encoding="utf-8"?>
-<p:sld xmlns:a="http://schemas.openxmlformats.org/drawingml/2006/main" xmlns:r="http://schemas.openxmlformats.org/officeDocument/2006/relationships" xmlns:p="http://schemas.openxmlformats.org/presentationml/2006/main">
+<p:sld xmlns:a="http://schemas.openxmlformats.org/drawingml/2006/main" xmlns:r="http://schemas.openxmlformats.org/officeDocument/2006/relationships" xmlns:p="http://schemas.openxmlformats.org/presentationml/2006/main" show="0">
   <p:cSld>
     <p:bg>
       <p:bgPr>
@@ -5454,7 +8204,7 @@
 <file path=ppt/theme/theme1.xml><?xml version="1.0" encoding="utf-8"?>
 <a:theme xmlns:a="http://schemas.openxmlformats.org/drawingml/2006/main" name="Office Theme">
   <a:themeElements>
-    <a:clrScheme name="Office">
+    <a:clrScheme name="Office Theme">
       <a:dk1>
         <a:sysClr val="windowText" lastClr="000000"/>
       </a:dk1>
@@ -5492,7 +8242,7 @@
         <a:srgbClr val="954F72"/>
       </a:folHlink>
     </a:clrScheme>
-    <a:fontScheme name="Office">
+    <a:fontScheme name="Office Theme">
       <a:majorFont>
         <a:latin typeface="Calibri Light" panose="020F0302020204030204"/>
         <a:ea typeface=""/>
@@ -5527,23 +8277,6 @@
         <a:font script="Viet" typeface="Times New Roman"/>
         <a:font script="Uigh" typeface="Microsoft Uighur"/>
         <a:font script="Geor" typeface="Sylfaen"/>
-        <a:font script="Armn" typeface="Arial"/>
-        <a:font script="Bugi" typeface="Leelawadee UI"/>
-        <a:font script="Bopo" typeface="Microsoft JhengHei"/>
-        <a:font script="Java" typeface="Javanese Text"/>
-        <a:font script="Lisu" typeface="Segoe UI"/>
-        <a:font script="Mymr" typeface="Myanmar Text"/>
-        <a:font script="Nkoo" typeface="Ebrima"/>
-        <a:font script="Olck" typeface="Nirmala UI"/>
-        <a:font script="Osma" typeface="Ebrima"/>
-        <a:font script="Phag" typeface="Phagspa"/>
-        <a:font script="Syrn" typeface="Estrangelo Edessa"/>
-        <a:font script="Syrj" typeface="Estrangelo Edessa"/>
-        <a:font script="Syre" typeface="Estrangelo Edessa"/>
-        <a:font script="Sora" typeface="Nirmala UI"/>
-        <a:font script="Tale" typeface="Microsoft Tai Le"/>
-        <a:font script="Talu" typeface="Microsoft New Tai Lue"/>
-        <a:font script="Tfng" typeface="Ebrima"/>
       </a:majorFont>
       <a:minorFont>
         <a:latin typeface="Calibri" panose="020F0502020204030204"/>
@@ -5579,26 +8312,9 @@
         <a:font script="Viet" typeface="Arial"/>
         <a:font script="Uigh" typeface="Microsoft Uighur"/>
         <a:font script="Geor" typeface="Sylfaen"/>
-        <a:font script="Armn" typeface="Arial"/>
-        <a:font script="Bugi" typeface="Leelawadee UI"/>
-        <a:font script="Bopo" typeface="Microsoft JhengHei"/>
-        <a:font script="Java" typeface="Javanese Text"/>
-        <a:font script="Lisu" typeface="Segoe UI"/>
-        <a:font script="Mymr" typeface="Myanmar Text"/>
-        <a:font script="Nkoo" typeface="Ebrima"/>
-        <a:font script="Olck" typeface="Nirmala UI"/>
-        <a:font script="Osma" typeface="Ebrima"/>
-        <a:font script="Phag" typeface="Phagspa"/>
-        <a:font script="Syrn" typeface="Estrangelo Edessa"/>
-        <a:font script="Syrj" typeface="Estrangelo Edessa"/>
-        <a:font script="Syre" typeface="Estrangelo Edessa"/>
-        <a:font script="Sora" typeface="Nirmala UI"/>
-        <a:font script="Tale" typeface="Microsoft Tai Le"/>
-        <a:font script="Talu" typeface="Microsoft New Tai Lue"/>
-        <a:font script="Tfng" typeface="Ebrima"/>
       </a:minorFont>
     </a:fontScheme>
-    <a:fmtScheme name="Office">
+    <a:fmtScheme name="Office Theme">
       <a:fillStyleLst>
         <a:solidFill>
           <a:schemeClr val="phClr"/>
@@ -5740,7 +8456,7 @@
   <a:extraClrSchemeLst/>
   <a:extLst>
     <a:ext uri="{05A4C25C-085E-4340-85A3-A5531E510DB2}">
-      <thm15:themeFamily xmlns:thm15="http://schemas.microsoft.com/office/thememl/2012/main" name="Office Theme" id="{62F939B6-93AF-4DB8-9C6B-D6C7DFDC589F}" vid="{4A3C46E8-61CC-4603-A589-7422A47A8E4A}"/>
+      <thm15:themeFamily xmlns:thm15="http://schemas.microsoft.com/office/thememl/2012/main" name="Office 2013 - 2022 Theme" id="{62F939B6-93AF-4DB8-9C6B-D6C7DFDC589F}" vid="{4A3C46E8-61CC-4603-A589-7422A47A8E4A}"/>
     </a:ext>
   </a:extLst>
 </a:theme>

</xml_diff>

<commit_message>
Update Rossmman Sales Prediction-Project 6-Nexthike.pptx
</commit_message>
<xml_diff>
--- a/Rossmman Sales Prediction-Project 6-Nexthike.pptx
+++ b/Rossmman Sales Prediction-Project 6-Nexthike.pptx
@@ -20,7 +20,8 @@
     <p:sldId id="272" r:id="rId14"/>
     <p:sldId id="271" r:id="rId15"/>
     <p:sldId id="270" r:id="rId16"/>
-    <p:sldId id="275" r:id="rId17"/>
+    <p:sldId id="276" r:id="rId17"/>
+    <p:sldId id="275" r:id="rId18"/>
   </p:sldIdLst>
   <p:sldSz cx="12192000" cy="6858000"/>
   <p:notesSz cx="6858000" cy="9144000"/>
@@ -5184,6 +5185,369 @@
       </p:grpSpPr>
       <p:sp>
         <p:nvSpPr>
+          <p:cNvPr id="10" name="TextBox 9">
+            <a:extLst>
+              <a:ext uri="{FF2B5EF4-FFF2-40B4-BE49-F238E27FC236}">
+                <a16:creationId xmlns:a16="http://schemas.microsoft.com/office/drawing/2014/main" id="{74874B38-F37C-F13D-1CFE-1D92CFCC44EE}"/>
+              </a:ext>
+            </a:extLst>
+          </p:cNvPr>
+          <p:cNvSpPr txBox="1"/>
+          <p:nvPr/>
+        </p:nvSpPr>
+        <p:spPr>
+          <a:xfrm>
+            <a:off x="274320" y="137606"/>
+            <a:ext cx="11643359" cy="646331"/>
+          </a:xfrm>
+          <a:prstGeom prst="rect">
+            <a:avLst/>
+          </a:prstGeom>
+          <a:noFill/>
+        </p:spPr>
+        <p:txBody>
+          <a:bodyPr wrap="square">
+            <a:spAutoFit/>
+          </a:bodyPr>
+          <a:lstStyle/>
+          <a:p>
+            <a:pPr algn="ctr"/>
+            <a:r>
+              <a:rPr lang="en-IN" sz="3600" b="1" dirty="0" err="1">
+                <a:solidFill>
+                  <a:schemeClr val="accent5">
+                    <a:lumMod val="50000"/>
+                  </a:schemeClr>
+                </a:solidFill>
+                <a:latin typeface="Algerian" panose="04020705040A02060702" pitchFamily="82" charset="0"/>
+              </a:rPr>
+              <a:t>rossmann</a:t>
+            </a:r>
+            <a:r>
+              <a:rPr lang="en-IN" sz="3600" b="1" dirty="0">
+                <a:solidFill>
+                  <a:schemeClr val="accent5">
+                    <a:lumMod val="50000"/>
+                  </a:schemeClr>
+                </a:solidFill>
+                <a:latin typeface="Algerian" panose="04020705040A02060702" pitchFamily="82" charset="0"/>
+              </a:rPr>
+              <a:t> sales forecasting solution</a:t>
+            </a:r>
+          </a:p>
+        </p:txBody>
+      </p:sp>
+      <p:sp>
+        <p:nvSpPr>
+          <p:cNvPr id="4" name="TextBox 3">
+            <a:extLst>
+              <a:ext uri="{FF2B5EF4-FFF2-40B4-BE49-F238E27FC236}">
+                <a16:creationId xmlns:a16="http://schemas.microsoft.com/office/drawing/2014/main" id="{AE95B516-FB5A-5A08-1AC9-AF0398F0F9C1}"/>
+              </a:ext>
+            </a:extLst>
+          </p:cNvPr>
+          <p:cNvSpPr txBox="1"/>
+          <p:nvPr/>
+        </p:nvSpPr>
+        <p:spPr>
+          <a:xfrm>
+            <a:off x="274317" y="893827"/>
+            <a:ext cx="11643359" cy="5863144"/>
+          </a:xfrm>
+          <a:prstGeom prst="rect">
+            <a:avLst/>
+          </a:prstGeom>
+          <a:noFill/>
+        </p:spPr>
+        <p:txBody>
+          <a:bodyPr wrap="square">
+            <a:spAutoFit/>
+          </a:bodyPr>
+          <a:lstStyle/>
+          <a:p>
+            <a:r>
+              <a:rPr lang="en-IN" sz="1500" b="1" dirty="0">
+                <a:solidFill>
+                  <a:schemeClr val="accent2">
+                    <a:lumMod val="50000"/>
+                  </a:schemeClr>
+                </a:solidFill>
+                <a:latin typeface="Algerian" panose="04020705040A02060702" pitchFamily="82" charset="0"/>
+              </a:rPr>
+              <a:t>End-to-End Solution: </a:t>
+            </a:r>
+            <a:r>
+              <a:rPr lang="en-IN" sz="1500" dirty="0">
+                <a:latin typeface="Algerian" panose="04020705040A02060702" pitchFamily="82" charset="0"/>
+              </a:rPr>
+              <a:t>Developed comprehensive solution for sales forecasting across Rossmann Pharmaceuticals' multiple stores.</a:t>
+            </a:r>
+          </a:p>
+          <a:p>
+            <a:endParaRPr lang="en-IN" sz="1500" dirty="0">
+              <a:latin typeface="Algerian" panose="04020705040A02060702" pitchFamily="82" charset="0"/>
+            </a:endParaRPr>
+          </a:p>
+          <a:p>
+            <a:r>
+              <a:rPr lang="en-IN" sz="1500" b="1" dirty="0">
+                <a:solidFill>
+                  <a:schemeClr val="accent2">
+                    <a:lumMod val="50000"/>
+                  </a:schemeClr>
+                </a:solidFill>
+                <a:latin typeface="Algerian" panose="04020705040A02060702" pitchFamily="82" charset="0"/>
+              </a:rPr>
+              <a:t>Key Features: </a:t>
+            </a:r>
+            <a:r>
+              <a:rPr lang="en-IN" sz="1500" dirty="0">
+                <a:latin typeface="Algerian" panose="04020705040A02060702" pitchFamily="82" charset="0"/>
+              </a:rPr>
+              <a:t>Utilized machine learning techniques incorporating promotions, competition, holidays, seasonality, and locality.</a:t>
+            </a:r>
+          </a:p>
+          <a:p>
+            <a:endParaRPr lang="en-IN" sz="1500" dirty="0">
+              <a:latin typeface="Algerian" panose="04020705040A02060702" pitchFamily="82" charset="0"/>
+            </a:endParaRPr>
+          </a:p>
+          <a:p>
+            <a:r>
+              <a:rPr lang="en-IN" sz="1500" b="1" dirty="0">
+                <a:solidFill>
+                  <a:schemeClr val="accent2">
+                    <a:lumMod val="50000"/>
+                  </a:schemeClr>
+                </a:solidFill>
+                <a:latin typeface="Algerian" panose="04020705040A02060702" pitchFamily="82" charset="0"/>
+              </a:rPr>
+              <a:t>Accurate Forecasts: </a:t>
+            </a:r>
+            <a:r>
+              <a:rPr lang="en-IN" sz="1500" dirty="0">
+                <a:latin typeface="Algerian" panose="04020705040A02060702" pitchFamily="82" charset="0"/>
+              </a:rPr>
+              <a:t>Delivered predictions six weeks in advance, empowering finance team with data-driven insights.</a:t>
+            </a:r>
+          </a:p>
+          <a:p>
+            <a:endParaRPr lang="en-IN" sz="1500" dirty="0">
+              <a:latin typeface="Algerian" panose="04020705040A02060702" pitchFamily="82" charset="0"/>
+            </a:endParaRPr>
+          </a:p>
+          <a:p>
+            <a:r>
+              <a:rPr lang="en-IN" sz="1500" b="1" dirty="0">
+                <a:solidFill>
+                  <a:schemeClr val="accent2">
+                    <a:lumMod val="50000"/>
+                  </a:schemeClr>
+                </a:solidFill>
+                <a:latin typeface="Algerian" panose="04020705040A02060702" pitchFamily="82" charset="0"/>
+              </a:rPr>
+              <a:t>Reduced Reliance on Judgments: </a:t>
+            </a:r>
+            <a:r>
+              <a:rPr lang="en-IN" sz="1500" dirty="0">
+                <a:latin typeface="Algerian" panose="04020705040A02060702" pitchFamily="82" charset="0"/>
+              </a:rPr>
+              <a:t>Automated forecasting process reduces subjective judgments, ensuring objective decision-making.</a:t>
+            </a:r>
+          </a:p>
+          <a:p>
+            <a:endParaRPr lang="en-IN" sz="1500" dirty="0">
+              <a:latin typeface="Algerian" panose="04020705040A02060702" pitchFamily="82" charset="0"/>
+            </a:endParaRPr>
+          </a:p>
+          <a:p>
+            <a:r>
+              <a:rPr lang="en-IN" sz="1500" b="1" dirty="0">
+                <a:solidFill>
+                  <a:schemeClr val="accent2">
+                    <a:lumMod val="50000"/>
+                  </a:schemeClr>
+                </a:solidFill>
+                <a:latin typeface="Algerian" panose="04020705040A02060702" pitchFamily="82" charset="0"/>
+              </a:rPr>
+              <a:t>Scalability: </a:t>
+            </a:r>
+            <a:r>
+              <a:rPr lang="en-IN" sz="1500" dirty="0">
+                <a:latin typeface="Algerian" panose="04020705040A02060702" pitchFamily="82" charset="0"/>
+              </a:rPr>
+              <a:t>Solution adapts to new data inputs and store configurations, ensuring relevance over time.</a:t>
+            </a:r>
+          </a:p>
+          <a:p>
+            <a:endParaRPr lang="en-IN" sz="1500" dirty="0">
+              <a:latin typeface="Algerian" panose="04020705040A02060702" pitchFamily="82" charset="0"/>
+            </a:endParaRPr>
+          </a:p>
+          <a:p>
+            <a:r>
+              <a:rPr lang="en-IN" sz="1500" b="1" dirty="0">
+                <a:solidFill>
+                  <a:schemeClr val="accent2">
+                    <a:lumMod val="50000"/>
+                  </a:schemeClr>
+                </a:solidFill>
+                <a:latin typeface="Algerian" panose="04020705040A02060702" pitchFamily="82" charset="0"/>
+              </a:rPr>
+              <a:t>Continuous Monitoring: </a:t>
+            </a:r>
+            <a:r>
+              <a:rPr lang="en-IN" sz="1500" dirty="0">
+                <a:latin typeface="Algerian" panose="04020705040A02060702" pitchFamily="82" charset="0"/>
+              </a:rPr>
+              <a:t>Implementation of monitoring and evaluation mechanisms for refining model's performance.</a:t>
+            </a:r>
+          </a:p>
+          <a:p>
+            <a:endParaRPr lang="en-IN" sz="1500" b="1" dirty="0">
+              <a:solidFill>
+                <a:schemeClr val="accent2">
+                  <a:lumMod val="50000"/>
+                </a:schemeClr>
+              </a:solidFill>
+              <a:latin typeface="Algerian" panose="04020705040A02060702" pitchFamily="82" charset="0"/>
+            </a:endParaRPr>
+          </a:p>
+          <a:p>
+            <a:r>
+              <a:rPr lang="en-IN" sz="1500" b="1" dirty="0">
+                <a:solidFill>
+                  <a:schemeClr val="accent2">
+                    <a:lumMod val="50000"/>
+                  </a:schemeClr>
+                </a:solidFill>
+                <a:latin typeface="Algerian" panose="04020705040A02060702" pitchFamily="82" charset="0"/>
+              </a:rPr>
+              <a:t>Enhanced Usability: </a:t>
+            </a:r>
+            <a:r>
+              <a:rPr lang="en-IN" sz="1500" dirty="0">
+                <a:latin typeface="Algerian" panose="04020705040A02060702" pitchFamily="82" charset="0"/>
+              </a:rPr>
+              <a:t>Implemented Flask application with user-friendly dashboard for easy data input and visualization of sales trends.</a:t>
+            </a:r>
+          </a:p>
+          <a:p>
+            <a:endParaRPr lang="en-IN" sz="1500" dirty="0">
+              <a:latin typeface="Algerian" panose="04020705040A02060702" pitchFamily="82" charset="0"/>
+            </a:endParaRPr>
+          </a:p>
+          <a:p>
+            <a:r>
+              <a:rPr lang="en-IN" sz="1500" b="1" dirty="0">
+                <a:solidFill>
+                  <a:schemeClr val="accent2">
+                    <a:lumMod val="50000"/>
+                  </a:schemeClr>
+                </a:solidFill>
+                <a:latin typeface="Algerian" panose="04020705040A02060702" pitchFamily="82" charset="0"/>
+              </a:rPr>
+              <a:t>Downloadable Predictions: </a:t>
+            </a:r>
+            <a:r>
+              <a:rPr lang="en-IN" sz="1500" dirty="0">
+                <a:latin typeface="Algerian" panose="04020705040A02060702" pitchFamily="82" charset="0"/>
+              </a:rPr>
+              <a:t>Users can download prediction data for further analysis and integration into workflows.</a:t>
+            </a:r>
+          </a:p>
+          <a:p>
+            <a:endParaRPr lang="en-IN" sz="1500" dirty="0">
+              <a:latin typeface="Algerian" panose="04020705040A02060702" pitchFamily="82" charset="0"/>
+            </a:endParaRPr>
+          </a:p>
+          <a:p>
+            <a:r>
+              <a:rPr lang="en-IN" sz="1500" b="1" dirty="0">
+                <a:solidFill>
+                  <a:schemeClr val="accent2">
+                    <a:lumMod val="50000"/>
+                  </a:schemeClr>
+                </a:solidFill>
+                <a:latin typeface="Algerian" panose="04020705040A02060702" pitchFamily="82" charset="0"/>
+              </a:rPr>
+              <a:t>Empowering Rossmann: </a:t>
+            </a:r>
+            <a:r>
+              <a:rPr lang="en-IN" sz="1500" dirty="0">
+                <a:latin typeface="Algerian" panose="04020705040A02060702" pitchFamily="82" charset="0"/>
+              </a:rPr>
+              <a:t>Equips Rossmann Pharmaceuticals with actionable insights for optimizing resource allocation and maximizing revenue.</a:t>
+            </a:r>
+          </a:p>
+        </p:txBody>
+      </p:sp>
+    </p:spTree>
+    <p:extLst>
+      <p:ext uri="{BB962C8B-B14F-4D97-AF65-F5344CB8AC3E}">
+        <p14:creationId xmlns:p14="http://schemas.microsoft.com/office/powerpoint/2010/main" val="381396253"/>
+      </p:ext>
+    </p:extLst>
+  </p:cSld>
+  <p:clrMapOvr>
+    <a:masterClrMapping/>
+  </p:clrMapOvr>
+</p:sld>
+</file>
+
+<file path=ppt/slides/slide17.xml><?xml version="1.0" encoding="utf-8"?>
+<p:sld xmlns:a="http://schemas.openxmlformats.org/drawingml/2006/main" xmlns:r="http://schemas.openxmlformats.org/officeDocument/2006/relationships" xmlns:p="http://schemas.openxmlformats.org/presentationml/2006/main">
+  <p:cSld>
+    <p:bg>
+      <p:bgPr>
+        <a:gradFill>
+          <a:gsLst>
+            <a:gs pos="0">
+              <a:schemeClr val="accent6">
+                <a:lumMod val="40000"/>
+                <a:lumOff val="60000"/>
+              </a:schemeClr>
+            </a:gs>
+            <a:gs pos="74000">
+              <a:schemeClr val="accent1">
+                <a:lumMod val="45000"/>
+                <a:lumOff val="55000"/>
+              </a:schemeClr>
+            </a:gs>
+            <a:gs pos="83000">
+              <a:schemeClr val="accent1">
+                <a:lumMod val="45000"/>
+                <a:lumOff val="55000"/>
+              </a:schemeClr>
+            </a:gs>
+            <a:gs pos="100000">
+              <a:schemeClr val="accent1">
+                <a:lumMod val="30000"/>
+                <a:lumOff val="70000"/>
+              </a:schemeClr>
+            </a:gs>
+          </a:gsLst>
+          <a:lin ang="5400000" scaled="1"/>
+        </a:gradFill>
+        <a:effectLst/>
+      </p:bgPr>
+    </p:bg>
+    <p:spTree>
+      <p:nvGrpSpPr>
+        <p:cNvPr id="1" name=""/>
+        <p:cNvGrpSpPr/>
+        <p:nvPr/>
+      </p:nvGrpSpPr>
+      <p:grpSpPr>
+        <a:xfrm>
+          <a:off x="0" y="0"/>
+          <a:ext cx="0" cy="0"/>
+          <a:chOff x="0" y="0"/>
+          <a:chExt cx="0" cy="0"/>
+        </a:xfrm>
+      </p:grpSpPr>
+      <p:sp>
+        <p:nvSpPr>
           <p:cNvPr id="2" name="TextBox 1">
             <a:extLst>
               <a:ext uri="{FF2B5EF4-FFF2-40B4-BE49-F238E27FC236}">

</xml_diff>